<commit_message>
Some after lecture slide fixes
git-svn-id: https://svn.code.sf.net/p/cpp-lects-rus/code/trunk@247 39143b06-f351-456c-9f92-4cd32fad6823
</commit_message>
<xml_diff>
--- a/slides/sep2017/10-exceptions.pptx
+++ b/slides/sep2017/10-exceptions.pptx
@@ -5,7 +5,7 @@
     <p:sldMasterId id="2147483684" r:id="rId1"/>
   </p:sldMasterIdLst>
   <p:notesMasterIdLst>
-    <p:notesMasterId r:id="rId105"/>
+    <p:notesMasterId r:id="rId106"/>
   </p:notesMasterIdLst>
   <p:sldIdLst>
     <p:sldId id="256" r:id="rId2"/>
@@ -92,25 +92,26 @@
     <p:sldId id="336" r:id="rId83"/>
     <p:sldId id="337" r:id="rId84"/>
     <p:sldId id="338" r:id="rId85"/>
-    <p:sldId id="339" r:id="rId86"/>
-    <p:sldId id="340" r:id="rId87"/>
-    <p:sldId id="341" r:id="rId88"/>
-    <p:sldId id="342" r:id="rId89"/>
-    <p:sldId id="343" r:id="rId90"/>
+    <p:sldId id="367" r:id="rId86"/>
+    <p:sldId id="339" r:id="rId87"/>
+    <p:sldId id="340" r:id="rId88"/>
+    <p:sldId id="341" r:id="rId89"/>
+    <p:sldId id="342" r:id="rId90"/>
     <p:sldId id="344" r:id="rId91"/>
     <p:sldId id="345" r:id="rId92"/>
-    <p:sldId id="346" r:id="rId93"/>
-    <p:sldId id="347" r:id="rId94"/>
-    <p:sldId id="348" r:id="rId95"/>
-    <p:sldId id="349" r:id="rId96"/>
-    <p:sldId id="350" r:id="rId97"/>
-    <p:sldId id="351" r:id="rId98"/>
-    <p:sldId id="352" r:id="rId99"/>
-    <p:sldId id="353" r:id="rId100"/>
-    <p:sldId id="364" r:id="rId101"/>
-    <p:sldId id="363" r:id="rId102"/>
-    <p:sldId id="365" r:id="rId103"/>
-    <p:sldId id="366" r:id="rId104"/>
+    <p:sldId id="343" r:id="rId93"/>
+    <p:sldId id="346" r:id="rId94"/>
+    <p:sldId id="347" r:id="rId95"/>
+    <p:sldId id="348" r:id="rId96"/>
+    <p:sldId id="349" r:id="rId97"/>
+    <p:sldId id="350" r:id="rId98"/>
+    <p:sldId id="351" r:id="rId99"/>
+    <p:sldId id="352" r:id="rId100"/>
+    <p:sldId id="353" r:id="rId101"/>
+    <p:sldId id="364" r:id="rId102"/>
+    <p:sldId id="363" r:id="rId103"/>
+    <p:sldId id="365" r:id="rId104"/>
+    <p:sldId id="366" r:id="rId105"/>
   </p:sldIdLst>
   <p:sldSz cx="12192000" cy="6858000"/>
   <p:notesSz cx="6858000" cy="9144000"/>
@@ -299,7 +300,7 @@
           <a:p>
             <a:fld id="{A45B99D1-CF44-4E2B-8A75-7AD1B4B1157F}" type="datetimeFigureOut">
               <a:rPr lang="en-US" smtClean="0"/>
-              <a:t>2/13/2018</a:t>
+              <a:t>2/17/2018</a:t>
             </a:fld>
             <a:endParaRPr lang="en-US"/>
           </a:p>
@@ -932,7 +933,7 @@
             <a:fld id="{96DFF08F-DC6B-4601-B491-B0F83F6DD2DA}" type="datetimeFigureOut">
               <a:rPr lang="en-US" dirty="0"/>
               <a:pPr/>
-              <a:t>2/13/2018</a:t>
+              <a:t>2/17/2018</a:t>
             </a:fld>
             <a:endParaRPr lang="en-US" dirty="0"/>
           </a:p>
@@ -1149,7 +1150,7 @@
           <a:p>
             <a:fld id="{96DFF08F-DC6B-4601-B491-B0F83F6DD2DA}" type="datetimeFigureOut">
               <a:rPr lang="en-US" dirty="0"/>
-              <a:t>2/13/2018</a:t>
+              <a:t>2/17/2018</a:t>
             </a:fld>
             <a:endParaRPr lang="en-US" dirty="0"/>
           </a:p>
@@ -1324,7 +1325,7 @@
           <a:p>
             <a:fld id="{96DFF08F-DC6B-4601-B491-B0F83F6DD2DA}" type="datetimeFigureOut">
               <a:rPr lang="en-US" dirty="0"/>
-              <a:t>2/13/2018</a:t>
+              <a:t>2/17/2018</a:t>
             </a:fld>
             <a:endParaRPr lang="en-US" dirty="0"/>
           </a:p>
@@ -1489,7 +1490,7 @@
           <a:p>
             <a:fld id="{96DFF08F-DC6B-4601-B491-B0F83F6DD2DA}" type="datetimeFigureOut">
               <a:rPr lang="en-US" dirty="0"/>
-              <a:t>2/13/2018</a:t>
+              <a:t>2/17/2018</a:t>
             </a:fld>
             <a:endParaRPr lang="en-US" dirty="0"/>
           </a:p>
@@ -1735,7 +1736,7 @@
           <a:p>
             <a:fld id="{96DFF08F-DC6B-4601-B491-B0F83F6DD2DA}" type="datetimeFigureOut">
               <a:rPr lang="en-US" dirty="0"/>
-              <a:t>2/13/2018</a:t>
+              <a:t>2/17/2018</a:t>
             </a:fld>
             <a:endParaRPr lang="en-US" dirty="0"/>
           </a:p>
@@ -2053,7 +2054,7 @@
           <a:p>
             <a:fld id="{96DFF08F-DC6B-4601-B491-B0F83F6DD2DA}" type="datetimeFigureOut">
               <a:rPr lang="en-US" dirty="0"/>
-              <a:t>2/13/2018</a:t>
+              <a:t>2/17/2018</a:t>
             </a:fld>
             <a:endParaRPr lang="en-US" dirty="0"/>
           </a:p>
@@ -2472,7 +2473,7 @@
           <a:p>
             <a:fld id="{96DFF08F-DC6B-4601-B491-B0F83F6DD2DA}" type="datetimeFigureOut">
               <a:rPr lang="en-US" dirty="0"/>
-              <a:t>2/13/2018</a:t>
+              <a:t>2/17/2018</a:t>
             </a:fld>
             <a:endParaRPr lang="en-US" dirty="0"/>
           </a:p>
@@ -2585,7 +2586,7 @@
           <a:p>
             <a:fld id="{96DFF08F-DC6B-4601-B491-B0F83F6DD2DA}" type="datetimeFigureOut">
               <a:rPr lang="en-US" dirty="0"/>
-              <a:t>2/13/2018</a:t>
+              <a:t>2/17/2018</a:t>
             </a:fld>
             <a:endParaRPr lang="en-US" dirty="0"/>
           </a:p>
@@ -2675,7 +2676,7 @@
           <a:p>
             <a:fld id="{96DFF08F-DC6B-4601-B491-B0F83F6DD2DA}" type="datetimeFigureOut">
               <a:rPr lang="en-US" dirty="0"/>
-              <a:t>2/13/2018</a:t>
+              <a:t>2/17/2018</a:t>
             </a:fld>
             <a:endParaRPr lang="en-US" dirty="0"/>
           </a:p>
@@ -2960,7 +2961,7 @@
           <a:p>
             <a:fld id="{96DFF08F-DC6B-4601-B491-B0F83F6DD2DA}" type="datetimeFigureOut">
               <a:rPr lang="en-US" dirty="0"/>
-              <a:t>2/13/2018</a:t>
+              <a:t>2/17/2018</a:t>
             </a:fld>
             <a:endParaRPr lang="en-US" dirty="0"/>
           </a:p>
@@ -3227,7 +3228,7 @@
           <a:p>
             <a:fld id="{96DFF08F-DC6B-4601-B491-B0F83F6DD2DA}" type="datetimeFigureOut">
               <a:rPr lang="en-US" dirty="0"/>
-              <a:t>2/13/2018</a:t>
+              <a:t>2/17/2018</a:t>
             </a:fld>
             <a:endParaRPr lang="en-US" dirty="0"/>
           </a:p>
@@ -3476,7 +3477,7 @@
             <a:fld id="{96DFF08F-DC6B-4601-B491-B0F83F6DD2DA}" type="datetimeFigureOut">
               <a:rPr lang="en-US" dirty="0"/>
               <a:pPr/>
-              <a:t>2/13/2018</a:t>
+              <a:t>2/17/2018</a:t>
             </a:fld>
             <a:endParaRPr lang="en-US" dirty="0"/>
           </a:p>
@@ -4466,7 +4467,7 @@
           <a:p>
             <a:r>
               <a:rPr lang="ru-RU" smtClean="0"/>
-              <a:t>Обсуждение</a:t>
+              <a:t>Вкладывание исключений</a:t>
             </a:r>
             <a:endParaRPr lang="en-US"/>
           </a:p>
@@ -4487,18 +4488,256 @@
           <a:bodyPr/>
           <a:lstStyle/>
           <a:p>
-            <a:r>
-              <a:rPr lang="ru-RU" smtClean="0"/>
-              <a:t>Видите ли вы нетривиальные применения этой техники?</a:t>
-            </a:r>
-            <a:endParaRPr lang="en-US"/>
+            <a:pPr marL="45720" indent="0">
+              <a:buNone/>
+            </a:pPr>
+            <a:r>
+              <a:rPr lang="en-US">
+                <a:latin typeface="Consolas" panose="020B0609020204030204" pitchFamily="49" charset="0"/>
+              </a:rPr>
+              <a:t>try </a:t>
+            </a:r>
+            <a:r>
+              <a:rPr lang="en-US" smtClean="0">
+                <a:latin typeface="Consolas" panose="020B0609020204030204" pitchFamily="49" charset="0"/>
+              </a:rPr>
+              <a:t>{</a:t>
+            </a:r>
+            <a:r>
+              <a:rPr lang="ru-RU" smtClean="0">
+                <a:latin typeface="Consolas" panose="020B0609020204030204" pitchFamily="49" charset="0"/>
+              </a:rPr>
+              <a:t/>
+            </a:r>
+            <a:br>
+              <a:rPr lang="ru-RU" smtClean="0">
+                <a:latin typeface="Consolas" panose="020B0609020204030204" pitchFamily="49" charset="0"/>
+              </a:rPr>
+            </a:br>
+            <a:r>
+              <a:rPr lang="ru-RU" smtClean="0">
+                <a:latin typeface="Consolas" panose="020B0609020204030204" pitchFamily="49" charset="0"/>
+              </a:rPr>
+              <a:t>  </a:t>
+            </a:r>
+            <a:r>
+              <a:rPr lang="en-US" smtClean="0">
+                <a:latin typeface="Consolas" panose="020B0609020204030204" pitchFamily="49" charset="0"/>
+              </a:rPr>
+              <a:t>open_file</a:t>
+            </a:r>
+            <a:r>
+              <a:rPr lang="en-US">
+                <a:latin typeface="Consolas" panose="020B0609020204030204" pitchFamily="49" charset="0"/>
+              </a:rPr>
+              <a:t>("nonexistent.file</a:t>
+            </a:r>
+            <a:r>
+              <a:rPr lang="en-US" smtClean="0">
+                <a:latin typeface="Consolas" panose="020B0609020204030204" pitchFamily="49" charset="0"/>
+              </a:rPr>
+              <a:t>");</a:t>
+            </a:r>
+            <a:br>
+              <a:rPr lang="en-US" smtClean="0">
+                <a:latin typeface="Consolas" panose="020B0609020204030204" pitchFamily="49" charset="0"/>
+              </a:rPr>
+            </a:br>
+            <a:r>
+              <a:rPr lang="en-US" smtClean="0">
+                <a:latin typeface="Consolas" panose="020B0609020204030204" pitchFamily="49" charset="0"/>
+              </a:rPr>
+              <a:t>} </a:t>
+            </a:r>
+            <a:r>
+              <a:rPr lang="en-US">
+                <a:latin typeface="Consolas" panose="020B0609020204030204" pitchFamily="49" charset="0"/>
+              </a:rPr>
+              <a:t>catch(...) </a:t>
+            </a:r>
+            <a:r>
+              <a:rPr lang="en-US" smtClean="0">
+                <a:latin typeface="Consolas" panose="020B0609020204030204" pitchFamily="49" charset="0"/>
+              </a:rPr>
+              <a:t>{</a:t>
+            </a:r>
+            <a:br>
+              <a:rPr lang="en-US" smtClean="0">
+                <a:latin typeface="Consolas" panose="020B0609020204030204" pitchFamily="49" charset="0"/>
+              </a:rPr>
+            </a:br>
+            <a:r>
+              <a:rPr lang="en-US" smtClean="0">
+                <a:latin typeface="Consolas" panose="020B0609020204030204" pitchFamily="49" charset="0"/>
+              </a:rPr>
+              <a:t>  </a:t>
+            </a:r>
+            <a:r>
+              <a:rPr lang="en-US" smtClean="0">
+                <a:solidFill>
+                  <a:srgbClr val="0000FF"/>
+                </a:solidFill>
+                <a:latin typeface="Consolas" panose="020B0609020204030204" pitchFamily="49" charset="0"/>
+              </a:rPr>
+              <a:t>std::throw_with_nested</a:t>
+            </a:r>
+            <a:r>
+              <a:rPr lang="en-US" smtClean="0">
+                <a:latin typeface="Consolas" panose="020B0609020204030204" pitchFamily="49" charset="0"/>
+              </a:rPr>
+              <a:t>(runtime_error</a:t>
+            </a:r>
+            <a:r>
+              <a:rPr lang="en-US">
+                <a:latin typeface="Consolas" panose="020B0609020204030204" pitchFamily="49" charset="0"/>
+              </a:rPr>
+              <a:t>("run() failed</a:t>
+            </a:r>
+            <a:r>
+              <a:rPr lang="en-US" smtClean="0">
+                <a:latin typeface="Consolas" panose="020B0609020204030204" pitchFamily="49" charset="0"/>
+              </a:rPr>
+              <a:t>"));</a:t>
+            </a:r>
+            <a:br>
+              <a:rPr lang="en-US" smtClean="0">
+                <a:latin typeface="Consolas" panose="020B0609020204030204" pitchFamily="49" charset="0"/>
+              </a:rPr>
+            </a:br>
+            <a:r>
+              <a:rPr lang="en-US" smtClean="0">
+                <a:latin typeface="Consolas" panose="020B0609020204030204" pitchFamily="49" charset="0"/>
+              </a:rPr>
+              <a:t>}</a:t>
+            </a:r>
+          </a:p>
+          <a:p>
+            <a:pPr marL="45720" indent="0">
+              <a:buNone/>
+            </a:pPr>
+            <a:r>
+              <a:rPr lang="en-US" smtClean="0">
+                <a:latin typeface="Consolas" panose="020B0609020204030204" pitchFamily="49" charset="0"/>
+              </a:rPr>
+              <a:t>// </a:t>
+            </a:r>
+            <a:r>
+              <a:rPr lang="ru-RU" smtClean="0">
+                <a:latin typeface="Consolas" panose="020B0609020204030204" pitchFamily="49" charset="0"/>
+              </a:rPr>
+              <a:t>где-то дальше:</a:t>
+            </a:r>
+            <a:endParaRPr lang="en-US">
+              <a:latin typeface="Consolas" panose="020B0609020204030204" pitchFamily="49" charset="0"/>
+            </a:endParaRPr>
+          </a:p>
+          <a:p>
+            <a:pPr marL="45720" indent="0">
+              <a:buNone/>
+            </a:pPr>
+            <a:r>
+              <a:rPr lang="en-US">
+                <a:latin typeface="Consolas" panose="020B0609020204030204" pitchFamily="49" charset="0"/>
+              </a:rPr>
+              <a:t>catch(runtime_error &amp;e</a:t>
+            </a:r>
+            <a:r>
+              <a:rPr lang="en-US" smtClean="0">
+                <a:latin typeface="Consolas" panose="020B0609020204030204" pitchFamily="49" charset="0"/>
+              </a:rPr>
+              <a:t>)</a:t>
+            </a:r>
+            <a:r>
+              <a:rPr lang="ru-RU" smtClean="0">
+                <a:latin typeface="Consolas" panose="020B0609020204030204" pitchFamily="49" charset="0"/>
+              </a:rPr>
+              <a:t> </a:t>
+            </a:r>
+            <a:r>
+              <a:rPr lang="en-US" smtClean="0">
+                <a:latin typeface="Consolas" panose="020B0609020204030204" pitchFamily="49" charset="0"/>
+              </a:rPr>
+              <a:t>{</a:t>
+            </a:r>
+            <a:r>
+              <a:rPr lang="ru-RU" smtClean="0">
+                <a:latin typeface="Consolas" panose="020B0609020204030204" pitchFamily="49" charset="0"/>
+              </a:rPr>
+              <a:t/>
+            </a:r>
+            <a:br>
+              <a:rPr lang="ru-RU" smtClean="0">
+                <a:latin typeface="Consolas" panose="020B0609020204030204" pitchFamily="49" charset="0"/>
+              </a:rPr>
+            </a:br>
+            <a:r>
+              <a:rPr lang="en-US" smtClean="0">
+                <a:latin typeface="Consolas" panose="020B0609020204030204" pitchFamily="49" charset="0"/>
+              </a:rPr>
+              <a:t>  cout &lt;&lt; e.what() &lt;&lt; endl;</a:t>
+            </a:r>
+            <a:br>
+              <a:rPr lang="en-US" smtClean="0">
+                <a:latin typeface="Consolas" panose="020B0609020204030204" pitchFamily="49" charset="0"/>
+              </a:rPr>
+            </a:br>
+            <a:r>
+              <a:rPr lang="en-US" smtClean="0">
+                <a:latin typeface="Consolas" panose="020B0609020204030204" pitchFamily="49" charset="0"/>
+              </a:rPr>
+              <a:t>  </a:t>
+            </a:r>
+            <a:r>
+              <a:rPr lang="en-US">
+                <a:solidFill>
+                  <a:srgbClr val="0000FF"/>
+                </a:solidFill>
+                <a:latin typeface="Consolas" panose="020B0609020204030204" pitchFamily="49" charset="0"/>
+              </a:rPr>
+              <a:t>std</a:t>
+            </a:r>
+            <a:r>
+              <a:rPr lang="en-US" smtClean="0">
+                <a:solidFill>
+                  <a:srgbClr val="0000FF"/>
+                </a:solidFill>
+                <a:latin typeface="Consolas" panose="020B0609020204030204" pitchFamily="49" charset="0"/>
+              </a:rPr>
+              <a:t>::rethrow_if_nested</a:t>
+            </a:r>
+            <a:r>
+              <a:rPr lang="en-US" smtClean="0">
+                <a:latin typeface="Consolas" panose="020B0609020204030204" pitchFamily="49" charset="0"/>
+              </a:rPr>
+              <a:t>(e);</a:t>
+            </a:r>
+            <a:r>
+              <a:rPr lang="ru-RU" smtClean="0">
+                <a:latin typeface="Consolas" panose="020B0609020204030204" pitchFamily="49" charset="0"/>
+              </a:rPr>
+              <a:t/>
+            </a:r>
+            <a:br>
+              <a:rPr lang="ru-RU" smtClean="0">
+                <a:latin typeface="Consolas" panose="020B0609020204030204" pitchFamily="49" charset="0"/>
+              </a:rPr>
+            </a:br>
+            <a:r>
+              <a:rPr lang="en-US" smtClean="0">
+                <a:latin typeface="Consolas" panose="020B0609020204030204" pitchFamily="49" charset="0"/>
+              </a:rPr>
+              <a:t>}</a:t>
+            </a:r>
+            <a:endParaRPr lang="en-US">
+              <a:latin typeface="Consolas" panose="020B0609020204030204" pitchFamily="49" charset="0"/>
+            </a:endParaRPr>
           </a:p>
         </p:txBody>
       </p:sp>
     </p:spTree>
     <p:extLst>
       <p:ext uri="{BB962C8B-B14F-4D97-AF65-F5344CB8AC3E}">
-        <p14:creationId xmlns:p14="http://schemas.microsoft.com/office/powerpoint/2010/main" val="3419024449"/>
+        <p14:creationId xmlns:p14="http://schemas.microsoft.com/office/powerpoint/2010/main" val="2684082227"/>
       </p:ext>
     </p:extLst>
   </p:cSld>
@@ -4549,7 +4788,7 @@
           <a:p>
             <a:r>
               <a:rPr lang="ru-RU" smtClean="0"/>
-              <a:t>Идёт ли размотка стека?</a:t>
+              <a:t>Обсуждение</a:t>
             </a:r>
             <a:endParaRPr lang="en-US"/>
           </a:p>
@@ -4572,213 +4811,16 @@
           <a:p>
             <a:r>
               <a:rPr lang="ru-RU" smtClean="0"/>
-              <a:t>Деструктор это уникальная функция, которая может быть вызвана двумя способами: обычным способом при окончании жизни объекта или при размотке стека.</a:t>
-            </a:r>
-          </a:p>
-          <a:p>
-            <a:r>
-              <a:rPr lang="ru-RU" smtClean="0"/>
-              <a:t>Чтобы определить идёт ли размотка стека, существует функция </a:t>
-            </a:r>
-            <a:r>
-              <a:rPr lang="en-US" smtClean="0"/>
-              <a:t>uncaught_exception</a:t>
-            </a:r>
-          </a:p>
-          <a:p>
-            <a:pPr marL="45720" indent="0">
-              <a:buNone/>
-            </a:pPr>
-            <a:r>
-              <a:rPr lang="en-US">
-                <a:latin typeface="Consolas" panose="020B0609020204030204" pitchFamily="49" charset="0"/>
-              </a:rPr>
-              <a:t>T::~T</a:t>
-            </a:r>
-            <a:r>
-              <a:rPr lang="en-US">
-                <a:latin typeface="Consolas" panose="020B0609020204030204" pitchFamily="49" charset="0"/>
-              </a:rPr>
-              <a:t>() </a:t>
-            </a:r>
-            <a:r>
-              <a:rPr lang="en-US" smtClean="0">
-                <a:latin typeface="Consolas" panose="020B0609020204030204" pitchFamily="49" charset="0"/>
-              </a:rPr>
-              <a:t>{</a:t>
-            </a:r>
-            <a:br>
-              <a:rPr lang="en-US" smtClean="0">
-                <a:latin typeface="Consolas" panose="020B0609020204030204" pitchFamily="49" charset="0"/>
-              </a:rPr>
-            </a:br>
-            <a:r>
-              <a:rPr lang="ru-RU" smtClean="0">
-                <a:latin typeface="Consolas" panose="020B0609020204030204" pitchFamily="49" charset="0"/>
-              </a:rPr>
-              <a:t>  </a:t>
-            </a:r>
-            <a:r>
-              <a:rPr lang="en-US" smtClean="0">
-                <a:latin typeface="Consolas" panose="020B0609020204030204" pitchFamily="49" charset="0"/>
-              </a:rPr>
-              <a:t>if</a:t>
-            </a:r>
-            <a:r>
-              <a:rPr lang="ru-RU" smtClean="0">
-                <a:latin typeface="Consolas" panose="020B0609020204030204" pitchFamily="49" charset="0"/>
-              </a:rPr>
-              <a:t> </a:t>
-            </a:r>
-            <a:r>
-              <a:rPr lang="en-US" smtClean="0">
-                <a:latin typeface="Consolas" panose="020B0609020204030204" pitchFamily="49" charset="0"/>
-              </a:rPr>
-              <a:t>(!</a:t>
-            </a:r>
-            <a:r>
-              <a:rPr lang="en-US">
-                <a:latin typeface="Consolas" panose="020B0609020204030204" pitchFamily="49" charset="0"/>
-              </a:rPr>
-              <a:t>std::</a:t>
-            </a:r>
-            <a:r>
-              <a:rPr lang="en-US">
-                <a:latin typeface="Consolas" panose="020B0609020204030204" pitchFamily="49" charset="0"/>
-              </a:rPr>
-              <a:t>uncaught_exception</a:t>
-            </a:r>
-            <a:r>
-              <a:rPr lang="en-US" smtClean="0">
-                <a:latin typeface="Consolas" panose="020B0609020204030204" pitchFamily="49" charset="0"/>
-              </a:rPr>
-              <a:t>()) {</a:t>
-            </a:r>
-            <a:br>
-              <a:rPr lang="en-US" smtClean="0">
-                <a:latin typeface="Consolas" panose="020B0609020204030204" pitchFamily="49" charset="0"/>
-              </a:rPr>
-            </a:br>
-            <a:r>
-              <a:rPr lang="en-US" smtClean="0">
-                <a:latin typeface="Consolas" panose="020B0609020204030204" pitchFamily="49" charset="0"/>
-              </a:rPr>
-              <a:t>  </a:t>
-            </a:r>
-            <a:r>
-              <a:rPr lang="ru-RU" smtClean="0">
-                <a:latin typeface="Consolas" panose="020B0609020204030204" pitchFamily="49" charset="0"/>
-              </a:rPr>
-              <a:t>  </a:t>
-            </a:r>
-            <a:r>
-              <a:rPr lang="en-US" smtClean="0">
-                <a:latin typeface="Consolas" panose="020B0609020204030204" pitchFamily="49" charset="0"/>
-              </a:rPr>
-              <a:t>// </a:t>
-            </a:r>
-            <a:r>
-              <a:rPr lang="ru-RU" smtClean="0">
-                <a:latin typeface="Consolas" panose="020B0609020204030204" pitchFamily="49" charset="0"/>
-              </a:rPr>
-              <a:t>обычный вызов</a:t>
-            </a:r>
-            <a:br>
-              <a:rPr lang="ru-RU" smtClean="0">
-                <a:latin typeface="Consolas" panose="020B0609020204030204" pitchFamily="49" charset="0"/>
-              </a:rPr>
-            </a:br>
-            <a:r>
-              <a:rPr lang="ru-RU" smtClean="0">
-                <a:latin typeface="Consolas" panose="020B0609020204030204" pitchFamily="49" charset="0"/>
-              </a:rPr>
-              <a:t>  </a:t>
-            </a:r>
-            <a:r>
-              <a:rPr lang="en-US" smtClean="0">
-                <a:latin typeface="Consolas" panose="020B0609020204030204" pitchFamily="49" charset="0"/>
-              </a:rPr>
-              <a:t>} </a:t>
-            </a:r>
-            <a:r>
-              <a:rPr lang="en-US">
-                <a:latin typeface="Consolas" panose="020B0609020204030204" pitchFamily="49" charset="0"/>
-              </a:rPr>
-              <a:t>else </a:t>
-            </a:r>
-            <a:r>
-              <a:rPr lang="en-US" smtClean="0">
-                <a:latin typeface="Consolas" panose="020B0609020204030204" pitchFamily="49" charset="0"/>
-              </a:rPr>
-              <a:t>{</a:t>
-            </a:r>
-            <a:r>
-              <a:rPr lang="ru-RU" smtClean="0">
-                <a:latin typeface="Consolas" panose="020B0609020204030204" pitchFamily="49" charset="0"/>
-              </a:rPr>
-              <a:t/>
-            </a:r>
-            <a:br>
-              <a:rPr lang="ru-RU" smtClean="0">
-                <a:latin typeface="Consolas" panose="020B0609020204030204" pitchFamily="49" charset="0"/>
-              </a:rPr>
-            </a:br>
-            <a:r>
-              <a:rPr lang="en-US" smtClean="0">
-                <a:latin typeface="Consolas" panose="020B0609020204030204" pitchFamily="49" charset="0"/>
-              </a:rPr>
-              <a:t>    // </a:t>
-            </a:r>
-            <a:r>
-              <a:rPr lang="ru-RU" smtClean="0">
-                <a:latin typeface="Consolas" panose="020B0609020204030204" pitchFamily="49" charset="0"/>
-              </a:rPr>
-              <a:t>идёт размотка стека</a:t>
-            </a:r>
-            <a:br>
-              <a:rPr lang="ru-RU" smtClean="0">
-                <a:latin typeface="Consolas" panose="020B0609020204030204" pitchFamily="49" charset="0"/>
-              </a:rPr>
-            </a:br>
-            <a:r>
-              <a:rPr lang="ru-RU" smtClean="0">
-                <a:latin typeface="Consolas" panose="020B0609020204030204" pitchFamily="49" charset="0"/>
-              </a:rPr>
-              <a:t>  </a:t>
-            </a:r>
-            <a:r>
-              <a:rPr lang="en-US" smtClean="0">
-                <a:latin typeface="Consolas" panose="020B0609020204030204" pitchFamily="49" charset="0"/>
-              </a:rPr>
-              <a:t>}</a:t>
-            </a:r>
-            <a:r>
-              <a:rPr lang="ru-RU" smtClean="0">
-                <a:latin typeface="Consolas" panose="020B0609020204030204" pitchFamily="49" charset="0"/>
-              </a:rPr>
-              <a:t/>
-            </a:r>
-            <a:br>
-              <a:rPr lang="ru-RU" smtClean="0">
-                <a:latin typeface="Consolas" panose="020B0609020204030204" pitchFamily="49" charset="0"/>
-              </a:rPr>
-            </a:br>
-            <a:r>
-              <a:rPr lang="en-US" smtClean="0">
-                <a:latin typeface="Consolas" panose="020B0609020204030204" pitchFamily="49" charset="0"/>
-              </a:rPr>
-              <a:t>}</a:t>
-            </a:r>
-            <a:endParaRPr lang="en-US">
-              <a:latin typeface="Consolas" panose="020B0609020204030204" pitchFamily="49" charset="0"/>
-            </a:endParaRPr>
+              <a:t>Видите ли вы нетривиальные применения этой техники?</a:t>
+            </a:r>
+            <a:endParaRPr lang="en-US"/>
           </a:p>
         </p:txBody>
       </p:sp>
     </p:spTree>
     <p:extLst>
       <p:ext uri="{BB962C8B-B14F-4D97-AF65-F5344CB8AC3E}">
-        <p14:creationId xmlns:p14="http://schemas.microsoft.com/office/powerpoint/2010/main" val="1352401273"/>
+        <p14:creationId xmlns:p14="http://schemas.microsoft.com/office/powerpoint/2010/main" val="3419024449"/>
       </p:ext>
     </p:extLst>
   </p:cSld>
@@ -4829,6 +4871,274 @@
           <a:p>
             <a:r>
               <a:rPr lang="ru-RU" smtClean="0"/>
+              <a:t>Идёт ли размотка стека?</a:t>
+            </a:r>
+            <a:endParaRPr lang="en-US"/>
+          </a:p>
+        </p:txBody>
+      </p:sp>
+      <p:sp>
+        <p:nvSpPr>
+          <p:cNvPr id="3" name="Content Placeholder 2"/>
+          <p:cNvSpPr>
+            <a:spLocks noGrp="1"/>
+          </p:cNvSpPr>
+          <p:nvPr>
+            <p:ph idx="1"/>
+          </p:nvPr>
+        </p:nvSpPr>
+        <p:spPr/>
+        <p:txBody>
+          <a:bodyPr/>
+          <a:lstStyle/>
+          <a:p>
+            <a:r>
+              <a:rPr lang="ru-RU" smtClean="0"/>
+              <a:t>Деструктор это уникальная функция, которая может быть вызвана двумя способами: обычным способом при окончании жизни объекта или при размотке стека.</a:t>
+            </a:r>
+          </a:p>
+          <a:p>
+            <a:r>
+              <a:rPr lang="ru-RU" smtClean="0"/>
+              <a:t>Чтобы определить идёт ли размотка стека, существует функция </a:t>
+            </a:r>
+            <a:r>
+              <a:rPr lang="en-US" smtClean="0"/>
+              <a:t>uncaught_exception</a:t>
+            </a:r>
+          </a:p>
+          <a:p>
+            <a:pPr marL="45720" indent="0">
+              <a:buNone/>
+            </a:pPr>
+            <a:r>
+              <a:rPr lang="en-US">
+                <a:latin typeface="Consolas" panose="020B0609020204030204" pitchFamily="49" charset="0"/>
+              </a:rPr>
+              <a:t>T::~T() </a:t>
+            </a:r>
+            <a:r>
+              <a:rPr lang="en-US" smtClean="0">
+                <a:latin typeface="Consolas" panose="020B0609020204030204" pitchFamily="49" charset="0"/>
+              </a:rPr>
+              <a:t>{</a:t>
+            </a:r>
+            <a:br>
+              <a:rPr lang="en-US" smtClean="0">
+                <a:latin typeface="Consolas" panose="020B0609020204030204" pitchFamily="49" charset="0"/>
+              </a:rPr>
+            </a:br>
+            <a:r>
+              <a:rPr lang="ru-RU" smtClean="0">
+                <a:latin typeface="Consolas" panose="020B0609020204030204" pitchFamily="49" charset="0"/>
+              </a:rPr>
+              <a:t>  </a:t>
+            </a:r>
+            <a:r>
+              <a:rPr lang="en-US" smtClean="0">
+                <a:latin typeface="Consolas" panose="020B0609020204030204" pitchFamily="49" charset="0"/>
+              </a:rPr>
+              <a:t>if</a:t>
+            </a:r>
+            <a:r>
+              <a:rPr lang="ru-RU" smtClean="0">
+                <a:latin typeface="Consolas" panose="020B0609020204030204" pitchFamily="49" charset="0"/>
+              </a:rPr>
+              <a:t> </a:t>
+            </a:r>
+            <a:r>
+              <a:rPr lang="en-US" smtClean="0">
+                <a:latin typeface="Consolas" panose="020B0609020204030204" pitchFamily="49" charset="0"/>
+              </a:rPr>
+              <a:t>(!</a:t>
+            </a:r>
+            <a:r>
+              <a:rPr lang="en-US">
+                <a:latin typeface="Consolas" panose="020B0609020204030204" pitchFamily="49" charset="0"/>
+              </a:rPr>
+              <a:t>std::uncaught_exception</a:t>
+            </a:r>
+            <a:r>
+              <a:rPr lang="en-US" smtClean="0">
+                <a:latin typeface="Consolas" panose="020B0609020204030204" pitchFamily="49" charset="0"/>
+              </a:rPr>
+              <a:t>()) {</a:t>
+            </a:r>
+            <a:br>
+              <a:rPr lang="en-US" smtClean="0">
+                <a:latin typeface="Consolas" panose="020B0609020204030204" pitchFamily="49" charset="0"/>
+              </a:rPr>
+            </a:br>
+            <a:r>
+              <a:rPr lang="en-US" smtClean="0">
+                <a:latin typeface="Consolas" panose="020B0609020204030204" pitchFamily="49" charset="0"/>
+              </a:rPr>
+              <a:t>  </a:t>
+            </a:r>
+            <a:r>
+              <a:rPr lang="ru-RU" smtClean="0">
+                <a:latin typeface="Consolas" panose="020B0609020204030204" pitchFamily="49" charset="0"/>
+              </a:rPr>
+              <a:t>  </a:t>
+            </a:r>
+            <a:r>
+              <a:rPr lang="en-US" smtClean="0">
+                <a:latin typeface="Consolas" panose="020B0609020204030204" pitchFamily="49" charset="0"/>
+              </a:rPr>
+              <a:t>// </a:t>
+            </a:r>
+            <a:r>
+              <a:rPr lang="ru-RU" smtClean="0">
+                <a:latin typeface="Consolas" panose="020B0609020204030204" pitchFamily="49" charset="0"/>
+              </a:rPr>
+              <a:t>обычный вызов</a:t>
+            </a:r>
+            <a:br>
+              <a:rPr lang="ru-RU" smtClean="0">
+                <a:latin typeface="Consolas" panose="020B0609020204030204" pitchFamily="49" charset="0"/>
+              </a:rPr>
+            </a:br>
+            <a:r>
+              <a:rPr lang="ru-RU" smtClean="0">
+                <a:latin typeface="Consolas" panose="020B0609020204030204" pitchFamily="49" charset="0"/>
+              </a:rPr>
+              <a:t>  </a:t>
+            </a:r>
+            <a:r>
+              <a:rPr lang="en-US" smtClean="0">
+                <a:latin typeface="Consolas" panose="020B0609020204030204" pitchFamily="49" charset="0"/>
+              </a:rPr>
+              <a:t>} </a:t>
+            </a:r>
+            <a:r>
+              <a:rPr lang="en-US">
+                <a:latin typeface="Consolas" panose="020B0609020204030204" pitchFamily="49" charset="0"/>
+              </a:rPr>
+              <a:t>else </a:t>
+            </a:r>
+            <a:r>
+              <a:rPr lang="en-US" smtClean="0">
+                <a:latin typeface="Consolas" panose="020B0609020204030204" pitchFamily="49" charset="0"/>
+              </a:rPr>
+              <a:t>{</a:t>
+            </a:r>
+            <a:r>
+              <a:rPr lang="ru-RU" smtClean="0">
+                <a:latin typeface="Consolas" panose="020B0609020204030204" pitchFamily="49" charset="0"/>
+              </a:rPr>
+              <a:t/>
+            </a:r>
+            <a:br>
+              <a:rPr lang="ru-RU" smtClean="0">
+                <a:latin typeface="Consolas" panose="020B0609020204030204" pitchFamily="49" charset="0"/>
+              </a:rPr>
+            </a:br>
+            <a:r>
+              <a:rPr lang="en-US" smtClean="0">
+                <a:latin typeface="Consolas" panose="020B0609020204030204" pitchFamily="49" charset="0"/>
+              </a:rPr>
+              <a:t>    // </a:t>
+            </a:r>
+            <a:r>
+              <a:rPr lang="ru-RU" smtClean="0">
+                <a:latin typeface="Consolas" panose="020B0609020204030204" pitchFamily="49" charset="0"/>
+              </a:rPr>
+              <a:t>идёт размотка стека</a:t>
+            </a:r>
+            <a:br>
+              <a:rPr lang="ru-RU" smtClean="0">
+                <a:latin typeface="Consolas" panose="020B0609020204030204" pitchFamily="49" charset="0"/>
+              </a:rPr>
+            </a:br>
+            <a:r>
+              <a:rPr lang="ru-RU" smtClean="0">
+                <a:latin typeface="Consolas" panose="020B0609020204030204" pitchFamily="49" charset="0"/>
+              </a:rPr>
+              <a:t>  </a:t>
+            </a:r>
+            <a:r>
+              <a:rPr lang="en-US" smtClean="0">
+                <a:latin typeface="Consolas" panose="020B0609020204030204" pitchFamily="49" charset="0"/>
+              </a:rPr>
+              <a:t>}</a:t>
+            </a:r>
+            <a:r>
+              <a:rPr lang="ru-RU" smtClean="0">
+                <a:latin typeface="Consolas" panose="020B0609020204030204" pitchFamily="49" charset="0"/>
+              </a:rPr>
+              <a:t/>
+            </a:r>
+            <a:br>
+              <a:rPr lang="ru-RU" smtClean="0">
+                <a:latin typeface="Consolas" panose="020B0609020204030204" pitchFamily="49" charset="0"/>
+              </a:rPr>
+            </a:br>
+            <a:r>
+              <a:rPr lang="en-US" smtClean="0">
+                <a:latin typeface="Consolas" panose="020B0609020204030204" pitchFamily="49" charset="0"/>
+              </a:rPr>
+              <a:t>}</a:t>
+            </a:r>
+            <a:endParaRPr lang="en-US">
+              <a:latin typeface="Consolas" panose="020B0609020204030204" pitchFamily="49" charset="0"/>
+            </a:endParaRPr>
+          </a:p>
+        </p:txBody>
+      </p:sp>
+    </p:spTree>
+    <p:extLst>
+      <p:ext uri="{BB962C8B-B14F-4D97-AF65-F5344CB8AC3E}">
+        <p14:creationId xmlns:p14="http://schemas.microsoft.com/office/powerpoint/2010/main" val="1352401273"/>
+      </p:ext>
+    </p:extLst>
+  </p:cSld>
+  <p:clrMapOvr>
+    <a:masterClrMapping/>
+  </p:clrMapOvr>
+  <p:timing>
+    <p:tnLst>
+      <p:par>
+        <p:cTn id="1" dur="indefinite" restart="never" nodeType="tmRoot"/>
+      </p:par>
+    </p:tnLst>
+  </p:timing>
+</p:sld>
+</file>
+
+<file path=ppt/slides/slide103.xml><?xml version="1.0" encoding="utf-8"?>
+<p:sld xmlns:a="http://schemas.openxmlformats.org/drawingml/2006/main" xmlns:r="http://schemas.openxmlformats.org/officeDocument/2006/relationships" xmlns:p="http://schemas.openxmlformats.org/presentationml/2006/main">
+  <p:cSld>
+    <p:spTree>
+      <p:nvGrpSpPr>
+        <p:cNvPr id="1" name=""/>
+        <p:cNvGrpSpPr/>
+        <p:nvPr/>
+      </p:nvGrpSpPr>
+      <p:grpSpPr>
+        <a:xfrm>
+          <a:off x="0" y="0"/>
+          <a:ext cx="0" cy="0"/>
+          <a:chOff x="0" y="0"/>
+          <a:chExt cx="0" cy="0"/>
+        </a:xfrm>
+      </p:grpSpPr>
+      <p:sp>
+        <p:nvSpPr>
+          <p:cNvPr id="2" name="Title 1"/>
+          <p:cNvSpPr>
+            <a:spLocks noGrp="1"/>
+          </p:cNvSpPr>
+          <p:nvPr>
+            <p:ph type="title"/>
+          </p:nvPr>
+        </p:nvSpPr>
+        <p:spPr/>
+        <p:txBody>
+          <a:bodyPr/>
+          <a:lstStyle/>
+          <a:p>
+            <a:r>
+              <a:rPr lang="ru-RU" smtClean="0"/>
               <a:t>Обсуждение</a:t>
             </a:r>
             <a:endParaRPr lang="en-US"/>
@@ -4882,7 +5192,7 @@
 </p:sld>
 </file>
 
-<file path=ppt/slides/slide103.xml><?xml version="1.0" encoding="utf-8"?>
+<file path=ppt/slides/slide104.xml><?xml version="1.0" encoding="utf-8"?>
 <p:sld xmlns:a="http://schemas.openxmlformats.org/drawingml/2006/main" xmlns:r="http://schemas.openxmlformats.org/officeDocument/2006/relationships" xmlns:p="http://schemas.openxmlformats.org/presentationml/2006/main">
   <p:cSld>
     <p:spTree>
@@ -8355,7 +8665,6 @@
               <a:rPr lang="ru-RU" sz="4800" smtClean="0"/>
               <a:t>Жизнь без исключений</a:t>
             </a:r>
-            <a:endParaRPr lang="ru-RU" sz="4800" smtClean="0"/>
           </a:p>
         </p:txBody>
       </p:sp>
@@ -12719,7 +13028,7 @@
           <a:p>
             <a:r>
               <a:rPr lang="ru-RU" smtClean="0"/>
-              <a:t>Почти хороший код</a:t>
+              <a:t>Используем стандартные классы</a:t>
             </a:r>
             <a:endParaRPr lang="en-US"/>
           </a:p>
@@ -12742,8 +13051,9 @@
           <a:p>
             <a:r>
               <a:rPr lang="ru-RU" smtClean="0"/>
-              <a:t>Какие проблемы вы видите в этом коде?</a:t>
-            </a:r>
+              <a:t>Наследование от стандартного класса вводит расширение в иерархию</a:t>
+            </a:r>
+            <a:endParaRPr lang="ru-RU" smtClean="0"/>
           </a:p>
           <a:p>
             <a:pPr marL="0" indent="0">
@@ -12759,7 +13069,22 @@
               <a:rPr lang="en-US" smtClean="0">
                 <a:latin typeface="Consolas" panose="020B0609020204030204" pitchFamily="49" charset="0"/>
               </a:rPr>
-              <a:t>MathErr : public runtime_error {</a:t>
+              <a:t>MathErr : </a:t>
+            </a:r>
+            <a:r>
+              <a:rPr lang="en-US" smtClean="0">
+                <a:solidFill>
+                  <a:srgbClr val="0000FF"/>
+                </a:solidFill>
+                <a:latin typeface="Consolas" panose="020B0609020204030204" pitchFamily="49" charset="0"/>
+              </a:rPr>
+              <a:t>public runtime_error</a:t>
+            </a:r>
+            <a:r>
+              <a:rPr lang="en-US" smtClean="0">
+                <a:latin typeface="Consolas" panose="020B0609020204030204" pitchFamily="49" charset="0"/>
+              </a:rPr>
+              <a:t> {</a:t>
             </a:r>
             <a:r>
               <a:rPr lang="ru-RU" smtClean="0">
@@ -12961,9 +13286,17 @@
               </a:rPr>
               <a:t>}</a:t>
             </a:r>
-            <a:endParaRPr lang="ru-RU">
+            <a:endParaRPr lang="ru-RU" smtClean="0">
               <a:latin typeface="Consolas" panose="020B0609020204030204" pitchFamily="49" charset="0"/>
             </a:endParaRPr>
+          </a:p>
+          <a:p>
+            <a:pPr marL="342900" indent="-342900"/>
+            <a:r>
+              <a:rPr lang="ru-RU" smtClean="0"/>
+              <a:t>Впрочем, у наследования есть и тёмные стороны...</a:t>
+            </a:r>
+            <a:endParaRPr lang="ru-RU"/>
           </a:p>
         </p:txBody>
       </p:sp>
@@ -14764,7 +15097,6 @@
               <a:rPr lang="ru-RU" sz="4800" smtClean="0"/>
               <a:t>Жизнь без исключений</a:t>
             </a:r>
-            <a:endParaRPr lang="ru-RU" sz="4800" smtClean="0"/>
           </a:p>
         </p:txBody>
       </p:sp>
@@ -16100,16 +16432,28 @@
               <a:t>хотя прекрасные книги Саттера </a:t>
             </a:r>
             <a:r>
+              <a:rPr lang="en-US" sz="2800" smtClean="0">
+                <a:latin typeface="Consolas" panose="020B0609020204030204" pitchFamily="49" charset="0"/>
+              </a:rPr>
+              <a:t>[5]</a:t>
+            </a:r>
+            <a:r>
               <a:rPr lang="en-US" sz="2800" smtClean="0"/>
-              <a:t>[5] </a:t>
+              <a:t> </a:t>
             </a:r>
             <a:r>
               <a:rPr lang="ru-RU" sz="2800" smtClean="0"/>
               <a:t>и </a:t>
             </a:r>
             <a:r>
+              <a:rPr lang="en-US" sz="2800" smtClean="0">
+                <a:latin typeface="Consolas" panose="020B0609020204030204" pitchFamily="49" charset="0"/>
+              </a:rPr>
+              <a:t>[6]</a:t>
+            </a:r>
+            <a:r>
               <a:rPr lang="en-US" sz="2800" smtClean="0"/>
-              <a:t>[6] </a:t>
+              <a:t> </a:t>
             </a:r>
             <a:r>
               <a:rPr lang="ru-RU" sz="2800" smtClean="0"/>
@@ -16924,54 +17268,30 @@
               <a:rPr lang="en-US" sz="2400" smtClean="0">
                 <a:latin typeface="Consolas" panose="020B0609020204030204" pitchFamily="49" charset="0"/>
               </a:rPr>
-              <a:t>safe_copy (</a:t>
+              <a:t>safe_copy (rhs.arr_, rhs.size_);</a:t>
+            </a:r>
+            <a:r>
+              <a:rPr lang="ru-RU" sz="2400">
+                <a:latin typeface="Consolas" panose="020B0609020204030204" pitchFamily="49" charset="0"/>
+              </a:rPr>
+              <a:t/>
+            </a:r>
+            <a:br>
+              <a:rPr lang="ru-RU" sz="2400">
+                <a:latin typeface="Consolas" panose="020B0609020204030204" pitchFamily="49" charset="0"/>
+              </a:rPr>
+            </a:br>
+            <a:r>
+              <a:rPr lang="en-US" sz="2400">
+                <a:latin typeface="Consolas" panose="020B0609020204030204" pitchFamily="49" charset="0"/>
+              </a:rPr>
+              <a:t>    size_ = </a:t>
             </a:r>
             <a:r>
               <a:rPr lang="en-US" sz="2400" smtClean="0">
                 <a:latin typeface="Consolas" panose="020B0609020204030204" pitchFamily="49" charset="0"/>
               </a:rPr>
-              <a:t>rhs</a:t>
-            </a:r>
-            <a:r>
-              <a:rPr lang="en-US" sz="2400" smtClean="0">
-                <a:latin typeface="Consolas" panose="020B0609020204030204" pitchFamily="49" charset="0"/>
-              </a:rPr>
-              <a:t>.arr_</a:t>
-            </a:r>
-            <a:r>
-              <a:rPr lang="en-US" sz="2400" smtClean="0">
-                <a:latin typeface="Consolas" panose="020B0609020204030204" pitchFamily="49" charset="0"/>
-              </a:rPr>
-              <a:t>, rhs.size_);</a:t>
-            </a:r>
-            <a:r>
-              <a:rPr lang="ru-RU" sz="2400">
-                <a:latin typeface="Consolas" panose="020B0609020204030204" pitchFamily="49" charset="0"/>
-              </a:rPr>
-              <a:t/>
-            </a:r>
-            <a:br>
-              <a:rPr lang="ru-RU" sz="2400">
-                <a:latin typeface="Consolas" panose="020B0609020204030204" pitchFamily="49" charset="0"/>
-              </a:rPr>
-            </a:br>
-            <a:r>
-              <a:rPr lang="en-US" sz="2400">
-                <a:latin typeface="Consolas" panose="020B0609020204030204" pitchFamily="49" charset="0"/>
-              </a:rPr>
-              <a:t>    size_ = </a:t>
-            </a:r>
-            <a:r>
-              <a:rPr lang="en-US" sz="2400" smtClean="0">
-                <a:latin typeface="Consolas" panose="020B0609020204030204" pitchFamily="49" charset="0"/>
-              </a:rPr>
-              <a:t>rhs.size_; </a:t>
-            </a:r>
-            <a:r>
-              <a:rPr lang="en-US" sz="2400" smtClean="0">
-                <a:latin typeface="Consolas" panose="020B0609020204030204" pitchFamily="49" charset="0"/>
-              </a:rPr>
-              <a:t>used_ = rhs.used_;</a:t>
+              <a:t>rhs.size_; used_ = rhs.used_;</a:t>
             </a:r>
             <a:r>
               <a:rPr lang="en-US" sz="2400">
@@ -20072,7 +20392,6 @@
               <a:rPr lang="ru-RU" sz="4800" smtClean="0"/>
               <a:t>Жизнь без исключений</a:t>
             </a:r>
-            <a:endParaRPr lang="ru-RU" sz="4800" smtClean="0"/>
           </a:p>
         </p:txBody>
       </p:sp>
@@ -21148,11 +21467,7 @@
             </a:r>
             <a:r>
               <a:rPr lang="en-US" smtClean="0"/>
-              <a:t>(Stepanov assignment</a:t>
-            </a:r>
-            <a:r>
-              <a:rPr lang="en-US" smtClean="0"/>
-              <a:t>)</a:t>
+              <a:t>(Stepanov assignment)</a:t>
             </a:r>
             <a:endParaRPr lang="en-US"/>
           </a:p>
@@ -21586,19 +21901,7 @@
               <a:rPr lang="en-US" smtClean="0">
                 <a:latin typeface="Consolas" panose="020B0609020204030204" pitchFamily="49" charset="0"/>
               </a:rPr>
-              <a:t>T </a:t>
-            </a:r>
-            <a:r>
-              <a:rPr lang="en-US" smtClean="0">
-                <a:latin typeface="Consolas" panose="020B0609020204030204" pitchFamily="49" charset="0"/>
-              </a:rPr>
-              <a:t>(forward&lt;Ts</a:t>
-            </a:r>
-            <a:r>
-              <a:rPr lang="en-US" smtClean="0">
-                <a:latin typeface="Consolas" panose="020B0609020204030204" pitchFamily="49" charset="0"/>
-              </a:rPr>
-              <a:t>&gt;(values)...);</a:t>
+              <a:t>T (forward&lt;Ts&gt;(values)...);</a:t>
             </a:r>
             <a:br>
               <a:rPr lang="en-US" smtClean="0">
@@ -22225,7 +22528,29 @@
               <a:rPr lang="en-US" smtClean="0">
                 <a:latin typeface="Consolas" panose="020B0609020204030204" pitchFamily="49" charset="0"/>
               </a:rPr>
-              <a:t>     } catch (...) { </a:t>
+              <a:t>     } </a:t>
+            </a:r>
+            <a:br>
+              <a:rPr lang="en-US" smtClean="0">
+                <a:latin typeface="Consolas" panose="020B0609020204030204" pitchFamily="49" charset="0"/>
+              </a:rPr>
+            </a:br>
+            <a:r>
+              <a:rPr lang="en-US" smtClean="0">
+                <a:latin typeface="Consolas" panose="020B0609020204030204" pitchFamily="49" charset="0"/>
+              </a:rPr>
+              <a:t>     catch (...) { </a:t>
+            </a:r>
+            <a:br>
+              <a:rPr lang="en-US" smtClean="0">
+                <a:latin typeface="Consolas" panose="020B0609020204030204" pitchFamily="49" charset="0"/>
+              </a:rPr>
+            </a:br>
+            <a:r>
+              <a:rPr lang="en-US" smtClean="0">
+                <a:latin typeface="Consolas" panose="020B0609020204030204" pitchFamily="49" charset="0"/>
+              </a:rPr>
+              <a:t>       </a:t>
             </a:r>
             <a:r>
               <a:rPr lang="ru-RU" smtClean="0">
@@ -22244,6 +22569,23 @@
                 <a:latin typeface="Consolas" panose="020B0609020204030204" pitchFamily="49" charset="0"/>
               </a:rPr>
               <a:t>? </a:t>
+            </a:r>
+            <a:br>
+              <a:rPr lang="en-US" smtClean="0">
+                <a:solidFill>
+                  <a:srgbClr val="FF0000"/>
+                </a:solidFill>
+                <a:latin typeface="Consolas" panose="020B0609020204030204" pitchFamily="49" charset="0"/>
+              </a:rPr>
+            </a:br>
+            <a:r>
+              <a:rPr lang="en-US" smtClean="0">
+                <a:solidFill>
+                  <a:srgbClr val="FF0000"/>
+                </a:solidFill>
+                <a:latin typeface="Consolas" panose="020B0609020204030204" pitchFamily="49" charset="0"/>
+              </a:rPr>
+              <a:t>     </a:t>
             </a:r>
             <a:r>
               <a:rPr lang="en-US" smtClean="0">
@@ -22361,7 +22703,7 @@
           <a:p>
             <a:r>
               <a:rPr lang="ru-RU" smtClean="0"/>
-              <a:t>По стандарту исключение, покинувшее деструктор, приводит к вызову </a:t>
+              <a:t>По стандарту исключение, покинувшее деструктор, если при этом остались необработанные исключения, приводит к вызову </a:t>
             </a:r>
             <a:r>
               <a:rPr lang="en-US" smtClean="0">
@@ -22550,13 +22892,7 @@
               <a:rPr lang="en-US" smtClean="0">
                 <a:latin typeface="Consolas" panose="020B0609020204030204" pitchFamily="49" charset="0"/>
               </a:rPr>
-              <a:t>       static_cast&lt;T</a:t>
-            </a:r>
-            <a:r>
-              <a:rPr lang="en-US" smtClean="0">
-                <a:latin typeface="Consolas" panose="020B0609020204030204" pitchFamily="49" charset="0"/>
-              </a:rPr>
-              <a:t>*&gt;(</a:t>
+              <a:t>       static_cast&lt;T*&gt;(</a:t>
             </a:r>
             <a:r>
               <a:rPr lang="en-US" smtClean="0">
@@ -22565,16 +22901,7 @@
                 </a:solidFill>
                 <a:latin typeface="Consolas" panose="020B0609020204030204" pitchFamily="49" charset="0"/>
               </a:rPr>
-              <a:t>::</a:t>
-            </a:r>
-            <a:r>
-              <a:rPr lang="en-US" smtClean="0">
-                <a:solidFill>
-                  <a:srgbClr val="0000FF"/>
-                </a:solidFill>
-                <a:latin typeface="Consolas" panose="020B0609020204030204" pitchFamily="49" charset="0"/>
-              </a:rPr>
-              <a:t>operator </a:t>
+              <a:t>::operator </a:t>
             </a:r>
             <a:r>
               <a:rPr lang="en-US">
@@ -23145,15 +23472,19 @@
           <a:p>
             <a:r>
               <a:rPr lang="ru-RU" smtClean="0"/>
-              <a:t>При проектировании </a:t>
+              <a:t>При </a:t>
+            </a:r>
+            <a:r>
+              <a:rPr lang="ru-RU" smtClean="0"/>
+              <a:t>проектировании</a:t>
             </a:r>
             <a:r>
               <a:rPr lang="en-US" smtClean="0"/>
-              <a:t>calb line </a:t>
-            </a:r>
-            <a:r>
-              <a:rPr lang="ru-RU" smtClean="0"/>
-              <a:t>это полезная идиома</a:t>
+              <a:t> </a:t>
+            </a:r>
+            <a:r>
+              <a:rPr lang="ru-RU" smtClean="0"/>
+              <a:t>очень полезно провести в уме эту линию</a:t>
             </a:r>
             <a:endParaRPr lang="en-US" smtClean="0"/>
           </a:p>
@@ -23584,11 +23915,7 @@
           <a:p>
             <a:r>
               <a:rPr lang="ru-RU" smtClean="0"/>
-              <a:t>Проектирование с использованием исключений в итоге позволяет упростить и улучшить код, структурируя его с чётким распределением </a:t>
-            </a:r>
-            <a:r>
-              <a:rPr lang="ru-RU" smtClean="0"/>
-              <a:t>ответственности</a:t>
+              <a:t>Проектирование с использованием исключений в итоге позволяет упростить и улучшить код, структурируя его с чётким распределением ответственности</a:t>
             </a:r>
             <a:endParaRPr lang="en-US" smtClean="0"/>
           </a:p>
@@ -24368,13 +24695,7 @@
               <a:rPr lang="en-US">
                 <a:latin typeface="Consolas" panose="020B0609020204030204" pitchFamily="49" charset="0"/>
               </a:rPr>
-              <a:t>shared_ptr&lt;T&gt;(</a:t>
-            </a:r>
-            <a:r>
-              <a:rPr lang="en-US">
-                <a:latin typeface="Consolas" panose="020B0609020204030204" pitchFamily="49" charset="0"/>
-              </a:rPr>
-              <a:t>new </a:t>
+              <a:t>shared_ptr&lt;T&gt;(new </a:t>
             </a:r>
             <a:r>
               <a:rPr lang="en-US" smtClean="0">
@@ -24883,7 +25204,6 @@
               <a:rPr lang="ru-RU" sz="4800" smtClean="0"/>
               <a:t>Жизнь без исключений</a:t>
             </a:r>
-            <a:endParaRPr lang="ru-RU" sz="4800" smtClean="0"/>
           </a:p>
         </p:txBody>
       </p:sp>
@@ -25417,25 +25737,7 @@
               <a:rPr lang="en-US" sz="2400" smtClean="0">
                 <a:latin typeface="Consolas" panose="020B0609020204030204" pitchFamily="49" charset="0"/>
               </a:rPr>
-              <a:t>error_code ec </a:t>
-            </a:r>
-            <a:r>
-              <a:rPr lang="en-US" sz="2400" smtClean="0">
-                <a:latin typeface="Consolas" panose="020B0609020204030204" pitchFamily="49" charset="0"/>
-              </a:rPr>
-              <a:t>{ MY_OUTOF_MEM, errc</a:t>
-            </a:r>
-            <a:r>
-              <a:rPr lang="en-US" sz="2400" smtClean="0">
-                <a:latin typeface="Consolas" panose="020B0609020204030204" pitchFamily="49" charset="0"/>
-              </a:rPr>
-              <a:t>::</a:t>
-            </a:r>
-            <a:r>
-              <a:rPr lang="en-US" sz="2400" smtClean="0">
-                <a:latin typeface="Consolas" panose="020B0609020204030204" pitchFamily="49" charset="0"/>
-              </a:rPr>
-              <a:t>not_enough_memory };</a:t>
+              <a:t>error_code ec { MY_OUTOF_MEM, errc::not_enough_memory };</a:t>
             </a:r>
             <a:endParaRPr lang="ru-RU" sz="2400" smtClean="0">
               <a:latin typeface="Consolas" panose="020B0609020204030204" pitchFamily="49" charset="0"/>
@@ -26563,11 +26865,7 @@
           <a:p>
             <a:r>
               <a:rPr lang="ru-RU" smtClean="0"/>
-              <a:t>Некоторые </a:t>
-            </a:r>
-            <a:r>
-              <a:rPr lang="ru-RU" smtClean="0"/>
-              <a:t>функции</a:t>
+              <a:t>Некоторые функции</a:t>
             </a:r>
             <a:r>
               <a:rPr lang="en-US" smtClean="0"/>
@@ -26577,7 +26875,6 @@
               <a:rPr lang="ru-RU" smtClean="0"/>
               <a:t>можно различить простыми определителями</a:t>
             </a:r>
-            <a:endParaRPr lang="ru-RU" smtClean="0"/>
           </a:p>
           <a:p>
             <a:pPr marL="0" indent="0">
@@ -27340,7 +27637,7 @@
           <a:p>
             <a:r>
               <a:rPr lang="ru-RU" smtClean="0"/>
-              <a:t>Литература</a:t>
+              <a:t>Новые идеи для обработки ошибок</a:t>
             </a:r>
             <a:endParaRPr lang="en-US"/>
           </a:p>
@@ -27356,166 +27653,253 @@
             <p:ph idx="1"/>
           </p:nvPr>
         </p:nvSpPr>
-        <p:spPr>
-          <a:xfrm>
-            <a:off x="1120000" y="1825624"/>
-            <a:ext cx="10643632" cy="4682267"/>
-          </a:xfrm>
-        </p:spPr>
+        <p:spPr/>
         <p:txBody>
-          <a:bodyPr>
-            <a:normAutofit/>
-          </a:bodyPr>
+          <a:bodyPr/>
           <a:lstStyle/>
           <a:p>
-            <a:pPr marL="514350" lvl="0" indent="-514350">
-              <a:buFont typeface="+mj-lt"/>
-              <a:buAutoNum type="arabicPeriod"/>
+            <a:r>
+              <a:rPr lang="ru-RU" smtClean="0"/>
+              <a:t>В новый стандарт предлагается обработка через </a:t>
+            </a:r>
+            <a:r>
+              <a:rPr lang="en-US" smtClean="0"/>
+              <a:t>Either</a:t>
+            </a:r>
+            <a:endParaRPr lang="ru-RU" smtClean="0"/>
+          </a:p>
+          <a:p>
+            <a:pPr marL="45720" indent="0">
+              <a:buNone/>
             </a:pPr>
             <a:r>
-              <a:rPr lang="en-US" sz="1800"/>
-              <a:t>ISO/IEC, "Information technology –</a:t>
-            </a:r>
-            <a:r>
-              <a:rPr lang="en-US" sz="1800" smtClean="0"/>
-              <a:t> </a:t>
-            </a:r>
-            <a:r>
-              <a:rPr lang="en-US" sz="1800"/>
-              <a:t>Programming languages – C++", ISO/IEC 14882:2014, 2014</a:t>
-            </a:r>
-          </a:p>
-          <a:p>
-            <a:pPr marL="514350" lvl="0" indent="-514350">
-              <a:buFont typeface="+mj-lt"/>
-              <a:buAutoNum type="arabicPeriod"/>
+              <a:rPr lang="en-US">
+                <a:latin typeface="Consolas" panose="020B0609020204030204" pitchFamily="49" charset="0"/>
+              </a:rPr>
+              <a:t>Either&lt;string, float&gt; sqrt(float x) </a:t>
+            </a:r>
+            <a:r>
+              <a:rPr lang="en-US" smtClean="0">
+                <a:latin typeface="Consolas" panose="020B0609020204030204" pitchFamily="49" charset="0"/>
+              </a:rPr>
+              <a:t>{</a:t>
+            </a:r>
+            <a:br>
+              <a:rPr lang="en-US" smtClean="0">
+                <a:latin typeface="Consolas" panose="020B0609020204030204" pitchFamily="49" charset="0"/>
+              </a:rPr>
+            </a:br>
+            <a:r>
+              <a:rPr lang="en-US" smtClean="0">
+                <a:latin typeface="Consolas" panose="020B0609020204030204" pitchFamily="49" charset="0"/>
+              </a:rPr>
+              <a:t>  </a:t>
+            </a:r>
+            <a:r>
+              <a:rPr lang="en-US">
+                <a:latin typeface="Consolas" panose="020B0609020204030204" pitchFamily="49" charset="0"/>
+              </a:rPr>
+              <a:t>if (x &lt; 0) </a:t>
+            </a:r>
+            <a:r>
+              <a:rPr lang="en-US" smtClean="0">
+                <a:latin typeface="Consolas" panose="020B0609020204030204" pitchFamily="49" charset="0"/>
+              </a:rPr>
+              <a:t/>
+            </a:r>
+            <a:br>
+              <a:rPr lang="en-US" smtClean="0">
+                <a:latin typeface="Consolas" panose="020B0609020204030204" pitchFamily="49" charset="0"/>
+              </a:rPr>
+            </a:br>
+            <a:r>
+              <a:rPr lang="en-US" smtClean="0">
+                <a:latin typeface="Consolas" panose="020B0609020204030204" pitchFamily="49" charset="0"/>
+              </a:rPr>
+              <a:t>    return </a:t>
+            </a:r>
+            <a:r>
+              <a:rPr lang="en-US">
+                <a:latin typeface="Consolas" panose="020B0609020204030204" pitchFamily="49" charset="0"/>
+              </a:rPr>
+              <a:t>left("x should be &gt;=0</a:t>
+            </a:r>
+            <a:r>
+              <a:rPr lang="en-US" smtClean="0">
+                <a:latin typeface="Consolas" panose="020B0609020204030204" pitchFamily="49" charset="0"/>
+              </a:rPr>
+              <a:t>");</a:t>
+            </a:r>
+            <a:br>
+              <a:rPr lang="en-US" smtClean="0">
+                <a:latin typeface="Consolas" panose="020B0609020204030204" pitchFamily="49" charset="0"/>
+              </a:rPr>
+            </a:br>
+            <a:r>
+              <a:rPr lang="en-US" smtClean="0">
+                <a:latin typeface="Consolas" panose="020B0609020204030204" pitchFamily="49" charset="0"/>
+              </a:rPr>
+              <a:t>  </a:t>
+            </a:r>
+            <a:r>
+              <a:rPr lang="en-US">
+                <a:latin typeface="Consolas" panose="020B0609020204030204" pitchFamily="49" charset="0"/>
+              </a:rPr>
+              <a:t>return right(computeSqrt(x</a:t>
+            </a:r>
+            <a:r>
+              <a:rPr lang="en-US" smtClean="0">
+                <a:latin typeface="Consolas" panose="020B0609020204030204" pitchFamily="49" charset="0"/>
+              </a:rPr>
+              <a:t>));</a:t>
+            </a:r>
+            <a:br>
+              <a:rPr lang="en-US" smtClean="0">
+                <a:latin typeface="Consolas" panose="020B0609020204030204" pitchFamily="49" charset="0"/>
+              </a:rPr>
+            </a:br>
+            <a:r>
+              <a:rPr lang="en-US" smtClean="0">
+                <a:latin typeface="Consolas" panose="020B0609020204030204" pitchFamily="49" charset="0"/>
+              </a:rPr>
+              <a:t>}</a:t>
+            </a:r>
+          </a:p>
+          <a:p>
+            <a:pPr marL="45720" indent="0">
+              <a:buNone/>
             </a:pPr>
             <a:r>
-              <a:rPr lang="en-US" sz="1800"/>
-              <a:t>The C++ Programming Language (4th Edition</a:t>
-            </a:r>
-            <a:r>
-              <a:rPr lang="en-US" sz="1800" smtClean="0"/>
+              <a:rPr lang="en-US" smtClean="0">
+                <a:latin typeface="Consolas" panose="020B0609020204030204" pitchFamily="49" charset="0"/>
+              </a:rPr>
+              <a:t>std</a:t>
+            </a:r>
+            <a:r>
+              <a:rPr lang="en-US">
+                <a:latin typeface="Consolas" panose="020B0609020204030204" pitchFamily="49" charset="0"/>
+              </a:rPr>
+              <a:t>::string msg = sqrt(-1</a:t>
+            </a:r>
+            <a:r>
+              <a:rPr lang="en-US" smtClean="0">
+                <a:latin typeface="Consolas" panose="020B0609020204030204" pitchFamily="49" charset="0"/>
+              </a:rPr>
               <a:t>)</a:t>
             </a:r>
-            <a:endParaRPr lang="ru-RU" sz="1800" smtClean="0"/>
-          </a:p>
-          <a:p>
-            <a:pPr marL="514350" lvl="0" indent="-514350">
-              <a:buFont typeface="+mj-lt"/>
-              <a:buAutoNum type="arabicPeriod"/>
-            </a:pPr>
-            <a:r>
-              <a:rPr lang="en-US" sz="1800" smtClean="0"/>
-              <a:t>Tom Cargill, Exception handling: a false sense of security, C++Report '1994</a:t>
-            </a:r>
-          </a:p>
-          <a:p>
-            <a:pPr marL="514350" indent="-514350">
-              <a:buFont typeface="+mj-lt"/>
-              <a:buAutoNum type="arabicPeriod"/>
-            </a:pPr>
-            <a:r>
-              <a:rPr lang="en-US" sz="1800"/>
-              <a:t>David Abrahams, Exception-safety in generic components </a:t>
-            </a:r>
-            <a:r>
-              <a:rPr lang="en-US" sz="1800" smtClean="0"/>
-              <a:t>'1998</a:t>
-            </a:r>
-          </a:p>
-          <a:p>
-            <a:pPr marL="514350" lvl="0" indent="-514350">
-              <a:buFont typeface="+mj-lt"/>
-              <a:buAutoNum type="arabicPeriod"/>
-            </a:pPr>
-            <a:r>
-              <a:rPr lang="en-US" sz="1800" smtClean="0"/>
-              <a:t>Herb Sutter, </a:t>
-            </a:r>
-            <a:r>
-              <a:rPr lang="en-US" sz="1800"/>
-              <a:t>Exceptional C++: 47 engineering puzzles, programming problems, and </a:t>
-            </a:r>
-            <a:r>
-              <a:rPr lang="en-US" sz="1800" smtClean="0"/>
-              <a:t>solutions, Addison-Wesley, 2000</a:t>
-            </a:r>
-            <a:endParaRPr lang="en-US" sz="1800"/>
-          </a:p>
-          <a:p>
-            <a:pPr marL="514350" lvl="0" indent="-514350">
-              <a:buFont typeface="+mj-lt"/>
-              <a:buAutoNum type="arabicPeriod"/>
-            </a:pPr>
-            <a:r>
-              <a:rPr lang="en-US" sz="1800" smtClean="0"/>
-              <a:t>Herb Sutter, </a:t>
-            </a:r>
-            <a:r>
-              <a:rPr lang="en-US" sz="1800"/>
-              <a:t>More exceptional C++: 40 new engineering puzzles, programming problems, and </a:t>
-            </a:r>
-            <a:r>
-              <a:rPr lang="en-US" sz="1800" smtClean="0"/>
-              <a:t>solutions, </a:t>
-            </a:r>
-            <a:r>
-              <a:rPr lang="en-US" sz="1800"/>
-              <a:t>Addison-Wesley, </a:t>
-            </a:r>
-            <a:r>
-              <a:rPr lang="en-US" sz="1800" smtClean="0"/>
-              <a:t>2002</a:t>
-            </a:r>
-          </a:p>
-          <a:p>
-            <a:pPr marL="514350" lvl="0" indent="-514350">
-              <a:buFont typeface="+mj-lt"/>
-              <a:buAutoNum type="arabicPeriod"/>
-            </a:pPr>
-            <a:r>
-              <a:rPr lang="en-US" sz="1800" smtClean="0"/>
-              <a:t>Jon Kalb, Exception Safe code (3 parts), CppCon'2014</a:t>
-            </a:r>
-          </a:p>
-          <a:p>
-            <a:pPr marL="514350" indent="-514350">
-              <a:buFont typeface="+mj-lt"/>
-              <a:buAutoNum type="arabicPeriod"/>
-            </a:pPr>
-            <a:r>
-              <a:rPr lang="en-US" sz="1800" smtClean="0"/>
-              <a:t>Arne </a:t>
-            </a:r>
-            <a:r>
-              <a:rPr lang="en-US" sz="1800"/>
-              <a:t>Mertz, Modern C++ features – keyword `noexcept</a:t>
-            </a:r>
-            <a:r>
-              <a:rPr lang="en-US" sz="1800" smtClean="0"/>
-              <a:t>`, blog post, Jan'2016</a:t>
-            </a:r>
-          </a:p>
-          <a:p>
-            <a:pPr marL="514350" indent="-514350">
-              <a:buFont typeface="+mj-lt"/>
-              <a:buAutoNum type="arabicPeriod"/>
-            </a:pPr>
-            <a:r>
-              <a:rPr lang="en-US" sz="1800" smtClean="0"/>
-              <a:t>Roland Bock, Variants of variadic AND, CppCon'2016</a:t>
-            </a:r>
-            <a:endParaRPr lang="en-US" sz="1800"/>
-          </a:p>
-          <a:p>
-            <a:pPr marL="514350" lvl="0" indent="-514350">
-              <a:buFont typeface="+mj-lt"/>
-              <a:buAutoNum type="arabicPeriod"/>
-            </a:pPr>
-            <a:r>
-              <a:rPr lang="en-US" sz="1800" smtClean="0"/>
-              <a:t>Niall Douglas, Mongrel Monads, ACCU'2017</a:t>
+            <a:br>
+              <a:rPr lang="en-US" smtClean="0">
+                <a:latin typeface="Consolas" panose="020B0609020204030204" pitchFamily="49" charset="0"/>
+              </a:rPr>
+            </a:br>
+            <a:r>
+              <a:rPr lang="en-US" smtClean="0">
+                <a:latin typeface="Consolas" panose="020B0609020204030204" pitchFamily="49" charset="0"/>
+              </a:rPr>
+              <a:t>  .</a:t>
+            </a:r>
+            <a:r>
+              <a:rPr lang="en-US">
+                <a:latin typeface="Consolas" panose="020B0609020204030204" pitchFamily="49" charset="0"/>
+              </a:rPr>
+              <a:t>leftMap([](auto msg) { return "error occurred: " + msg; </a:t>
+            </a:r>
+            <a:r>
+              <a:rPr lang="en-US" smtClean="0">
+                <a:latin typeface="Consolas" panose="020B0609020204030204" pitchFamily="49" charset="0"/>
+              </a:rPr>
+              <a:t>})</a:t>
+            </a:r>
+            <a:br>
+              <a:rPr lang="en-US" smtClean="0">
+                <a:latin typeface="Consolas" panose="020B0609020204030204" pitchFamily="49" charset="0"/>
+              </a:rPr>
+            </a:br>
+            <a:r>
+              <a:rPr lang="en-US" smtClean="0">
+                <a:latin typeface="Consolas" panose="020B0609020204030204" pitchFamily="49" charset="0"/>
+              </a:rPr>
+              <a:t>  .</a:t>
+            </a:r>
+            <a:r>
+              <a:rPr lang="en-US">
+                <a:latin typeface="Consolas" panose="020B0609020204030204" pitchFamily="49" charset="0"/>
+              </a:rPr>
+              <a:t>rightMap([](auto result) { return </a:t>
+            </a:r>
+            <a:r>
+              <a:rPr lang="en-US" smtClean="0">
+                <a:latin typeface="Consolas" panose="020B0609020204030204" pitchFamily="49" charset="0"/>
+              </a:rPr>
+              <a:t>to_string(result</a:t>
+            </a:r>
+            <a:r>
+              <a:rPr lang="en-US">
+                <a:latin typeface="Consolas" panose="020B0609020204030204" pitchFamily="49" charset="0"/>
+              </a:rPr>
+              <a:t>); </a:t>
+            </a:r>
+            <a:r>
+              <a:rPr lang="en-US" smtClean="0">
+                <a:latin typeface="Consolas" panose="020B0609020204030204" pitchFamily="49" charset="0"/>
+              </a:rPr>
+              <a:t>})</a:t>
+            </a:r>
+            <a:br>
+              <a:rPr lang="en-US" smtClean="0">
+                <a:latin typeface="Consolas" panose="020B0609020204030204" pitchFamily="49" charset="0"/>
+              </a:rPr>
+            </a:br>
+            <a:r>
+              <a:rPr lang="en-US" smtClean="0">
+                <a:latin typeface="Consolas" panose="020B0609020204030204" pitchFamily="49" charset="0"/>
+              </a:rPr>
+              <a:t>  .</a:t>
+            </a:r>
+            <a:r>
+              <a:rPr lang="en-US">
+                <a:latin typeface="Consolas" panose="020B0609020204030204" pitchFamily="49" charset="0"/>
+              </a:rPr>
+              <a:t>join</a:t>
+            </a:r>
+            <a:r>
+              <a:rPr lang="en-US" smtClean="0">
+                <a:latin typeface="Consolas" panose="020B0609020204030204" pitchFamily="49" charset="0"/>
+              </a:rPr>
+              <a:t>();</a:t>
+            </a:r>
+            <a:endParaRPr lang="en-US" smtClean="0"/>
+          </a:p>
+          <a:p>
+            <a:r>
+              <a:rPr lang="ru-RU" smtClean="0"/>
+              <a:t>Подробнее об этой идее (по сути речь о монадах</a:t>
+            </a:r>
+            <a:r>
+              <a:rPr lang="en-US" smtClean="0"/>
+              <a:t>)</a:t>
+            </a:r>
+            <a:r>
+              <a:rPr lang="ru-RU" smtClean="0"/>
+              <a:t> и её применимости, мы поговорим после лекции по лямбдам</a:t>
+            </a:r>
+            <a:r>
+              <a:rPr lang="en-US" smtClean="0"/>
+              <a:t>. </a:t>
+            </a:r>
+            <a:r>
+              <a:rPr lang="ru-RU" smtClean="0"/>
+              <a:t>Пока можно посмотреть </a:t>
+            </a:r>
+            <a:r>
+              <a:rPr lang="en-US" smtClean="0">
+                <a:latin typeface="Consolas" panose="020B0609020204030204" pitchFamily="49" charset="0"/>
+              </a:rPr>
+              <a:t>[9]</a:t>
+            </a:r>
+            <a:r>
+              <a:rPr lang="en-US" smtClean="0"/>
+              <a:t>.</a:t>
             </a:r>
           </a:p>
         </p:txBody>
@@ -27523,20 +27907,13 @@
     </p:spTree>
     <p:extLst>
       <p:ext uri="{BB962C8B-B14F-4D97-AF65-F5344CB8AC3E}">
-        <p14:creationId xmlns:p14="http://schemas.microsoft.com/office/powerpoint/2010/main" val="294275565"/>
+        <p14:creationId xmlns:p14="http://schemas.microsoft.com/office/powerpoint/2010/main" val="1334541733"/>
       </p:ext>
     </p:extLst>
   </p:cSld>
   <p:clrMapOvr>
     <a:masterClrMapping/>
   </p:clrMapOvr>
-  <p:timing>
-    <p:tnLst>
-      <p:par>
-        <p:cTn id="1" dur="indefinite" restart="never" nodeType="tmRoot"/>
-      </p:par>
-    </p:tnLst>
-  </p:timing>
 </p:sld>
 </file>
 
@@ -27559,7 +27936,7 @@
       </p:grpSpPr>
       <p:sp>
         <p:nvSpPr>
-          <p:cNvPr id="4" name="Title 3"/>
+          <p:cNvPr id="2" name="Title 1"/>
           <p:cNvSpPr>
             <a:spLocks noGrp="1"/>
           </p:cNvSpPr>
@@ -27574,7 +27951,7 @@
           <a:p>
             <a:r>
               <a:rPr lang="ru-RU" smtClean="0"/>
-              <a:t>секретный уровень</a:t>
+              <a:t>Литература</a:t>
             </a:r>
             <a:endParaRPr lang="en-US"/>
           </a:p>
@@ -27582,35 +27959,171 @@
       </p:sp>
       <p:sp>
         <p:nvSpPr>
-          <p:cNvPr id="5" name="Subtitle 4"/>
+          <p:cNvPr id="3" name="Content Placeholder 2"/>
           <p:cNvSpPr>
             <a:spLocks noGrp="1"/>
           </p:cNvSpPr>
           <p:nvPr>
-            <p:ph type="body" idx="1"/>
+            <p:ph idx="1"/>
           </p:nvPr>
         </p:nvSpPr>
-        <p:spPr/>
+        <p:spPr>
+          <a:xfrm>
+            <a:off x="1120000" y="1825624"/>
+            <a:ext cx="10643632" cy="4682267"/>
+          </a:xfrm>
+        </p:spPr>
         <p:txBody>
-          <a:bodyPr/>
+          <a:bodyPr>
+            <a:normAutofit/>
+          </a:bodyPr>
           <a:lstStyle/>
           <a:p>
-            <a:r>
-              <a:rPr lang="ru-RU" smtClean="0"/>
-              <a:t>метапрограммирование </a:t>
-            </a:r>
-            <a:r>
-              <a:rPr lang="en-US" smtClean="0"/>
-              <a:t>revisited</a:t>
-            </a:r>
-            <a:endParaRPr lang="en-US"/>
+            <a:pPr marL="514350" lvl="0" indent="-514350">
+              <a:buFont typeface="+mj-lt"/>
+              <a:buAutoNum type="arabicPeriod"/>
+            </a:pPr>
+            <a:r>
+              <a:rPr lang="en-US" sz="1800"/>
+              <a:t>ISO/IEC, "Information technology –</a:t>
+            </a:r>
+            <a:r>
+              <a:rPr lang="en-US" sz="1800" smtClean="0"/>
+              <a:t> </a:t>
+            </a:r>
+            <a:r>
+              <a:rPr lang="en-US" sz="1800"/>
+              <a:t>Programming languages – C++", ISO/IEC 14882:2014, 2014</a:t>
+            </a:r>
+          </a:p>
+          <a:p>
+            <a:pPr marL="514350" lvl="0" indent="-514350">
+              <a:buFont typeface="+mj-lt"/>
+              <a:buAutoNum type="arabicPeriod"/>
+            </a:pPr>
+            <a:r>
+              <a:rPr lang="en-US" sz="1800"/>
+              <a:t>The C++ Programming Language (4th Edition</a:t>
+            </a:r>
+            <a:r>
+              <a:rPr lang="en-US" sz="1800" smtClean="0"/>
+              <a:t>)</a:t>
+            </a:r>
+            <a:endParaRPr lang="ru-RU" sz="1800" smtClean="0"/>
+          </a:p>
+          <a:p>
+            <a:pPr marL="514350" lvl="0" indent="-514350">
+              <a:buFont typeface="+mj-lt"/>
+              <a:buAutoNum type="arabicPeriod"/>
+            </a:pPr>
+            <a:r>
+              <a:rPr lang="en-US" sz="1800" smtClean="0"/>
+              <a:t>Tom Cargill, Exception handling: a false sense of security, C++Report '1994</a:t>
+            </a:r>
+          </a:p>
+          <a:p>
+            <a:pPr marL="514350" indent="-514350">
+              <a:buFont typeface="+mj-lt"/>
+              <a:buAutoNum type="arabicPeriod"/>
+            </a:pPr>
+            <a:r>
+              <a:rPr lang="en-US" sz="1800"/>
+              <a:t>David Abrahams, Exception-safety in generic components </a:t>
+            </a:r>
+            <a:r>
+              <a:rPr lang="en-US" sz="1800" smtClean="0"/>
+              <a:t>'1998</a:t>
+            </a:r>
+          </a:p>
+          <a:p>
+            <a:pPr marL="514350" lvl="0" indent="-514350">
+              <a:buFont typeface="+mj-lt"/>
+              <a:buAutoNum type="arabicPeriod"/>
+            </a:pPr>
+            <a:r>
+              <a:rPr lang="en-US" sz="1800" smtClean="0"/>
+              <a:t>Herb Sutter, </a:t>
+            </a:r>
+            <a:r>
+              <a:rPr lang="en-US" sz="1800"/>
+              <a:t>Exceptional C++: 47 engineering puzzles, programming problems, and </a:t>
+            </a:r>
+            <a:r>
+              <a:rPr lang="en-US" sz="1800" smtClean="0"/>
+              <a:t>solutions, Addison-Wesley, 2000</a:t>
+            </a:r>
+            <a:endParaRPr lang="en-US" sz="1800"/>
+          </a:p>
+          <a:p>
+            <a:pPr marL="514350" lvl="0" indent="-514350">
+              <a:buFont typeface="+mj-lt"/>
+              <a:buAutoNum type="arabicPeriod"/>
+            </a:pPr>
+            <a:r>
+              <a:rPr lang="en-US" sz="1800" smtClean="0"/>
+              <a:t>Herb Sutter, </a:t>
+            </a:r>
+            <a:r>
+              <a:rPr lang="en-US" sz="1800"/>
+              <a:t>More exceptional C++: 40 new engineering puzzles, programming problems, and </a:t>
+            </a:r>
+            <a:r>
+              <a:rPr lang="en-US" sz="1800" smtClean="0"/>
+              <a:t>solutions, </a:t>
+            </a:r>
+            <a:r>
+              <a:rPr lang="en-US" sz="1800"/>
+              <a:t>Addison-Wesley, </a:t>
+            </a:r>
+            <a:r>
+              <a:rPr lang="en-US" sz="1800" smtClean="0"/>
+              <a:t>2002</a:t>
+            </a:r>
+          </a:p>
+          <a:p>
+            <a:pPr marL="514350" lvl="0" indent="-514350">
+              <a:buFont typeface="+mj-lt"/>
+              <a:buAutoNum type="arabicPeriod"/>
+            </a:pPr>
+            <a:r>
+              <a:rPr lang="en-US" sz="1800" smtClean="0"/>
+              <a:t>Jon Kalb, Exception Safe code (3 parts), CppCon'2014</a:t>
+            </a:r>
+          </a:p>
+          <a:p>
+            <a:pPr marL="514350" indent="-514350">
+              <a:buFont typeface="+mj-lt"/>
+              <a:buAutoNum type="arabicPeriod"/>
+            </a:pPr>
+            <a:r>
+              <a:rPr lang="en-US" sz="1800" smtClean="0"/>
+              <a:t>Arne </a:t>
+            </a:r>
+            <a:r>
+              <a:rPr lang="en-US" sz="1800"/>
+              <a:t>Mertz, Modern C++ features – keyword `noexcept</a:t>
+            </a:r>
+            <a:r>
+              <a:rPr lang="en-US" sz="1800" smtClean="0"/>
+              <a:t>`, blog post, Jan'2016</a:t>
+            </a:r>
+          </a:p>
+          <a:p>
+            <a:pPr marL="514350" lvl="0" indent="-514350">
+              <a:buFont typeface="+mj-lt"/>
+              <a:buAutoNum type="arabicPeriod"/>
+            </a:pPr>
+            <a:r>
+              <a:rPr lang="en-US" sz="1800" smtClean="0"/>
+              <a:t>Niall Douglas, Mongrel Monads, ACCU'2017</a:t>
+            </a:r>
           </a:p>
         </p:txBody>
       </p:sp>
     </p:spTree>
     <p:extLst>
       <p:ext uri="{BB962C8B-B14F-4D97-AF65-F5344CB8AC3E}">
-        <p14:creationId xmlns:p14="http://schemas.microsoft.com/office/powerpoint/2010/main" val="1813030979"/>
+        <p14:creationId xmlns:p14="http://schemas.microsoft.com/office/powerpoint/2010/main" val="294275565"/>
       </p:ext>
     </p:extLst>
   </p:cSld>
@@ -27661,6 +28174,93 @@
           <a:p>
             <a:r>
               <a:rPr lang="ru-RU" smtClean="0"/>
+              <a:t>секретный уровень</a:t>
+            </a:r>
+            <a:endParaRPr lang="en-US"/>
+          </a:p>
+        </p:txBody>
+      </p:sp>
+      <p:sp>
+        <p:nvSpPr>
+          <p:cNvPr id="5" name="Subtitle 4"/>
+          <p:cNvSpPr>
+            <a:spLocks noGrp="1"/>
+          </p:cNvSpPr>
+          <p:nvPr>
+            <p:ph type="body" idx="1"/>
+          </p:nvPr>
+        </p:nvSpPr>
+        <p:spPr/>
+        <p:txBody>
+          <a:bodyPr/>
+          <a:lstStyle/>
+          <a:p>
+            <a:r>
+              <a:rPr lang="ru-RU" smtClean="0"/>
+              <a:t>метапрограммирование </a:t>
+            </a:r>
+            <a:r>
+              <a:rPr lang="en-US" smtClean="0"/>
+              <a:t>revisited</a:t>
+            </a:r>
+            <a:endParaRPr lang="en-US"/>
+          </a:p>
+        </p:txBody>
+      </p:sp>
+    </p:spTree>
+    <p:extLst>
+      <p:ext uri="{BB962C8B-B14F-4D97-AF65-F5344CB8AC3E}">
+        <p14:creationId xmlns:p14="http://schemas.microsoft.com/office/powerpoint/2010/main" val="1813030979"/>
+      </p:ext>
+    </p:extLst>
+  </p:cSld>
+  <p:clrMapOvr>
+    <a:masterClrMapping/>
+  </p:clrMapOvr>
+  <p:timing>
+    <p:tnLst>
+      <p:par>
+        <p:cTn id="1" dur="indefinite" restart="never" nodeType="tmRoot"/>
+      </p:par>
+    </p:tnLst>
+  </p:timing>
+</p:sld>
+</file>
+
+<file path=ppt/slides/slide88.xml><?xml version="1.0" encoding="utf-8"?>
+<p:sld xmlns:a="http://schemas.openxmlformats.org/drawingml/2006/main" xmlns:r="http://schemas.openxmlformats.org/officeDocument/2006/relationships" xmlns:p="http://schemas.openxmlformats.org/presentationml/2006/main">
+  <p:cSld>
+    <p:spTree>
+      <p:nvGrpSpPr>
+        <p:cNvPr id="1" name=""/>
+        <p:cNvGrpSpPr/>
+        <p:nvPr/>
+      </p:nvGrpSpPr>
+      <p:grpSpPr>
+        <a:xfrm>
+          <a:off x="0" y="0"/>
+          <a:ext cx="0" cy="0"/>
+          <a:chOff x="0" y="0"/>
+          <a:chExt cx="0" cy="0"/>
+        </a:xfrm>
+      </p:grpSpPr>
+      <p:sp>
+        <p:nvSpPr>
+          <p:cNvPr id="4" name="Title 3"/>
+          <p:cNvSpPr>
+            <a:spLocks noGrp="1"/>
+          </p:cNvSpPr>
+          <p:nvPr>
+            <p:ph type="title"/>
+          </p:nvPr>
+        </p:nvSpPr>
+        <p:spPr/>
+        <p:txBody>
+          <a:bodyPr/>
+          <a:lstStyle/>
+          <a:p>
+            <a:r>
+              <a:rPr lang="ru-RU" smtClean="0"/>
               <a:t>Снова </a:t>
             </a:r>
             <a:r>
@@ -27789,7 +28389,7 @@
 </p:sld>
 </file>
 
-<file path=ppt/slides/slide88.xml><?xml version="1.0" encoding="utf-8"?>
+<file path=ppt/slides/slide89.xml><?xml version="1.0" encoding="utf-8"?>
 <p:sld xmlns:a="http://schemas.openxmlformats.org/drawingml/2006/main" xmlns:r="http://schemas.openxmlformats.org/officeDocument/2006/relationships" xmlns:p="http://schemas.openxmlformats.org/presentationml/2006/main">
   <p:cSld>
     <p:spTree>
@@ -28103,237 +28703,6 @@
     <p:extLst>
       <p:ext uri="{BB962C8B-B14F-4D97-AF65-F5344CB8AC3E}">
         <p14:creationId xmlns:p14="http://schemas.microsoft.com/office/powerpoint/2010/main" val="715690700"/>
-      </p:ext>
-    </p:extLst>
-  </p:cSld>
-  <p:clrMapOvr>
-    <a:masterClrMapping/>
-  </p:clrMapOvr>
-  <p:timing>
-    <p:tnLst>
-      <p:par>
-        <p:cTn id="1" dur="indefinite" restart="never" nodeType="tmRoot"/>
-      </p:par>
-    </p:tnLst>
-  </p:timing>
-</p:sld>
-</file>
-
-<file path=ppt/slides/slide89.xml><?xml version="1.0" encoding="utf-8"?>
-<p:sld xmlns:a="http://schemas.openxmlformats.org/drawingml/2006/main" xmlns:r="http://schemas.openxmlformats.org/officeDocument/2006/relationships" xmlns:p="http://schemas.openxmlformats.org/presentationml/2006/main">
-  <p:cSld>
-    <p:spTree>
-      <p:nvGrpSpPr>
-        <p:cNvPr id="1" name=""/>
-        <p:cNvGrpSpPr/>
-        <p:nvPr/>
-      </p:nvGrpSpPr>
-      <p:grpSpPr>
-        <a:xfrm>
-          <a:off x="0" y="0"/>
-          <a:ext cx="0" cy="0"/>
-          <a:chOff x="0" y="0"/>
-          <a:chExt cx="0" cy="0"/>
-        </a:xfrm>
-      </p:grpSpPr>
-      <mc:AlternateContent xmlns:mc="http://schemas.openxmlformats.org/markup-compatibility/2006" xmlns:a14="http://schemas.microsoft.com/office/drawing/2010/main">
-        <mc:Choice Requires="a14">
-          <p:sp>
-            <p:nvSpPr>
-              <p:cNvPr id="2" name="Title 1"/>
-              <p:cNvSpPr>
-                <a:spLocks noGrp="1"/>
-              </p:cNvSpPr>
-              <p:nvPr>
-                <p:ph type="title"/>
-              </p:nvPr>
-            </p:nvSpPr>
-            <p:spPr/>
-            <p:txBody>
-              <a:bodyPr/>
-              <a:lstStyle/>
-              <a:p>
-                <a:r>
-                  <a:rPr lang="ru-RU" smtClean="0"/>
-                  <a:t>Вариант </a:t>
-                </a:r>
-                <a14:m>
-                  <m:oMath xmlns:m="http://schemas.openxmlformats.org/officeDocument/2006/math">
-                    <m:r>
-                      <a:rPr lang="ru-RU" i="1" smtClean="0">
-                        <a:latin typeface="Cambria Math" panose="02040503050406030204" pitchFamily="18" charset="0"/>
-                      </a:rPr>
-                      <m:t>1а</m:t>
-                    </m:r>
-                  </m:oMath>
-                </a14:m>
-                <a:r>
-                  <a:rPr lang="ru-RU" smtClean="0"/>
-                  <a:t>. </a:t>
-                </a:r>
-                <a:r>
-                  <a:rPr lang="en-US" smtClean="0"/>
-                  <a:t>std::is_same</a:t>
-                </a:r>
-                <a:endParaRPr lang="en-US"/>
-              </a:p>
-            </p:txBody>
-          </p:sp>
-        </mc:Choice>
-        <mc:Fallback xmlns="">
-          <p:sp>
-            <p:nvSpPr>
-              <p:cNvPr id="2" name="Title 1"/>
-              <p:cNvSpPr>
-                <a:spLocks noGrp="1" noRot="1" noChangeAspect="1" noMove="1" noResize="1" noEditPoints="1" noAdjustHandles="1" noChangeArrowheads="1" noChangeShapeType="1" noTextEdit="1"/>
-              </p:cNvSpPr>
-              <p:nvPr>
-                <p:ph type="title"/>
-              </p:nvPr>
-            </p:nvSpPr>
-            <p:spPr>
-              <a:blipFill rotWithShape="0">
-                <a:blip r:embed="rId2"/>
-                <a:stretch>
-                  <a:fillRect l="-2531"/>
-                </a:stretch>
-              </a:blipFill>
-            </p:spPr>
-            <p:txBody>
-              <a:bodyPr/>
-              <a:lstStyle/>
-              <a:p>
-                <a:r>
-                  <a:rPr lang="en-US">
-                    <a:noFill/>
-                  </a:rPr>
-                  <a:t> </a:t>
-                </a:r>
-              </a:p>
-            </p:txBody>
-          </p:sp>
-        </mc:Fallback>
-      </mc:AlternateContent>
-      <p:sp>
-        <p:nvSpPr>
-          <p:cNvPr id="3" name="Content Placeholder 2"/>
-          <p:cNvSpPr>
-            <a:spLocks noGrp="1"/>
-          </p:cNvSpPr>
-          <p:nvPr>
-            <p:ph idx="1"/>
-          </p:nvPr>
-        </p:nvSpPr>
-        <p:spPr>
-          <a:xfrm>
-            <a:off x="1120000" y="1825625"/>
-            <a:ext cx="10791914" cy="4351338"/>
-          </a:xfrm>
-        </p:spPr>
-        <p:txBody>
-          <a:bodyPr/>
-          <a:lstStyle/>
-          <a:p>
-            <a:pPr marL="0" indent="0">
-              <a:buNone/>
-            </a:pPr>
-            <a:r>
-              <a:rPr lang="en-US">
-                <a:latin typeface="Consolas" panose="020B0609020204030204" pitchFamily="49" charset="0"/>
-              </a:rPr>
-              <a:t>template&lt;bool...&gt;</a:t>
-            </a:r>
-          </a:p>
-          <a:p>
-            <a:pPr marL="0" indent="0">
-              <a:buNone/>
-            </a:pPr>
-            <a:r>
-              <a:rPr lang="en-US">
-                <a:latin typeface="Consolas" panose="020B0609020204030204" pitchFamily="49" charset="0"/>
-              </a:rPr>
-              <a:t>struct all_helper {};</a:t>
-            </a:r>
-          </a:p>
-          <a:p>
-            <a:pPr marL="0" indent="0">
-              <a:buNone/>
-            </a:pPr>
-            <a:endParaRPr lang="en-US">
-              <a:latin typeface="Consolas" panose="020B0609020204030204" pitchFamily="49" charset="0"/>
-            </a:endParaRPr>
-          </a:p>
-          <a:p>
-            <a:pPr marL="0" indent="0">
-              <a:buNone/>
-            </a:pPr>
-            <a:r>
-              <a:rPr lang="en-US">
-                <a:latin typeface="Consolas" panose="020B0609020204030204" pitchFamily="49" charset="0"/>
-              </a:rPr>
-              <a:t>template&lt;bool... Args&gt;</a:t>
-            </a:r>
-          </a:p>
-          <a:p>
-            <a:pPr marL="0" indent="0">
-              <a:buNone/>
-            </a:pPr>
-            <a:r>
-              <a:rPr lang="en-US">
-                <a:latin typeface="Consolas" panose="020B0609020204030204" pitchFamily="49" charset="0"/>
-              </a:rPr>
-              <a:t>using </a:t>
-            </a:r>
-            <a:r>
-              <a:rPr lang="en-US" smtClean="0">
-                <a:latin typeface="Consolas" panose="020B0609020204030204" pitchFamily="49" charset="0"/>
-              </a:rPr>
-              <a:t>all_true </a:t>
-            </a:r>
-            <a:r>
-              <a:rPr lang="en-US">
-                <a:latin typeface="Consolas" panose="020B0609020204030204" pitchFamily="49" charset="0"/>
-              </a:rPr>
-              <a:t>= is_same&lt;all_helper&lt;true, Args</a:t>
-            </a:r>
-            <a:r>
-              <a:rPr lang="en-US" smtClean="0">
-                <a:latin typeface="Consolas" panose="020B0609020204030204" pitchFamily="49" charset="0"/>
-              </a:rPr>
-              <a:t>...&gt;,</a:t>
-            </a:r>
-            <a:br>
-              <a:rPr lang="en-US" smtClean="0">
-                <a:latin typeface="Consolas" panose="020B0609020204030204" pitchFamily="49" charset="0"/>
-              </a:rPr>
-            </a:br>
-            <a:r>
-              <a:rPr lang="en-US" smtClean="0">
-                <a:latin typeface="Consolas" panose="020B0609020204030204" pitchFamily="49" charset="0"/>
-              </a:rPr>
-              <a:t>                         all_helper&lt;Args</a:t>
-            </a:r>
-            <a:r>
-              <a:rPr lang="en-US">
-                <a:latin typeface="Consolas" panose="020B0609020204030204" pitchFamily="49" charset="0"/>
-              </a:rPr>
-              <a:t>..., true&gt;&gt;;</a:t>
-            </a:r>
-          </a:p>
-          <a:p>
-            <a:pPr marL="0" indent="0">
-              <a:buNone/>
-            </a:pPr>
-            <a:endParaRPr lang="en-US">
-              <a:latin typeface="Consolas" panose="020B0609020204030204" pitchFamily="49" charset="0"/>
-            </a:endParaRPr>
-          </a:p>
-        </p:txBody>
-      </p:sp>
-    </p:spTree>
-    <p:extLst>
-      <p:ext uri="{BB962C8B-B14F-4D97-AF65-F5344CB8AC3E}">
-        <p14:creationId xmlns:p14="http://schemas.microsoft.com/office/powerpoint/2010/main" val="3476930056"/>
       </p:ext>
     </p:extLst>
   </p:cSld>
@@ -28971,7 +29340,7 @@
                 </a:r>
                 <a:r>
                   <a:rPr lang="en-US" smtClean="0"/>
-                  <a:t>Noexcept</a:t>
+                  <a:t>Noexcept*</a:t>
                 </a:r>
                 <a:endParaRPr lang="en-US"/>
               </a:p>
@@ -29081,119 +29450,148 @@
             <a:pPr marL="0" indent="0">
               <a:buNone/>
             </a:pPr>
+            <a:r>
+              <a:rPr lang="en-US" smtClean="0">
+                <a:latin typeface="Consolas" panose="020B0609020204030204" pitchFamily="49" charset="0"/>
+              </a:rPr>
+              <a:t>template </a:t>
+            </a:r>
+            <a:r>
+              <a:rPr lang="en-US">
+                <a:latin typeface="Consolas" panose="020B0609020204030204" pitchFamily="49" charset="0"/>
+              </a:rPr>
+              <a:t>&lt;typename ...</a:t>
+            </a:r>
+            <a:r>
+              <a:rPr lang="en-US" smtClean="0">
+                <a:latin typeface="Consolas" panose="020B0609020204030204" pitchFamily="49" charset="0"/>
+              </a:rPr>
+              <a:t>T&gt; </a:t>
+            </a:r>
+            <a:br>
+              <a:rPr lang="en-US" smtClean="0">
+                <a:latin typeface="Consolas" panose="020B0609020204030204" pitchFamily="49" charset="0"/>
+              </a:rPr>
+            </a:br>
+            <a:r>
+              <a:rPr lang="en-US" smtClean="0">
+                <a:latin typeface="Consolas" panose="020B0609020204030204" pitchFamily="49" charset="0"/>
+              </a:rPr>
+              <a:t>void </a:t>
+            </a:r>
+            <a:r>
+              <a:rPr lang="en-US">
+                <a:latin typeface="Consolas" panose="020B0609020204030204" pitchFamily="49" charset="0"/>
+              </a:rPr>
+              <a:t>nx_join(T const&amp;...) </a:t>
+            </a:r>
+            <a:r>
+              <a:rPr lang="en-US" smtClean="0">
+                <a:latin typeface="Consolas" panose="020B0609020204030204" pitchFamily="49" charset="0"/>
+              </a:rPr>
+              <a:t>noexcept;</a:t>
+            </a:r>
+          </a:p>
+          <a:p>
+            <a:pPr marL="0" indent="0">
+              <a:buNone/>
+            </a:pPr>
+            <a:r>
+              <a:rPr lang="en-US" smtClean="0">
+                <a:latin typeface="Consolas" panose="020B0609020204030204" pitchFamily="49" charset="0"/>
+              </a:rPr>
+              <a:t>template </a:t>
+            </a:r>
+            <a:r>
+              <a:rPr lang="en-US">
+                <a:latin typeface="Consolas" panose="020B0609020204030204" pitchFamily="49" charset="0"/>
+              </a:rPr>
+              <a:t>&lt;bool ...</a:t>
+            </a:r>
+            <a:r>
+              <a:rPr lang="en-US" smtClean="0">
+                <a:latin typeface="Consolas" panose="020B0609020204030204" pitchFamily="49" charset="0"/>
+              </a:rPr>
+              <a:t>Args&gt; </a:t>
+            </a:r>
+            <a:br>
+              <a:rPr lang="en-US" smtClean="0">
+                <a:latin typeface="Consolas" panose="020B0609020204030204" pitchFamily="49" charset="0"/>
+              </a:rPr>
+            </a:br>
+            <a:r>
+              <a:rPr lang="en-US" smtClean="0">
+                <a:latin typeface="Consolas" panose="020B0609020204030204" pitchFamily="49" charset="0"/>
+              </a:rPr>
+              <a:t>struct all_true : integral_constant&lt;bool,</a:t>
+            </a:r>
+            <a:br>
+              <a:rPr lang="en-US" smtClean="0">
+                <a:latin typeface="Consolas" panose="020B0609020204030204" pitchFamily="49" charset="0"/>
+              </a:rPr>
+            </a:br>
+            <a:r>
+              <a:rPr lang="en-US" smtClean="0">
+                <a:latin typeface="Consolas" panose="020B0609020204030204" pitchFamily="49" charset="0"/>
+              </a:rPr>
+              <a:t>       noexcept(nx_join(</a:t>
+            </a:r>
+            <a:r>
+              <a:rPr lang="en-US" smtClean="0">
+                <a:solidFill>
+                  <a:srgbClr val="0000FF"/>
+                </a:solidFill>
+                <a:latin typeface="Consolas" panose="020B0609020204030204" pitchFamily="49" charset="0"/>
+              </a:rPr>
+              <a:t>nx_helper&lt;Args&gt;{}...</a:t>
+            </a:r>
+            <a:r>
+              <a:rPr lang="en-US" smtClean="0">
+                <a:latin typeface="Consolas" panose="020B0609020204030204" pitchFamily="49" charset="0"/>
+              </a:rPr>
+              <a:t>))&gt; {};</a:t>
+            </a:r>
             <a:endParaRPr lang="en-US">
               <a:latin typeface="Consolas" panose="020B0609020204030204" pitchFamily="49" charset="0"/>
             </a:endParaRPr>
           </a:p>
-          <a:p>
-            <a:pPr marL="0" indent="0">
-              <a:buNone/>
-            </a:pPr>
-            <a:r>
-              <a:rPr lang="en-US" smtClean="0">
-                <a:latin typeface="Consolas" panose="020B0609020204030204" pitchFamily="49" charset="0"/>
-              </a:rPr>
-              <a:t>template </a:t>
-            </a:r>
-            <a:r>
-              <a:rPr lang="en-US">
-                <a:latin typeface="Consolas" panose="020B0609020204030204" pitchFamily="49" charset="0"/>
-              </a:rPr>
-              <a:t>&lt;typename ...</a:t>
-            </a:r>
-            <a:r>
-              <a:rPr lang="en-US" smtClean="0">
-                <a:latin typeface="Consolas" panose="020B0609020204030204" pitchFamily="49" charset="0"/>
-              </a:rPr>
-              <a:t>T&gt; </a:t>
-            </a:r>
-            <a:br>
-              <a:rPr lang="en-US" smtClean="0">
-                <a:latin typeface="Consolas" panose="020B0609020204030204" pitchFamily="49" charset="0"/>
-              </a:rPr>
-            </a:br>
-            <a:r>
-              <a:rPr lang="en-US" smtClean="0">
-                <a:latin typeface="Consolas" panose="020B0609020204030204" pitchFamily="49" charset="0"/>
-              </a:rPr>
-              <a:t>void </a:t>
-            </a:r>
-            <a:r>
-              <a:rPr lang="en-US">
-                <a:latin typeface="Consolas" panose="020B0609020204030204" pitchFamily="49" charset="0"/>
-              </a:rPr>
-              <a:t>nx_join(T const&amp;...) noexcept</a:t>
-            </a:r>
-            <a:r>
-              <a:rPr lang="en-US" smtClean="0">
-                <a:latin typeface="Consolas" panose="020B0609020204030204" pitchFamily="49" charset="0"/>
-              </a:rPr>
-              <a:t>;</a:t>
-            </a:r>
-          </a:p>
-          <a:p>
-            <a:pPr marL="0" indent="0">
-              <a:buNone/>
-            </a:pPr>
-            <a:r>
-              <a:rPr lang="en-US">
-                <a:latin typeface="Consolas" panose="020B0609020204030204" pitchFamily="49" charset="0"/>
-              </a:rPr>
-              <a:t/>
-            </a:r>
-            <a:br>
-              <a:rPr lang="en-US">
-                <a:latin typeface="Consolas" panose="020B0609020204030204" pitchFamily="49" charset="0"/>
-              </a:rPr>
-            </a:br>
-            <a:r>
-              <a:rPr lang="en-US">
-                <a:latin typeface="Consolas" panose="020B0609020204030204" pitchFamily="49" charset="0"/>
-              </a:rPr>
-              <a:t>template &lt;bool ...</a:t>
-            </a:r>
-            <a:r>
-              <a:rPr lang="en-US" smtClean="0">
-                <a:latin typeface="Consolas" panose="020B0609020204030204" pitchFamily="49" charset="0"/>
-              </a:rPr>
-              <a:t>Args&gt; </a:t>
-            </a:r>
-            <a:br>
-              <a:rPr lang="en-US" smtClean="0">
-                <a:latin typeface="Consolas" panose="020B0609020204030204" pitchFamily="49" charset="0"/>
-              </a:rPr>
-            </a:br>
-            <a:r>
-              <a:rPr lang="en-US" smtClean="0">
-                <a:latin typeface="Consolas" panose="020B0609020204030204" pitchFamily="49" charset="0"/>
-              </a:rPr>
-              <a:t>struct all_true : integral_constant&lt;bool,</a:t>
-            </a:r>
-            <a:br>
-              <a:rPr lang="en-US" smtClean="0">
-                <a:latin typeface="Consolas" panose="020B0609020204030204" pitchFamily="49" charset="0"/>
-              </a:rPr>
-            </a:br>
-            <a:r>
-              <a:rPr lang="en-US" smtClean="0">
-                <a:latin typeface="Consolas" panose="020B0609020204030204" pitchFamily="49" charset="0"/>
-              </a:rPr>
-              <a:t>       noexcept(nx_join(nx_helper&lt;Args&gt;{}...))&gt; {}; </a:t>
-            </a:r>
-            <a:r>
-              <a:rPr lang="en-US">
-                <a:latin typeface="Consolas" panose="020B0609020204030204" pitchFamily="49" charset="0"/>
-              </a:rPr>
-              <a:t/>
-            </a:r>
-            <a:br>
-              <a:rPr lang="en-US">
-                <a:latin typeface="Consolas" panose="020B0609020204030204" pitchFamily="49" charset="0"/>
-              </a:rPr>
-            </a:br>
-            <a:endParaRPr lang="en-US">
-              <a:latin typeface="Consolas" panose="020B0609020204030204" pitchFamily="49" charset="0"/>
-            </a:endParaRPr>
+        </p:txBody>
+      </p:sp>
+      <p:sp>
+        <p:nvSpPr>
+          <p:cNvPr id="4" name="TextBox 3"/>
+          <p:cNvSpPr txBox="1"/>
+          <p:nvPr/>
+        </p:nvSpPr>
+        <p:spPr>
+          <a:xfrm>
+            <a:off x="6499654" y="6187440"/>
+            <a:ext cx="5288692" cy="369332"/>
+          </a:xfrm>
+          <a:prstGeom prst="rect">
+            <a:avLst/>
+          </a:prstGeom>
+          <a:noFill/>
+        </p:spPr>
+        <p:txBody>
+          <a:bodyPr wrap="square" rtlCol="0">
+            <a:spAutoFit/>
+          </a:bodyPr>
+          <a:lstStyle/>
+          <a:p>
+            <a:r>
+              <a:rPr lang="en-US" smtClean="0"/>
+              <a:t>*Roland </a:t>
+            </a:r>
+            <a:r>
+              <a:rPr lang="en-US"/>
+              <a:t>Bock, Variants of variadic AND, </a:t>
+            </a:r>
+            <a:r>
+              <a:rPr lang="en-US" smtClean="0"/>
+              <a:t>CppCon'2016</a:t>
+            </a:r>
+            <a:endParaRPr lang="en-US"/>
           </a:p>
         </p:txBody>
       </p:sp>
@@ -29234,6 +29632,237 @@
           <a:chExt cx="0" cy="0"/>
         </a:xfrm>
       </p:grpSpPr>
+      <mc:AlternateContent xmlns:mc="http://schemas.openxmlformats.org/markup-compatibility/2006" xmlns:a14="http://schemas.microsoft.com/office/drawing/2010/main">
+        <mc:Choice Requires="a14">
+          <p:sp>
+            <p:nvSpPr>
+              <p:cNvPr id="2" name="Title 1"/>
+              <p:cNvSpPr>
+                <a:spLocks noGrp="1"/>
+              </p:cNvSpPr>
+              <p:nvPr>
+                <p:ph type="title"/>
+              </p:nvPr>
+            </p:nvSpPr>
+            <p:spPr/>
+            <p:txBody>
+              <a:bodyPr/>
+              <a:lstStyle/>
+              <a:p>
+                <a:r>
+                  <a:rPr lang="ru-RU" smtClean="0"/>
+                  <a:t>Вариант </a:t>
+                </a:r>
+                <a14:m>
+                  <m:oMath xmlns:m="http://schemas.openxmlformats.org/officeDocument/2006/math">
+                    <m:r>
+                      <a:rPr lang="ru-RU" i="1" smtClean="0">
+                        <a:latin typeface="Cambria Math" panose="02040503050406030204" pitchFamily="18" charset="0"/>
+                      </a:rPr>
+                      <m:t>1а</m:t>
+                    </m:r>
+                  </m:oMath>
+                </a14:m>
+                <a:r>
+                  <a:rPr lang="ru-RU" smtClean="0"/>
+                  <a:t>. </a:t>
+                </a:r>
+                <a:r>
+                  <a:rPr lang="en-US" smtClean="0"/>
+                  <a:t>std::is_same</a:t>
+                </a:r>
+                <a:endParaRPr lang="en-US"/>
+              </a:p>
+            </p:txBody>
+          </p:sp>
+        </mc:Choice>
+        <mc:Fallback xmlns="">
+          <p:sp>
+            <p:nvSpPr>
+              <p:cNvPr id="2" name="Title 1"/>
+              <p:cNvSpPr>
+                <a:spLocks noGrp="1" noRot="1" noChangeAspect="1" noMove="1" noResize="1" noEditPoints="1" noAdjustHandles="1" noChangeArrowheads="1" noChangeShapeType="1" noTextEdit="1"/>
+              </p:cNvSpPr>
+              <p:nvPr>
+                <p:ph type="title"/>
+              </p:nvPr>
+            </p:nvSpPr>
+            <p:spPr>
+              <a:blipFill rotWithShape="0">
+                <a:blip r:embed="rId2"/>
+                <a:stretch>
+                  <a:fillRect l="-2531"/>
+                </a:stretch>
+              </a:blipFill>
+            </p:spPr>
+            <p:txBody>
+              <a:bodyPr/>
+              <a:lstStyle/>
+              <a:p>
+                <a:r>
+                  <a:rPr lang="en-US">
+                    <a:noFill/>
+                  </a:rPr>
+                  <a:t> </a:t>
+                </a:r>
+              </a:p>
+            </p:txBody>
+          </p:sp>
+        </mc:Fallback>
+      </mc:AlternateContent>
+      <p:sp>
+        <p:nvSpPr>
+          <p:cNvPr id="3" name="Content Placeholder 2"/>
+          <p:cNvSpPr>
+            <a:spLocks noGrp="1"/>
+          </p:cNvSpPr>
+          <p:nvPr>
+            <p:ph idx="1"/>
+          </p:nvPr>
+        </p:nvSpPr>
+        <p:spPr>
+          <a:xfrm>
+            <a:off x="1120000" y="1825625"/>
+            <a:ext cx="10791914" cy="4351338"/>
+          </a:xfrm>
+        </p:spPr>
+        <p:txBody>
+          <a:bodyPr/>
+          <a:lstStyle/>
+          <a:p>
+            <a:pPr marL="0" indent="0">
+              <a:buNone/>
+            </a:pPr>
+            <a:r>
+              <a:rPr lang="en-US">
+                <a:latin typeface="Consolas" panose="020B0609020204030204" pitchFamily="49" charset="0"/>
+              </a:rPr>
+              <a:t>template&lt;bool...&gt;</a:t>
+            </a:r>
+          </a:p>
+          <a:p>
+            <a:pPr marL="0" indent="0">
+              <a:buNone/>
+            </a:pPr>
+            <a:r>
+              <a:rPr lang="en-US">
+                <a:latin typeface="Consolas" panose="020B0609020204030204" pitchFamily="49" charset="0"/>
+              </a:rPr>
+              <a:t>struct all_helper {};</a:t>
+            </a:r>
+          </a:p>
+          <a:p>
+            <a:pPr marL="0" indent="0">
+              <a:buNone/>
+            </a:pPr>
+            <a:endParaRPr lang="en-US">
+              <a:latin typeface="Consolas" panose="020B0609020204030204" pitchFamily="49" charset="0"/>
+            </a:endParaRPr>
+          </a:p>
+          <a:p>
+            <a:pPr marL="0" indent="0">
+              <a:buNone/>
+            </a:pPr>
+            <a:r>
+              <a:rPr lang="en-US">
+                <a:latin typeface="Consolas" panose="020B0609020204030204" pitchFamily="49" charset="0"/>
+              </a:rPr>
+              <a:t>template&lt;bool... Args&gt;</a:t>
+            </a:r>
+          </a:p>
+          <a:p>
+            <a:pPr marL="0" indent="0">
+              <a:buNone/>
+            </a:pPr>
+            <a:r>
+              <a:rPr lang="en-US">
+                <a:latin typeface="Consolas" panose="020B0609020204030204" pitchFamily="49" charset="0"/>
+              </a:rPr>
+              <a:t>using </a:t>
+            </a:r>
+            <a:r>
+              <a:rPr lang="en-US" smtClean="0">
+                <a:latin typeface="Consolas" panose="020B0609020204030204" pitchFamily="49" charset="0"/>
+              </a:rPr>
+              <a:t>all_true </a:t>
+            </a:r>
+            <a:r>
+              <a:rPr lang="en-US">
+                <a:latin typeface="Consolas" panose="020B0609020204030204" pitchFamily="49" charset="0"/>
+              </a:rPr>
+              <a:t>= is_same&lt;all_helper&lt;true, Args</a:t>
+            </a:r>
+            <a:r>
+              <a:rPr lang="en-US" smtClean="0">
+                <a:latin typeface="Consolas" panose="020B0609020204030204" pitchFamily="49" charset="0"/>
+              </a:rPr>
+              <a:t>...&gt;,</a:t>
+            </a:r>
+            <a:br>
+              <a:rPr lang="en-US" smtClean="0">
+                <a:latin typeface="Consolas" panose="020B0609020204030204" pitchFamily="49" charset="0"/>
+              </a:rPr>
+            </a:br>
+            <a:r>
+              <a:rPr lang="en-US" smtClean="0">
+                <a:latin typeface="Consolas" panose="020B0609020204030204" pitchFamily="49" charset="0"/>
+              </a:rPr>
+              <a:t>                         all_helper&lt;Args</a:t>
+            </a:r>
+            <a:r>
+              <a:rPr lang="en-US">
+                <a:latin typeface="Consolas" panose="020B0609020204030204" pitchFamily="49" charset="0"/>
+              </a:rPr>
+              <a:t>..., true&gt;&gt;;</a:t>
+            </a:r>
+          </a:p>
+          <a:p>
+            <a:pPr marL="0" indent="0">
+              <a:buNone/>
+            </a:pPr>
+            <a:endParaRPr lang="en-US">
+              <a:latin typeface="Consolas" panose="020B0609020204030204" pitchFamily="49" charset="0"/>
+            </a:endParaRPr>
+          </a:p>
+        </p:txBody>
+      </p:sp>
+    </p:spTree>
+    <p:extLst>
+      <p:ext uri="{BB962C8B-B14F-4D97-AF65-F5344CB8AC3E}">
+        <p14:creationId xmlns:p14="http://schemas.microsoft.com/office/powerpoint/2010/main" val="3476930056"/>
+      </p:ext>
+    </p:extLst>
+  </p:cSld>
+  <p:clrMapOvr>
+    <a:masterClrMapping/>
+  </p:clrMapOvr>
+  <p:timing>
+    <p:tnLst>
+      <p:par>
+        <p:cTn id="1" dur="indefinite" restart="never" nodeType="tmRoot"/>
+      </p:par>
+    </p:tnLst>
+  </p:timing>
+</p:sld>
+</file>
+
+<file path=ppt/slides/slide93.xml><?xml version="1.0" encoding="utf-8"?>
+<p:sld xmlns:a="http://schemas.openxmlformats.org/drawingml/2006/main" xmlns:r="http://schemas.openxmlformats.org/officeDocument/2006/relationships" xmlns:p="http://schemas.openxmlformats.org/presentationml/2006/main">
+  <p:cSld>
+    <p:spTree>
+      <p:nvGrpSpPr>
+        <p:cNvPr id="1" name=""/>
+        <p:cNvGrpSpPr/>
+        <p:nvPr/>
+      </p:nvGrpSpPr>
+      <p:grpSpPr>
+        <a:xfrm>
+          <a:off x="0" y="0"/>
+          <a:ext cx="0" cy="0"/>
+          <a:chOff x="0" y="0"/>
+          <a:chExt cx="0" cy="0"/>
+        </a:xfrm>
+      </p:grpSpPr>
       <p:sp>
         <p:nvSpPr>
           <p:cNvPr id="2" name="Title 1"/>
@@ -29324,7 +29953,7 @@
 </p:sld>
 </file>
 
-<file path=ppt/slides/slide93.xml><?xml version="1.0" encoding="utf-8"?>
+<file path=ppt/slides/slide94.xml><?xml version="1.0" encoding="utf-8"?>
 <p:sld xmlns:a="http://schemas.openxmlformats.org/drawingml/2006/main" xmlns:r="http://schemas.openxmlformats.org/officeDocument/2006/relationships" xmlns:p="http://schemas.openxmlformats.org/presentationml/2006/main">
   <p:cSld>
     <p:spTree>
@@ -29467,316 +30096,6 @@
 </p:sld>
 </file>
 
-<file path=ppt/slides/slide94.xml><?xml version="1.0" encoding="utf-8"?>
-<p:sld xmlns:a="http://schemas.openxmlformats.org/drawingml/2006/main" xmlns:r="http://schemas.openxmlformats.org/officeDocument/2006/relationships" xmlns:p="http://schemas.openxmlformats.org/presentationml/2006/main">
-  <p:cSld>
-    <p:spTree>
-      <p:nvGrpSpPr>
-        <p:cNvPr id="1" name=""/>
-        <p:cNvGrpSpPr/>
-        <p:nvPr/>
-      </p:nvGrpSpPr>
-      <p:grpSpPr>
-        <a:xfrm>
-          <a:off x="0" y="0"/>
-          <a:ext cx="0" cy="0"/>
-          <a:chOff x="0" y="0"/>
-          <a:chExt cx="0" cy="0"/>
-        </a:xfrm>
-      </p:grpSpPr>
-      <p:sp>
-        <p:nvSpPr>
-          <p:cNvPr id="4" name="Title 3"/>
-          <p:cNvSpPr>
-            <a:spLocks noGrp="1"/>
-          </p:cNvSpPr>
-          <p:nvPr>
-            <p:ph type="title"/>
-          </p:nvPr>
-        </p:nvSpPr>
-        <p:spPr/>
-        <p:txBody>
-          <a:bodyPr/>
-          <a:lstStyle/>
-          <a:p>
-            <a:r>
-              <a:rPr lang="ru-RU" smtClean="0"/>
-              <a:t>Заворачивание в </a:t>
-            </a:r>
-            <a:r>
-              <a:rPr lang="en-US" smtClean="0"/>
-              <a:t>exception_ptr</a:t>
-            </a:r>
-            <a:endParaRPr lang="en-US"/>
-          </a:p>
-        </p:txBody>
-      </p:sp>
-      <p:sp>
-        <p:nvSpPr>
-          <p:cNvPr id="5" name="Content Placeholder 4"/>
-          <p:cNvSpPr>
-            <a:spLocks noGrp="1"/>
-          </p:cNvSpPr>
-          <p:nvPr>
-            <p:ph idx="1"/>
-          </p:nvPr>
-        </p:nvSpPr>
-        <p:spPr>
-          <a:xfrm>
-            <a:off x="1120000" y="1825624"/>
-            <a:ext cx="10233800" cy="4904689"/>
-          </a:xfrm>
-        </p:spPr>
-        <p:txBody>
-          <a:bodyPr/>
-          <a:lstStyle/>
-          <a:p>
-            <a:pPr marL="0" indent="0">
-              <a:buNone/>
-            </a:pPr>
-            <a:r>
-              <a:rPr lang="en-US">
-                <a:latin typeface="Consolas" panose="020B0609020204030204" pitchFamily="49" charset="0"/>
-              </a:rPr>
-              <a:t>void do_raise () </a:t>
-            </a:r>
-            <a:r>
-              <a:rPr lang="en-US" smtClean="0">
-                <a:latin typeface="Consolas" panose="020B0609020204030204" pitchFamily="49" charset="0"/>
-              </a:rPr>
-              <a:t>{</a:t>
-            </a:r>
-            <a:br>
-              <a:rPr lang="en-US" smtClean="0">
-                <a:latin typeface="Consolas" panose="020B0609020204030204" pitchFamily="49" charset="0"/>
-              </a:rPr>
-            </a:br>
-            <a:r>
-              <a:rPr lang="en-US" smtClean="0">
-                <a:latin typeface="Consolas" panose="020B0609020204030204" pitchFamily="49" charset="0"/>
-              </a:rPr>
-              <a:t>  </a:t>
-            </a:r>
-            <a:r>
-              <a:rPr lang="en-US">
-                <a:latin typeface="Consolas" panose="020B0609020204030204" pitchFamily="49" charset="0"/>
-              </a:rPr>
-              <a:t>throw runtime_error("Exception</a:t>
-            </a:r>
-            <a:r>
-              <a:rPr lang="en-US" smtClean="0">
-                <a:latin typeface="Consolas" panose="020B0609020204030204" pitchFamily="49" charset="0"/>
-              </a:rPr>
-              <a:t>!");</a:t>
-            </a:r>
-            <a:br>
-              <a:rPr lang="en-US" smtClean="0">
-                <a:latin typeface="Consolas" panose="020B0609020204030204" pitchFamily="49" charset="0"/>
-              </a:rPr>
-            </a:br>
-            <a:r>
-              <a:rPr lang="en-US" smtClean="0">
-                <a:latin typeface="Consolas" panose="020B0609020204030204" pitchFamily="49" charset="0"/>
-              </a:rPr>
-              <a:t>}</a:t>
-            </a:r>
-          </a:p>
-          <a:p>
-            <a:pPr marL="0" indent="0">
-              <a:buNone/>
-            </a:pPr>
-            <a:r>
-              <a:rPr lang="en-US" smtClean="0">
-                <a:latin typeface="Consolas" panose="020B0609020204030204" pitchFamily="49" charset="0"/>
-              </a:rPr>
-              <a:t>exception_ptr </a:t>
-            </a:r>
-            <a:r>
-              <a:rPr lang="en-US">
-                <a:latin typeface="Consolas" panose="020B0609020204030204" pitchFamily="49" charset="0"/>
-              </a:rPr>
-              <a:t>get_exception () </a:t>
-            </a:r>
-            <a:r>
-              <a:rPr lang="en-US" smtClean="0">
-                <a:latin typeface="Consolas" panose="020B0609020204030204" pitchFamily="49" charset="0"/>
-              </a:rPr>
-              <a:t>{</a:t>
-            </a:r>
-            <a:br>
-              <a:rPr lang="en-US" smtClean="0">
-                <a:latin typeface="Consolas" panose="020B0609020204030204" pitchFamily="49" charset="0"/>
-              </a:rPr>
-            </a:br>
-            <a:r>
-              <a:rPr lang="en-US" smtClean="0">
-                <a:latin typeface="Consolas" panose="020B0609020204030204" pitchFamily="49" charset="0"/>
-              </a:rPr>
-              <a:t>  </a:t>
-            </a:r>
-            <a:r>
-              <a:rPr lang="en-US">
-                <a:latin typeface="Consolas" panose="020B0609020204030204" pitchFamily="49" charset="0"/>
-              </a:rPr>
-              <a:t>try </a:t>
-            </a:r>
-            <a:r>
-              <a:rPr lang="en-US" smtClean="0">
-                <a:latin typeface="Consolas" panose="020B0609020204030204" pitchFamily="49" charset="0"/>
-              </a:rPr>
-              <a:t>{</a:t>
-            </a:r>
-            <a:br>
-              <a:rPr lang="en-US" smtClean="0">
-                <a:latin typeface="Consolas" panose="020B0609020204030204" pitchFamily="49" charset="0"/>
-              </a:rPr>
-            </a:br>
-            <a:r>
-              <a:rPr lang="en-US" smtClean="0">
-                <a:latin typeface="Consolas" panose="020B0609020204030204" pitchFamily="49" charset="0"/>
-              </a:rPr>
-              <a:t>    </a:t>
-            </a:r>
-            <a:r>
-              <a:rPr lang="en-US">
-                <a:latin typeface="Consolas" panose="020B0609020204030204" pitchFamily="49" charset="0"/>
-              </a:rPr>
-              <a:t>do_raise </a:t>
-            </a:r>
-            <a:r>
-              <a:rPr lang="en-US" smtClean="0">
-                <a:latin typeface="Consolas" panose="020B0609020204030204" pitchFamily="49" charset="0"/>
-              </a:rPr>
-              <a:t>();</a:t>
-            </a:r>
-            <a:br>
-              <a:rPr lang="en-US" smtClean="0">
-                <a:latin typeface="Consolas" panose="020B0609020204030204" pitchFamily="49" charset="0"/>
-              </a:rPr>
-            </a:br>
-            <a:r>
-              <a:rPr lang="en-US" smtClean="0">
-                <a:latin typeface="Consolas" panose="020B0609020204030204" pitchFamily="49" charset="0"/>
-              </a:rPr>
-              <a:t>  }</a:t>
-            </a:r>
-            <a:br>
-              <a:rPr lang="en-US" smtClean="0">
-                <a:latin typeface="Consolas" panose="020B0609020204030204" pitchFamily="49" charset="0"/>
-              </a:rPr>
-            </a:br>
-            <a:r>
-              <a:rPr lang="en-US" smtClean="0">
-                <a:latin typeface="Consolas" panose="020B0609020204030204" pitchFamily="49" charset="0"/>
-              </a:rPr>
-              <a:t>  </a:t>
-            </a:r>
-            <a:r>
-              <a:rPr lang="en-US">
-                <a:latin typeface="Consolas" panose="020B0609020204030204" pitchFamily="49" charset="0"/>
-              </a:rPr>
-              <a:t>catch (...) </a:t>
-            </a:r>
-            <a:r>
-              <a:rPr lang="en-US" smtClean="0">
-                <a:latin typeface="Consolas" panose="020B0609020204030204" pitchFamily="49" charset="0"/>
-              </a:rPr>
-              <a:t>{</a:t>
-            </a:r>
-            <a:br>
-              <a:rPr lang="en-US" smtClean="0">
-                <a:latin typeface="Consolas" panose="020B0609020204030204" pitchFamily="49" charset="0"/>
-              </a:rPr>
-            </a:br>
-            <a:r>
-              <a:rPr lang="en-US" smtClean="0">
-                <a:latin typeface="Consolas" panose="020B0609020204030204" pitchFamily="49" charset="0"/>
-              </a:rPr>
-              <a:t>    </a:t>
-            </a:r>
-            <a:r>
-              <a:rPr lang="en-US">
-                <a:latin typeface="Consolas" panose="020B0609020204030204" pitchFamily="49" charset="0"/>
-              </a:rPr>
-              <a:t>return current_exception </a:t>
-            </a:r>
-            <a:r>
-              <a:rPr lang="en-US" smtClean="0">
-                <a:latin typeface="Consolas" panose="020B0609020204030204" pitchFamily="49" charset="0"/>
-              </a:rPr>
-              <a:t>();</a:t>
-            </a:r>
-            <a:br>
-              <a:rPr lang="en-US" smtClean="0">
-                <a:latin typeface="Consolas" panose="020B0609020204030204" pitchFamily="49" charset="0"/>
-              </a:rPr>
-            </a:br>
-            <a:r>
-              <a:rPr lang="en-US" smtClean="0">
-                <a:latin typeface="Consolas" panose="020B0609020204030204" pitchFamily="49" charset="0"/>
-              </a:rPr>
-              <a:t>  }</a:t>
-            </a:r>
-            <a:br>
-              <a:rPr lang="en-US" smtClean="0">
-                <a:latin typeface="Consolas" panose="020B0609020204030204" pitchFamily="49" charset="0"/>
-              </a:rPr>
-            </a:br>
-            <a:r>
-              <a:rPr lang="en-US" smtClean="0">
-                <a:latin typeface="Consolas" panose="020B0609020204030204" pitchFamily="49" charset="0"/>
-              </a:rPr>
-              <a:t>  </a:t>
-            </a:r>
-            <a:r>
-              <a:rPr lang="en-US">
-                <a:latin typeface="Consolas" panose="020B0609020204030204" pitchFamily="49" charset="0"/>
-              </a:rPr>
-              <a:t>return nullptr</a:t>
-            </a:r>
-            <a:r>
-              <a:rPr lang="en-US" smtClean="0">
-                <a:latin typeface="Consolas" panose="020B0609020204030204" pitchFamily="49" charset="0"/>
-              </a:rPr>
-              <a:t>;</a:t>
-            </a:r>
-            <a:br>
-              <a:rPr lang="en-US" smtClean="0">
-                <a:latin typeface="Consolas" panose="020B0609020204030204" pitchFamily="49" charset="0"/>
-              </a:rPr>
-            </a:br>
-            <a:r>
-              <a:rPr lang="en-US" smtClean="0">
-                <a:latin typeface="Consolas" panose="020B0609020204030204" pitchFamily="49" charset="0"/>
-              </a:rPr>
-              <a:t>}</a:t>
-            </a:r>
-            <a:endParaRPr lang="en-US">
-              <a:latin typeface="Consolas" panose="020B0609020204030204" pitchFamily="49" charset="0"/>
-            </a:endParaRPr>
-          </a:p>
-        </p:txBody>
-      </p:sp>
-    </p:spTree>
-    <p:extLst>
-      <p:ext uri="{BB962C8B-B14F-4D97-AF65-F5344CB8AC3E}">
-        <p14:creationId xmlns:p14="http://schemas.microsoft.com/office/powerpoint/2010/main" val="3041066417"/>
-      </p:ext>
-    </p:extLst>
-  </p:cSld>
-  <p:clrMapOvr>
-    <a:masterClrMapping/>
-  </p:clrMapOvr>
-  <p:timing>
-    <p:tnLst>
-      <p:par>
-        <p:cTn id="1" dur="indefinite" restart="never" nodeType="tmRoot"/>
-      </p:par>
-    </p:tnLst>
-  </p:timing>
-</p:sld>
-</file>
-
 <file path=ppt/slides/slide95.xml><?xml version="1.0" encoding="utf-8"?>
 <p:sld xmlns:a="http://schemas.openxmlformats.org/drawingml/2006/main" xmlns:r="http://schemas.openxmlformats.org/officeDocument/2006/relationships" xmlns:p="http://schemas.openxmlformats.org/presentationml/2006/main">
   <p:cSld>
@@ -29811,7 +30130,7 @@
           <a:p>
             <a:r>
               <a:rPr lang="ru-RU" smtClean="0"/>
-              <a:t>Использование </a:t>
+              <a:t>Заворачивание в </a:t>
             </a:r>
             <a:r>
               <a:rPr lang="en-US" smtClean="0"/>
@@ -29838,56 +30157,54 @@
           </a:xfrm>
         </p:spPr>
         <p:txBody>
-          <a:bodyPr>
-            <a:normAutofit/>
-          </a:bodyPr>
+          <a:bodyPr/>
           <a:lstStyle/>
           <a:p>
             <a:pPr marL="0" indent="0">
               <a:buNone/>
             </a:pPr>
             <a:r>
-              <a:rPr lang="en-US" sz="2000">
+              <a:rPr lang="en-US">
                 <a:latin typeface="Consolas" panose="020B0609020204030204" pitchFamily="49" charset="0"/>
               </a:rPr>
               <a:t>void do_raise () </a:t>
             </a:r>
             <a:r>
-              <a:rPr lang="en-US" sz="2000" smtClean="0">
+              <a:rPr lang="en-US" smtClean="0">
                 <a:latin typeface="Consolas" panose="020B0609020204030204" pitchFamily="49" charset="0"/>
               </a:rPr>
               <a:t>{</a:t>
             </a:r>
             <a:br>
-              <a:rPr lang="en-US" sz="2000" smtClean="0">
-                <a:latin typeface="Consolas" panose="020B0609020204030204" pitchFamily="49" charset="0"/>
-              </a:rPr>
-            </a:br>
-            <a:r>
-              <a:rPr lang="en-US" sz="2000" smtClean="0">
+              <a:rPr lang="en-US" smtClean="0">
+                <a:latin typeface="Consolas" panose="020B0609020204030204" pitchFamily="49" charset="0"/>
+              </a:rPr>
+            </a:br>
+            <a:r>
+              <a:rPr lang="en-US" smtClean="0">
                 <a:latin typeface="Consolas" panose="020B0609020204030204" pitchFamily="49" charset="0"/>
               </a:rPr>
               <a:t>  </a:t>
             </a:r>
             <a:r>
-              <a:rPr lang="en-US" sz="2000">
+              <a:rPr lang="en-US">
                 <a:latin typeface="Consolas" panose="020B0609020204030204" pitchFamily="49" charset="0"/>
               </a:rPr>
               <a:t>throw runtime_error("Exception</a:t>
             </a:r>
             <a:r>
-              <a:rPr lang="en-US" sz="2000" smtClean="0">
+              <a:rPr lang="en-US" smtClean="0">
                 <a:latin typeface="Consolas" panose="020B0609020204030204" pitchFamily="49" charset="0"/>
               </a:rPr>
               <a:t>!");</a:t>
             </a:r>
             <a:br>
-              <a:rPr lang="en-US" sz="2000" smtClean="0">
-                <a:latin typeface="Consolas" panose="020B0609020204030204" pitchFamily="49" charset="0"/>
-              </a:rPr>
-            </a:br>
-            <a:r>
-              <a:rPr lang="en-US" sz="2000" smtClean="0">
+              <a:rPr lang="en-US" smtClean="0">
+                <a:latin typeface="Consolas" panose="020B0609020204030204" pitchFamily="49" charset="0"/>
+              </a:rPr>
+            </a:br>
+            <a:r>
+              <a:rPr lang="en-US" smtClean="0">
                 <a:latin typeface="Consolas" panose="020B0609020204030204" pitchFamily="49" charset="0"/>
               </a:rPr>
               <a:t>}</a:t>
@@ -29898,232 +30215,172 @@
               <a:buNone/>
             </a:pPr>
             <a:r>
-              <a:rPr lang="en-US" sz="2000" smtClean="0">
+              <a:rPr lang="en-US" smtClean="0">
                 <a:latin typeface="Consolas" panose="020B0609020204030204" pitchFamily="49" charset="0"/>
               </a:rPr>
               <a:t>exception_ptr </a:t>
             </a:r>
             <a:r>
-              <a:rPr lang="en-US" sz="2000">
+              <a:rPr lang="en-US">
                 <a:latin typeface="Consolas" panose="020B0609020204030204" pitchFamily="49" charset="0"/>
               </a:rPr>
               <a:t>get_exception () </a:t>
             </a:r>
             <a:r>
-              <a:rPr lang="en-US" sz="2000" smtClean="0">
+              <a:rPr lang="en-US" smtClean="0">
                 <a:latin typeface="Consolas" panose="020B0609020204030204" pitchFamily="49" charset="0"/>
               </a:rPr>
               <a:t>{</a:t>
             </a:r>
             <a:br>
-              <a:rPr lang="en-US" sz="2000" smtClean="0">
-                <a:latin typeface="Consolas" panose="020B0609020204030204" pitchFamily="49" charset="0"/>
-              </a:rPr>
-            </a:br>
-            <a:r>
-              <a:rPr lang="en-US" sz="2000" smtClean="0">
+              <a:rPr lang="en-US" smtClean="0">
+                <a:latin typeface="Consolas" panose="020B0609020204030204" pitchFamily="49" charset="0"/>
+              </a:rPr>
+            </a:br>
+            <a:r>
+              <a:rPr lang="en-US" smtClean="0">
                 <a:latin typeface="Consolas" panose="020B0609020204030204" pitchFamily="49" charset="0"/>
               </a:rPr>
               <a:t>  </a:t>
             </a:r>
             <a:r>
-              <a:rPr lang="en-US" sz="2000">
+              <a:rPr lang="en-US">
                 <a:latin typeface="Consolas" panose="020B0609020204030204" pitchFamily="49" charset="0"/>
               </a:rPr>
               <a:t>try </a:t>
             </a:r>
             <a:r>
-              <a:rPr lang="en-US" sz="2000" smtClean="0">
+              <a:rPr lang="en-US" smtClean="0">
                 <a:latin typeface="Consolas" panose="020B0609020204030204" pitchFamily="49" charset="0"/>
               </a:rPr>
               <a:t>{</a:t>
             </a:r>
             <a:br>
-              <a:rPr lang="en-US" sz="2000" smtClean="0">
-                <a:latin typeface="Consolas" panose="020B0609020204030204" pitchFamily="49" charset="0"/>
-              </a:rPr>
-            </a:br>
-            <a:r>
-              <a:rPr lang="en-US" sz="2000" smtClean="0">
+              <a:rPr lang="en-US" smtClean="0">
+                <a:latin typeface="Consolas" panose="020B0609020204030204" pitchFamily="49" charset="0"/>
+              </a:rPr>
+            </a:br>
+            <a:r>
+              <a:rPr lang="en-US" smtClean="0">
                 <a:latin typeface="Consolas" panose="020B0609020204030204" pitchFamily="49" charset="0"/>
               </a:rPr>
               <a:t>    </a:t>
             </a:r>
             <a:r>
-              <a:rPr lang="en-US" sz="2000">
+              <a:rPr lang="en-US">
                 <a:latin typeface="Consolas" panose="020B0609020204030204" pitchFamily="49" charset="0"/>
               </a:rPr>
               <a:t>do_raise </a:t>
             </a:r>
             <a:r>
-              <a:rPr lang="en-US" sz="2000" smtClean="0">
+              <a:rPr lang="en-US" smtClean="0">
                 <a:latin typeface="Consolas" panose="020B0609020204030204" pitchFamily="49" charset="0"/>
               </a:rPr>
               <a:t>();</a:t>
             </a:r>
             <a:br>
-              <a:rPr lang="en-US" sz="2000" smtClean="0">
-                <a:latin typeface="Consolas" panose="020B0609020204030204" pitchFamily="49" charset="0"/>
-              </a:rPr>
-            </a:br>
-            <a:r>
-              <a:rPr lang="en-US" sz="2000" smtClean="0">
+              <a:rPr lang="en-US" smtClean="0">
+                <a:latin typeface="Consolas" panose="020B0609020204030204" pitchFamily="49" charset="0"/>
+              </a:rPr>
+            </a:br>
+            <a:r>
+              <a:rPr lang="en-US" smtClean="0">
                 <a:latin typeface="Consolas" panose="020B0609020204030204" pitchFamily="49" charset="0"/>
               </a:rPr>
               <a:t>  }</a:t>
             </a:r>
             <a:br>
-              <a:rPr lang="en-US" sz="2000" smtClean="0">
-                <a:latin typeface="Consolas" panose="020B0609020204030204" pitchFamily="49" charset="0"/>
-              </a:rPr>
-            </a:br>
-            <a:r>
-              <a:rPr lang="en-US" sz="2000" smtClean="0">
+              <a:rPr lang="en-US" smtClean="0">
+                <a:latin typeface="Consolas" panose="020B0609020204030204" pitchFamily="49" charset="0"/>
+              </a:rPr>
+            </a:br>
+            <a:r>
+              <a:rPr lang="en-US" smtClean="0">
                 <a:latin typeface="Consolas" panose="020B0609020204030204" pitchFamily="49" charset="0"/>
               </a:rPr>
               <a:t>  </a:t>
             </a:r>
             <a:r>
-              <a:rPr lang="en-US" sz="2000">
+              <a:rPr lang="en-US">
                 <a:latin typeface="Consolas" panose="020B0609020204030204" pitchFamily="49" charset="0"/>
               </a:rPr>
               <a:t>catch (...) </a:t>
             </a:r>
             <a:r>
-              <a:rPr lang="en-US" sz="2000" smtClean="0">
+              <a:rPr lang="en-US" smtClean="0">
                 <a:latin typeface="Consolas" panose="020B0609020204030204" pitchFamily="49" charset="0"/>
               </a:rPr>
               <a:t>{</a:t>
             </a:r>
             <a:br>
-              <a:rPr lang="en-US" sz="2000" smtClean="0">
-                <a:latin typeface="Consolas" panose="020B0609020204030204" pitchFamily="49" charset="0"/>
-              </a:rPr>
-            </a:br>
-            <a:r>
-              <a:rPr lang="en-US" sz="2000" smtClean="0">
+              <a:rPr lang="en-US" smtClean="0">
+                <a:latin typeface="Consolas" panose="020B0609020204030204" pitchFamily="49" charset="0"/>
+              </a:rPr>
+            </a:br>
+            <a:r>
+              <a:rPr lang="en-US" smtClean="0">
                 <a:latin typeface="Consolas" panose="020B0609020204030204" pitchFamily="49" charset="0"/>
               </a:rPr>
               <a:t>    </a:t>
             </a:r>
             <a:r>
-              <a:rPr lang="en-US" sz="2000">
+              <a:rPr lang="en-US">
                 <a:latin typeface="Consolas" panose="020B0609020204030204" pitchFamily="49" charset="0"/>
               </a:rPr>
               <a:t>return current_exception </a:t>
             </a:r>
             <a:r>
-              <a:rPr lang="en-US" sz="2000" smtClean="0">
+              <a:rPr lang="en-US" smtClean="0">
                 <a:latin typeface="Consolas" panose="020B0609020204030204" pitchFamily="49" charset="0"/>
               </a:rPr>
               <a:t>();</a:t>
             </a:r>
             <a:br>
-              <a:rPr lang="en-US" sz="2000" smtClean="0">
-                <a:latin typeface="Consolas" panose="020B0609020204030204" pitchFamily="49" charset="0"/>
-              </a:rPr>
-            </a:br>
-            <a:r>
-              <a:rPr lang="en-US" sz="2000" smtClean="0">
+              <a:rPr lang="en-US" smtClean="0">
+                <a:latin typeface="Consolas" panose="020B0609020204030204" pitchFamily="49" charset="0"/>
+              </a:rPr>
+            </a:br>
+            <a:r>
+              <a:rPr lang="en-US" smtClean="0">
                 <a:latin typeface="Consolas" panose="020B0609020204030204" pitchFamily="49" charset="0"/>
               </a:rPr>
               <a:t>  }</a:t>
             </a:r>
             <a:br>
-              <a:rPr lang="en-US" sz="2000" smtClean="0">
-                <a:latin typeface="Consolas" panose="020B0609020204030204" pitchFamily="49" charset="0"/>
-              </a:rPr>
-            </a:br>
-            <a:r>
-              <a:rPr lang="en-US" sz="2000" smtClean="0">
+              <a:rPr lang="en-US" smtClean="0">
+                <a:latin typeface="Consolas" panose="020B0609020204030204" pitchFamily="49" charset="0"/>
+              </a:rPr>
+            </a:br>
+            <a:r>
+              <a:rPr lang="en-US" smtClean="0">
                 <a:latin typeface="Consolas" panose="020B0609020204030204" pitchFamily="49" charset="0"/>
               </a:rPr>
               <a:t>  </a:t>
             </a:r>
             <a:r>
-              <a:rPr lang="en-US" sz="2000">
+              <a:rPr lang="en-US">
                 <a:latin typeface="Consolas" panose="020B0609020204030204" pitchFamily="49" charset="0"/>
               </a:rPr>
               <a:t>return nullptr</a:t>
             </a:r>
             <a:r>
-              <a:rPr lang="en-US" sz="2000" smtClean="0">
+              <a:rPr lang="en-US" smtClean="0">
                 <a:latin typeface="Consolas" panose="020B0609020204030204" pitchFamily="49" charset="0"/>
               </a:rPr>
               <a:t>;</a:t>
             </a:r>
             <a:br>
-              <a:rPr lang="en-US" sz="2000" smtClean="0">
-                <a:latin typeface="Consolas" panose="020B0609020204030204" pitchFamily="49" charset="0"/>
-              </a:rPr>
-            </a:br>
-            <a:r>
-              <a:rPr lang="en-US" sz="2000" smtClean="0">
+              <a:rPr lang="en-US" smtClean="0">
+                <a:latin typeface="Consolas" panose="020B0609020204030204" pitchFamily="49" charset="0"/>
+              </a:rPr>
+            </a:br>
+            <a:r>
+              <a:rPr lang="en-US" smtClean="0">
                 <a:latin typeface="Consolas" panose="020B0609020204030204" pitchFamily="49" charset="0"/>
               </a:rPr>
               <a:t>}</a:t>
             </a:r>
-            <a:endParaRPr lang="ru-RU" sz="2000" smtClean="0">
-              <a:latin typeface="Consolas" panose="020B0609020204030204" pitchFamily="49" charset="0"/>
-            </a:endParaRPr>
-          </a:p>
-          <a:p>
-            <a:pPr marL="0" indent="0">
-              <a:buNone/>
-            </a:pPr>
-            <a:r>
-              <a:rPr lang="en-US" sz="2000" smtClean="0">
-                <a:latin typeface="Consolas" panose="020B0609020204030204" pitchFamily="49" charset="0"/>
-              </a:rPr>
-              <a:t>// </a:t>
-            </a:r>
-            <a:r>
-              <a:rPr lang="ru-RU" sz="2000" smtClean="0">
-                <a:latin typeface="Consolas" panose="020B0609020204030204" pitchFamily="49" charset="0"/>
-              </a:rPr>
-              <a:t>где-то далее в коде</a:t>
-            </a:r>
-          </a:p>
-          <a:p>
-            <a:pPr marL="0" indent="0">
-              <a:buNone/>
-            </a:pPr>
-            <a:r>
-              <a:rPr lang="en-US" sz="2000" smtClean="0">
-                <a:latin typeface="Consolas" panose="020B0609020204030204" pitchFamily="49" charset="0"/>
-              </a:rPr>
-              <a:t>exception_ptr </a:t>
-            </a:r>
-            <a:r>
-              <a:rPr lang="en-US" sz="2000">
-                <a:latin typeface="Consolas" panose="020B0609020204030204" pitchFamily="49" charset="0"/>
-              </a:rPr>
-              <a:t>e = get_exception </a:t>
-            </a:r>
-            <a:r>
-              <a:rPr lang="en-US" sz="2000" smtClean="0">
-                <a:latin typeface="Consolas" panose="020B0609020204030204" pitchFamily="49" charset="0"/>
-              </a:rPr>
-              <a:t>();</a:t>
-            </a:r>
-            <a:r>
-              <a:rPr lang="ru-RU" sz="2000" smtClean="0">
-                <a:latin typeface="Consolas" panose="020B0609020204030204" pitchFamily="49" charset="0"/>
-              </a:rPr>
-              <a:t/>
-            </a:r>
-            <a:br>
-              <a:rPr lang="ru-RU" sz="2000" smtClean="0">
-                <a:latin typeface="Consolas" panose="020B0609020204030204" pitchFamily="49" charset="0"/>
-              </a:rPr>
-            </a:br>
-            <a:r>
-              <a:rPr lang="en-US" sz="2000" smtClean="0">
-                <a:latin typeface="Consolas" panose="020B0609020204030204" pitchFamily="49" charset="0"/>
-              </a:rPr>
-              <a:t>rethrow_exception(e);</a:t>
-            </a:r>
-            <a:endParaRPr lang="en-US" sz="2000">
+            <a:endParaRPr lang="en-US">
               <a:latin typeface="Consolas" panose="020B0609020204030204" pitchFamily="49" charset="0"/>
             </a:endParaRPr>
           </a:p>
@@ -30132,7 +30389,7 @@
     </p:spTree>
     <p:extLst>
       <p:ext uri="{BB962C8B-B14F-4D97-AF65-F5344CB8AC3E}">
-        <p14:creationId xmlns:p14="http://schemas.microsoft.com/office/powerpoint/2010/main" val="4284677047"/>
+        <p14:creationId xmlns:p14="http://schemas.microsoft.com/office/powerpoint/2010/main" val="3041066417"/>
       </p:ext>
     </p:extLst>
   </p:cSld>
@@ -30168,7 +30425,7 @@
       </p:grpSpPr>
       <p:sp>
         <p:nvSpPr>
-          <p:cNvPr id="2" name="Title 1"/>
+          <p:cNvPr id="4" name="Title 3"/>
           <p:cNvSpPr>
             <a:spLocks noGrp="1"/>
           </p:cNvSpPr>
@@ -30183,7 +30440,11 @@
           <a:p>
             <a:r>
               <a:rPr lang="ru-RU" smtClean="0"/>
-              <a:t>Обсуждение</a:t>
+              <a:t>Использование </a:t>
+            </a:r>
+            <a:r>
+              <a:rPr lang="en-US" smtClean="0"/>
+              <a:t>exception_ptr</a:t>
             </a:r>
             <a:endParaRPr lang="en-US"/>
           </a:p>
@@ -30191,7 +30452,7 @@
       </p:sp>
       <p:sp>
         <p:nvSpPr>
-          <p:cNvPr id="3" name="Content Placeholder 2"/>
+          <p:cNvPr id="5" name="Content Placeholder 4"/>
           <p:cNvSpPr>
             <a:spLocks noGrp="1"/>
           </p:cNvSpPr>
@@ -30199,35 +30460,308 @@
             <p:ph idx="1"/>
           </p:nvPr>
         </p:nvSpPr>
-        <p:spPr/>
+        <p:spPr>
+          <a:xfrm>
+            <a:off x="1120000" y="1825624"/>
+            <a:ext cx="10233800" cy="4904689"/>
+          </a:xfrm>
+        </p:spPr>
         <p:txBody>
-          <a:bodyPr/>
+          <a:bodyPr>
+            <a:normAutofit/>
+          </a:bodyPr>
           <a:lstStyle/>
           <a:p>
-            <a:r>
-              <a:rPr lang="ru-RU"/>
-              <a:t>П</a:t>
-            </a:r>
-            <a:r>
-              <a:rPr lang="ru-RU" smtClean="0"/>
-              <a:t>ередача </a:t>
-            </a:r>
-            <a:r>
-              <a:rPr lang="ru-RU" smtClean="0"/>
-              <a:t>таким образом исключений между </a:t>
-            </a:r>
-            <a:r>
-              <a:rPr lang="en-US" smtClean="0"/>
-              <a:t>threads</a:t>
-            </a:r>
-            <a:endParaRPr lang="en-US"/>
+            <a:pPr marL="0" indent="0">
+              <a:buNone/>
+            </a:pPr>
+            <a:r>
+              <a:rPr lang="en-US" sz="2000">
+                <a:latin typeface="Consolas" panose="020B0609020204030204" pitchFamily="49" charset="0"/>
+              </a:rPr>
+              <a:t>void do_raise () </a:t>
+            </a:r>
+            <a:r>
+              <a:rPr lang="en-US" sz="2000" smtClean="0">
+                <a:latin typeface="Consolas" panose="020B0609020204030204" pitchFamily="49" charset="0"/>
+              </a:rPr>
+              <a:t>{</a:t>
+            </a:r>
+            <a:br>
+              <a:rPr lang="en-US" sz="2000" smtClean="0">
+                <a:latin typeface="Consolas" panose="020B0609020204030204" pitchFamily="49" charset="0"/>
+              </a:rPr>
+            </a:br>
+            <a:r>
+              <a:rPr lang="en-US" sz="2000" smtClean="0">
+                <a:latin typeface="Consolas" panose="020B0609020204030204" pitchFamily="49" charset="0"/>
+              </a:rPr>
+              <a:t>  </a:t>
+            </a:r>
+            <a:r>
+              <a:rPr lang="en-US" sz="2000">
+                <a:latin typeface="Consolas" panose="020B0609020204030204" pitchFamily="49" charset="0"/>
+              </a:rPr>
+              <a:t>throw runtime_error("Exception</a:t>
+            </a:r>
+            <a:r>
+              <a:rPr lang="en-US" sz="2000" smtClean="0">
+                <a:latin typeface="Consolas" panose="020B0609020204030204" pitchFamily="49" charset="0"/>
+              </a:rPr>
+              <a:t>!");</a:t>
+            </a:r>
+            <a:br>
+              <a:rPr lang="en-US" sz="2000" smtClean="0">
+                <a:latin typeface="Consolas" panose="020B0609020204030204" pitchFamily="49" charset="0"/>
+              </a:rPr>
+            </a:br>
+            <a:r>
+              <a:rPr lang="en-US" sz="2000" smtClean="0">
+                <a:latin typeface="Consolas" panose="020B0609020204030204" pitchFamily="49" charset="0"/>
+              </a:rPr>
+              <a:t>}</a:t>
+            </a:r>
+          </a:p>
+          <a:p>
+            <a:pPr marL="0" indent="0">
+              <a:buNone/>
+            </a:pPr>
+            <a:r>
+              <a:rPr lang="en-US" sz="2000" smtClean="0">
+                <a:latin typeface="Consolas" panose="020B0609020204030204" pitchFamily="49" charset="0"/>
+              </a:rPr>
+              <a:t>exception_ptr </a:t>
+            </a:r>
+            <a:r>
+              <a:rPr lang="en-US" sz="2000">
+                <a:latin typeface="Consolas" panose="020B0609020204030204" pitchFamily="49" charset="0"/>
+              </a:rPr>
+              <a:t>get_exception () </a:t>
+            </a:r>
+            <a:r>
+              <a:rPr lang="en-US" sz="2000" smtClean="0">
+                <a:latin typeface="Consolas" panose="020B0609020204030204" pitchFamily="49" charset="0"/>
+              </a:rPr>
+              <a:t>{</a:t>
+            </a:r>
+            <a:br>
+              <a:rPr lang="en-US" sz="2000" smtClean="0">
+                <a:latin typeface="Consolas" panose="020B0609020204030204" pitchFamily="49" charset="0"/>
+              </a:rPr>
+            </a:br>
+            <a:r>
+              <a:rPr lang="en-US" sz="2000" smtClean="0">
+                <a:latin typeface="Consolas" panose="020B0609020204030204" pitchFamily="49" charset="0"/>
+              </a:rPr>
+              <a:t>  </a:t>
+            </a:r>
+            <a:r>
+              <a:rPr lang="en-US" sz="2000">
+                <a:latin typeface="Consolas" panose="020B0609020204030204" pitchFamily="49" charset="0"/>
+              </a:rPr>
+              <a:t>try </a:t>
+            </a:r>
+            <a:r>
+              <a:rPr lang="en-US" sz="2000" smtClean="0">
+                <a:latin typeface="Consolas" panose="020B0609020204030204" pitchFamily="49" charset="0"/>
+              </a:rPr>
+              <a:t>{</a:t>
+            </a:r>
+            <a:br>
+              <a:rPr lang="en-US" sz="2000" smtClean="0">
+                <a:latin typeface="Consolas" panose="020B0609020204030204" pitchFamily="49" charset="0"/>
+              </a:rPr>
+            </a:br>
+            <a:r>
+              <a:rPr lang="en-US" sz="2000" smtClean="0">
+                <a:latin typeface="Consolas" panose="020B0609020204030204" pitchFamily="49" charset="0"/>
+              </a:rPr>
+              <a:t>    </a:t>
+            </a:r>
+            <a:r>
+              <a:rPr lang="en-US" sz="2000">
+                <a:latin typeface="Consolas" panose="020B0609020204030204" pitchFamily="49" charset="0"/>
+              </a:rPr>
+              <a:t>do_raise </a:t>
+            </a:r>
+            <a:r>
+              <a:rPr lang="en-US" sz="2000" smtClean="0">
+                <a:latin typeface="Consolas" panose="020B0609020204030204" pitchFamily="49" charset="0"/>
+              </a:rPr>
+              <a:t>();</a:t>
+            </a:r>
+            <a:br>
+              <a:rPr lang="en-US" sz="2000" smtClean="0">
+                <a:latin typeface="Consolas" panose="020B0609020204030204" pitchFamily="49" charset="0"/>
+              </a:rPr>
+            </a:br>
+            <a:r>
+              <a:rPr lang="en-US" sz="2000" smtClean="0">
+                <a:latin typeface="Consolas" panose="020B0609020204030204" pitchFamily="49" charset="0"/>
+              </a:rPr>
+              <a:t>  }</a:t>
+            </a:r>
+            <a:br>
+              <a:rPr lang="en-US" sz="2000" smtClean="0">
+                <a:latin typeface="Consolas" panose="020B0609020204030204" pitchFamily="49" charset="0"/>
+              </a:rPr>
+            </a:br>
+            <a:r>
+              <a:rPr lang="en-US" sz="2000" smtClean="0">
+                <a:latin typeface="Consolas" panose="020B0609020204030204" pitchFamily="49" charset="0"/>
+              </a:rPr>
+              <a:t>  </a:t>
+            </a:r>
+            <a:r>
+              <a:rPr lang="en-US" sz="2000">
+                <a:latin typeface="Consolas" panose="020B0609020204030204" pitchFamily="49" charset="0"/>
+              </a:rPr>
+              <a:t>catch (...) </a:t>
+            </a:r>
+            <a:r>
+              <a:rPr lang="en-US" sz="2000" smtClean="0">
+                <a:latin typeface="Consolas" panose="020B0609020204030204" pitchFamily="49" charset="0"/>
+              </a:rPr>
+              <a:t>{</a:t>
+            </a:r>
+            <a:br>
+              <a:rPr lang="en-US" sz="2000" smtClean="0">
+                <a:latin typeface="Consolas" panose="020B0609020204030204" pitchFamily="49" charset="0"/>
+              </a:rPr>
+            </a:br>
+            <a:r>
+              <a:rPr lang="en-US" sz="2000" smtClean="0">
+                <a:latin typeface="Consolas" panose="020B0609020204030204" pitchFamily="49" charset="0"/>
+              </a:rPr>
+              <a:t>    </a:t>
+            </a:r>
+            <a:r>
+              <a:rPr lang="en-US" sz="2000">
+                <a:latin typeface="Consolas" panose="020B0609020204030204" pitchFamily="49" charset="0"/>
+              </a:rPr>
+              <a:t>return current_exception </a:t>
+            </a:r>
+            <a:r>
+              <a:rPr lang="en-US" sz="2000" smtClean="0">
+                <a:latin typeface="Consolas" panose="020B0609020204030204" pitchFamily="49" charset="0"/>
+              </a:rPr>
+              <a:t>();</a:t>
+            </a:r>
+            <a:br>
+              <a:rPr lang="en-US" sz="2000" smtClean="0">
+                <a:latin typeface="Consolas" panose="020B0609020204030204" pitchFamily="49" charset="0"/>
+              </a:rPr>
+            </a:br>
+            <a:r>
+              <a:rPr lang="en-US" sz="2000" smtClean="0">
+                <a:latin typeface="Consolas" panose="020B0609020204030204" pitchFamily="49" charset="0"/>
+              </a:rPr>
+              <a:t>  }</a:t>
+            </a:r>
+            <a:br>
+              <a:rPr lang="en-US" sz="2000" smtClean="0">
+                <a:latin typeface="Consolas" panose="020B0609020204030204" pitchFamily="49" charset="0"/>
+              </a:rPr>
+            </a:br>
+            <a:r>
+              <a:rPr lang="en-US" sz="2000" smtClean="0">
+                <a:latin typeface="Consolas" panose="020B0609020204030204" pitchFamily="49" charset="0"/>
+              </a:rPr>
+              <a:t>  </a:t>
+            </a:r>
+            <a:r>
+              <a:rPr lang="en-US" sz="2000">
+                <a:latin typeface="Consolas" panose="020B0609020204030204" pitchFamily="49" charset="0"/>
+              </a:rPr>
+              <a:t>return nullptr</a:t>
+            </a:r>
+            <a:r>
+              <a:rPr lang="en-US" sz="2000" smtClean="0">
+                <a:latin typeface="Consolas" panose="020B0609020204030204" pitchFamily="49" charset="0"/>
+              </a:rPr>
+              <a:t>;</a:t>
+            </a:r>
+            <a:br>
+              <a:rPr lang="en-US" sz="2000" smtClean="0">
+                <a:latin typeface="Consolas" panose="020B0609020204030204" pitchFamily="49" charset="0"/>
+              </a:rPr>
+            </a:br>
+            <a:r>
+              <a:rPr lang="en-US" sz="2000" smtClean="0">
+                <a:latin typeface="Consolas" panose="020B0609020204030204" pitchFamily="49" charset="0"/>
+              </a:rPr>
+              <a:t>}</a:t>
+            </a:r>
+            <a:endParaRPr lang="ru-RU" sz="2000" smtClean="0">
+              <a:latin typeface="Consolas" panose="020B0609020204030204" pitchFamily="49" charset="0"/>
+            </a:endParaRPr>
+          </a:p>
+          <a:p>
+            <a:pPr marL="0" indent="0">
+              <a:buNone/>
+            </a:pPr>
+            <a:r>
+              <a:rPr lang="en-US" sz="2000" smtClean="0">
+                <a:latin typeface="Consolas" panose="020B0609020204030204" pitchFamily="49" charset="0"/>
+              </a:rPr>
+              <a:t>// </a:t>
+            </a:r>
+            <a:r>
+              <a:rPr lang="ru-RU" sz="2000" smtClean="0">
+                <a:latin typeface="Consolas" panose="020B0609020204030204" pitchFamily="49" charset="0"/>
+              </a:rPr>
+              <a:t>где-то далее в коде</a:t>
+            </a:r>
+          </a:p>
+          <a:p>
+            <a:pPr marL="0" indent="0">
+              <a:buNone/>
+            </a:pPr>
+            <a:r>
+              <a:rPr lang="en-US" sz="2000" smtClean="0">
+                <a:latin typeface="Consolas" panose="020B0609020204030204" pitchFamily="49" charset="0"/>
+              </a:rPr>
+              <a:t>exception_ptr </a:t>
+            </a:r>
+            <a:r>
+              <a:rPr lang="en-US" sz="2000">
+                <a:latin typeface="Consolas" panose="020B0609020204030204" pitchFamily="49" charset="0"/>
+              </a:rPr>
+              <a:t>e = get_exception </a:t>
+            </a:r>
+            <a:r>
+              <a:rPr lang="en-US" sz="2000" smtClean="0">
+                <a:latin typeface="Consolas" panose="020B0609020204030204" pitchFamily="49" charset="0"/>
+              </a:rPr>
+              <a:t>();</a:t>
+            </a:r>
+            <a:r>
+              <a:rPr lang="ru-RU" sz="2000" smtClean="0">
+                <a:latin typeface="Consolas" panose="020B0609020204030204" pitchFamily="49" charset="0"/>
+              </a:rPr>
+              <a:t/>
+            </a:r>
+            <a:br>
+              <a:rPr lang="ru-RU" sz="2000" smtClean="0">
+                <a:latin typeface="Consolas" panose="020B0609020204030204" pitchFamily="49" charset="0"/>
+              </a:rPr>
+            </a:br>
+            <a:r>
+              <a:rPr lang="en-US" sz="2000" smtClean="0">
+                <a:latin typeface="Consolas" panose="020B0609020204030204" pitchFamily="49" charset="0"/>
+              </a:rPr>
+              <a:t>rethrow_exception(e);</a:t>
+            </a:r>
+            <a:endParaRPr lang="en-US" sz="2000">
+              <a:latin typeface="Consolas" panose="020B0609020204030204" pitchFamily="49" charset="0"/>
+            </a:endParaRPr>
           </a:p>
         </p:txBody>
       </p:sp>
     </p:spTree>
     <p:extLst>
       <p:ext uri="{BB962C8B-B14F-4D97-AF65-F5344CB8AC3E}">
-        <p14:creationId xmlns:p14="http://schemas.microsoft.com/office/powerpoint/2010/main" val="875060300"/>
+        <p14:creationId xmlns:p14="http://schemas.microsoft.com/office/powerpoint/2010/main" val="4284677047"/>
       </p:ext>
     </p:extLst>
   </p:cSld>
@@ -30278,7 +30812,7 @@
           <a:p>
             <a:r>
               <a:rPr lang="ru-RU" smtClean="0"/>
-              <a:t>Вкладывание исключений</a:t>
+              <a:t>Обсуждение</a:t>
             </a:r>
             <a:endParaRPr lang="en-US"/>
           </a:p>
@@ -30300,181 +30834,16 @@
           <a:lstStyle/>
           <a:p>
             <a:r>
-              <a:rPr lang="ru-RU" smtClean="0"/>
-              <a:t>Иногда некая</a:t>
-            </a:r>
-            <a:r>
               <a:rPr lang="ru-RU"/>
-              <a:t> </a:t>
-            </a:r>
-            <a:r>
-              <a:rPr lang="ru-RU" smtClean="0"/>
-              <a:t>исключительная ситуация требует аннотации объекта исключения другим исключением</a:t>
-            </a:r>
-            <a:endParaRPr lang="en-US">
-              <a:latin typeface="Consolas" panose="020B0609020204030204" pitchFamily="49" charset="0"/>
-            </a:endParaRPr>
-          </a:p>
-          <a:p>
-            <a:pPr marL="45720" indent="0">
-              <a:buNone/>
-            </a:pPr>
-            <a:r>
-              <a:rPr lang="en-US" smtClean="0">
-                <a:latin typeface="Consolas" panose="020B0609020204030204" pitchFamily="49" charset="0"/>
-              </a:rPr>
-              <a:t>try {</a:t>
-            </a:r>
-            <a:r>
-              <a:rPr lang="ru-RU" smtClean="0">
-                <a:latin typeface="Consolas" panose="020B0609020204030204" pitchFamily="49" charset="0"/>
-              </a:rPr>
-              <a:t/>
-            </a:r>
-            <a:br>
-              <a:rPr lang="ru-RU" smtClean="0">
-                <a:latin typeface="Consolas" panose="020B0609020204030204" pitchFamily="49" charset="0"/>
-              </a:rPr>
-            </a:br>
-            <a:r>
-              <a:rPr lang="ru-RU" smtClean="0">
-                <a:latin typeface="Consolas" panose="020B0609020204030204" pitchFamily="49" charset="0"/>
-              </a:rPr>
-              <a:t>  </a:t>
-            </a:r>
-            <a:r>
-              <a:rPr lang="en-US" smtClean="0">
-                <a:latin typeface="Consolas" panose="020B0609020204030204" pitchFamily="49" charset="0"/>
-              </a:rPr>
-              <a:t>open_file</a:t>
-            </a:r>
-            <a:r>
-              <a:rPr lang="en-US">
-                <a:latin typeface="Consolas" panose="020B0609020204030204" pitchFamily="49" charset="0"/>
-              </a:rPr>
-              <a:t>("nonexistent.file</a:t>
-            </a:r>
-            <a:r>
-              <a:rPr lang="en-US" smtClean="0">
-                <a:latin typeface="Consolas" panose="020B0609020204030204" pitchFamily="49" charset="0"/>
-              </a:rPr>
-              <a:t>");</a:t>
-            </a:r>
-            <a:r>
-              <a:rPr lang="ru-RU" smtClean="0">
-                <a:latin typeface="Consolas" panose="020B0609020204030204" pitchFamily="49" charset="0"/>
-              </a:rPr>
-              <a:t/>
-            </a:r>
-            <a:br>
-              <a:rPr lang="ru-RU" smtClean="0">
-                <a:latin typeface="Consolas" panose="020B0609020204030204" pitchFamily="49" charset="0"/>
-              </a:rPr>
-            </a:br>
-            <a:r>
-              <a:rPr lang="en-US" smtClean="0">
-                <a:latin typeface="Consolas" panose="020B0609020204030204" pitchFamily="49" charset="0"/>
-              </a:rPr>
-              <a:t>} </a:t>
-            </a:r>
-            <a:r>
-              <a:rPr lang="en-US">
-                <a:latin typeface="Consolas" panose="020B0609020204030204" pitchFamily="49" charset="0"/>
-              </a:rPr>
-              <a:t>catch(...) </a:t>
-            </a:r>
-            <a:r>
-              <a:rPr lang="en-US" smtClean="0">
-                <a:latin typeface="Consolas" panose="020B0609020204030204" pitchFamily="49" charset="0"/>
-              </a:rPr>
-              <a:t>{</a:t>
-            </a:r>
-            <a:r>
-              <a:rPr lang="ru-RU" smtClean="0">
-                <a:latin typeface="Consolas" panose="020B0609020204030204" pitchFamily="49" charset="0"/>
-              </a:rPr>
-              <a:t/>
-            </a:r>
-            <a:br>
-              <a:rPr lang="ru-RU" smtClean="0">
-                <a:latin typeface="Consolas" panose="020B0609020204030204" pitchFamily="49" charset="0"/>
-              </a:rPr>
-            </a:br>
-            <a:r>
-              <a:rPr lang="ru-RU" smtClean="0">
-                <a:latin typeface="Consolas" panose="020B0609020204030204" pitchFamily="49" charset="0"/>
-              </a:rPr>
-              <a:t>  </a:t>
-            </a:r>
-            <a:r>
-              <a:rPr lang="en-US" smtClean="0">
-                <a:latin typeface="Consolas" panose="020B0609020204030204" pitchFamily="49" charset="0"/>
-              </a:rPr>
-              <a:t>// </a:t>
-            </a:r>
-            <a:r>
-              <a:rPr lang="ru-RU" smtClean="0">
-                <a:latin typeface="Consolas" panose="020B0609020204030204" pitchFamily="49" charset="0"/>
-              </a:rPr>
-              <a:t>тут хочется выбросить исключение</a:t>
-            </a:r>
-            <a:br>
-              <a:rPr lang="ru-RU" smtClean="0">
-                <a:latin typeface="Consolas" panose="020B0609020204030204" pitchFamily="49" charset="0"/>
-              </a:rPr>
-            </a:br>
-            <a:r>
-              <a:rPr lang="ru-RU" smtClean="0">
-                <a:latin typeface="Consolas" panose="020B0609020204030204" pitchFamily="49" charset="0"/>
-              </a:rPr>
-              <a:t>  </a:t>
-            </a:r>
-            <a:r>
-              <a:rPr lang="en-US" smtClean="0">
-                <a:latin typeface="Consolas" panose="020B0609020204030204" pitchFamily="49" charset="0"/>
-              </a:rPr>
-              <a:t>// </a:t>
-            </a:r>
-            <a:r>
-              <a:rPr lang="ru-RU" smtClean="0">
-                <a:solidFill>
-                  <a:srgbClr val="FF0000"/>
-                </a:solidFill>
-                <a:latin typeface="Consolas" panose="020B0609020204030204" pitchFamily="49" charset="0"/>
-              </a:rPr>
-              <a:t>но при этом не потерять прилетевшее</a:t>
-            </a:r>
-            <a:r>
-              <a:rPr lang="ru-RU">
-                <a:solidFill>
-                  <a:srgbClr val="FF0000"/>
-                </a:solidFill>
-                <a:latin typeface="Consolas" panose="020B0609020204030204" pitchFamily="49" charset="0"/>
-              </a:rPr>
-              <a:t/>
-            </a:r>
-            <a:br>
-              <a:rPr lang="ru-RU">
-                <a:solidFill>
-                  <a:srgbClr val="FF0000"/>
-                </a:solidFill>
-                <a:latin typeface="Consolas" panose="020B0609020204030204" pitchFamily="49" charset="0"/>
-              </a:rPr>
-            </a:br>
-            <a:r>
-              <a:rPr lang="en-US" smtClean="0">
-                <a:latin typeface="Consolas" panose="020B0609020204030204" pitchFamily="49" charset="0"/>
-              </a:rPr>
-              <a:t>}</a:t>
-            </a:r>
-            <a:endParaRPr lang="ru-RU" smtClean="0">
-              <a:latin typeface="Consolas" panose="020B0609020204030204" pitchFamily="49" charset="0"/>
-            </a:endParaRPr>
-          </a:p>
-          <a:p>
-            <a:r>
-              <a:rPr lang="ru-RU" smtClean="0"/>
-              <a:t>Конечно можно воспользоваться объектом исключения и написать свою обёртку вокруг него. Но у нас есть механизм языка.</a:t>
+              <a:t>П</a:t>
+            </a:r>
+            <a:r>
+              <a:rPr lang="ru-RU" smtClean="0"/>
+              <a:t>ередача таким образом исключений между </a:t>
+            </a:r>
+            <a:r>
+              <a:rPr lang="en-US" smtClean="0"/>
+              <a:t>threads</a:t>
             </a:r>
             <a:endParaRPr lang="en-US"/>
           </a:p>
@@ -30483,7 +30852,7 @@
     </p:spTree>
     <p:extLst>
       <p:ext uri="{BB962C8B-B14F-4D97-AF65-F5344CB8AC3E}">
-        <p14:creationId xmlns:p14="http://schemas.microsoft.com/office/powerpoint/2010/main" val="2555540644"/>
+        <p14:creationId xmlns:p14="http://schemas.microsoft.com/office/powerpoint/2010/main" val="875060300"/>
       </p:ext>
     </p:extLst>
   </p:cSld>
@@ -30555,14 +30924,89 @@
           <a:bodyPr/>
           <a:lstStyle/>
           <a:p>
+            <a:r>
+              <a:rPr lang="ru-RU" smtClean="0"/>
+              <a:t>Иногда некая</a:t>
+            </a:r>
+            <a:r>
+              <a:rPr lang="ru-RU"/>
+              <a:t> </a:t>
+            </a:r>
+            <a:r>
+              <a:rPr lang="ru-RU" smtClean="0"/>
+              <a:t>исключительная ситуация требует аннотации объекта исключения другим исключением</a:t>
+            </a:r>
+            <a:endParaRPr lang="en-US">
+              <a:latin typeface="Consolas" panose="020B0609020204030204" pitchFamily="49" charset="0"/>
+            </a:endParaRPr>
+          </a:p>
+          <a:p>
             <a:pPr marL="45720" indent="0">
               <a:buNone/>
             </a:pPr>
             <a:r>
+              <a:rPr lang="en-US" smtClean="0">
+                <a:latin typeface="Consolas" panose="020B0609020204030204" pitchFamily="49" charset="0"/>
+              </a:rPr>
+              <a:t>try {</a:t>
+            </a:r>
+            <a:r>
+              <a:rPr lang="ru-RU" smtClean="0">
+                <a:latin typeface="Consolas" panose="020B0609020204030204" pitchFamily="49" charset="0"/>
+              </a:rPr>
+              <a:t/>
+            </a:r>
+            <a:br>
+              <a:rPr lang="ru-RU" smtClean="0">
+                <a:latin typeface="Consolas" panose="020B0609020204030204" pitchFamily="49" charset="0"/>
+              </a:rPr>
+            </a:br>
+            <a:r>
+              <a:rPr lang="ru-RU" smtClean="0">
+                <a:latin typeface="Consolas" panose="020B0609020204030204" pitchFamily="49" charset="0"/>
+              </a:rPr>
+              <a:t>  </a:t>
+            </a:r>
+            <a:r>
+              <a:rPr lang="en-US" smtClean="0">
+                <a:latin typeface="Consolas" panose="020B0609020204030204" pitchFamily="49" charset="0"/>
+              </a:rPr>
+              <a:t>open_file</a:t>
+            </a:r>
+            <a:r>
               <a:rPr lang="en-US">
                 <a:latin typeface="Consolas" panose="020B0609020204030204" pitchFamily="49" charset="0"/>
               </a:rPr>
-              <a:t>try </a:t>
+              <a:t>("nonexistent.file</a:t>
+            </a:r>
+            <a:r>
+              <a:rPr lang="en-US" smtClean="0">
+                <a:latin typeface="Consolas" panose="020B0609020204030204" pitchFamily="49" charset="0"/>
+              </a:rPr>
+              <a:t>");</a:t>
+            </a:r>
+            <a:r>
+              <a:rPr lang="ru-RU" smtClean="0">
+                <a:latin typeface="Consolas" panose="020B0609020204030204" pitchFamily="49" charset="0"/>
+              </a:rPr>
+              <a:t/>
+            </a:r>
+            <a:br>
+              <a:rPr lang="ru-RU" smtClean="0">
+                <a:latin typeface="Consolas" panose="020B0609020204030204" pitchFamily="49" charset="0"/>
+              </a:rPr>
+            </a:br>
+            <a:r>
+              <a:rPr lang="en-US" smtClean="0">
+                <a:latin typeface="Consolas" panose="020B0609020204030204" pitchFamily="49" charset="0"/>
+              </a:rPr>
+              <a:t>} </a:t>
+            </a:r>
+            <a:r>
+              <a:rPr lang="en-US">
+                <a:latin typeface="Consolas" panose="020B0609020204030204" pitchFamily="49" charset="0"/>
+              </a:rPr>
+              <a:t>catch(...) </a:t>
             </a:r>
             <a:r>
               <a:rPr lang="en-US" smtClean="0">
@@ -30591,83 +31035,54 @@
               <a:rPr lang="en-US" smtClean="0">
                 <a:latin typeface="Consolas" panose="020B0609020204030204" pitchFamily="49" charset="0"/>
               </a:rPr>
-              <a:t>open_file</a:t>
-            </a:r>
-            <a:r>
-              <a:rPr lang="en-US">
-                <a:latin typeface="Consolas" panose="020B0609020204030204" pitchFamily="49" charset="0"/>
-              </a:rPr>
-              <a:t>("nonexistent.file</a:t>
-            </a:r>
-            <a:r>
-              <a:rPr lang="en-US" smtClean="0">
-                <a:latin typeface="Consolas" panose="020B0609020204030204" pitchFamily="49" charset="0"/>
-              </a:rPr>
-              <a:t>");</a:t>
-            </a:r>
-            <a:br>
-              <a:rPr lang="en-US" smtClean="0">
-                <a:latin typeface="Consolas" panose="020B0609020204030204" pitchFamily="49" charset="0"/>
-              </a:rPr>
-            </a:br>
-            <a:r>
-              <a:rPr lang="en-US" smtClean="0">
-                <a:latin typeface="Consolas" panose="020B0609020204030204" pitchFamily="49" charset="0"/>
-              </a:rPr>
-              <a:t>} </a:t>
-            </a:r>
-            <a:r>
-              <a:rPr lang="en-US">
-                <a:latin typeface="Consolas" panose="020B0609020204030204" pitchFamily="49" charset="0"/>
-              </a:rPr>
-              <a:t>catch(...) </a:t>
-            </a:r>
-            <a:r>
-              <a:rPr lang="en-US" smtClean="0">
-                <a:latin typeface="Consolas" panose="020B0609020204030204" pitchFamily="49" charset="0"/>
-              </a:rPr>
-              <a:t>{</a:t>
-            </a:r>
-            <a:br>
-              <a:rPr lang="en-US" smtClean="0">
-                <a:latin typeface="Consolas" panose="020B0609020204030204" pitchFamily="49" charset="0"/>
-              </a:rPr>
-            </a:br>
-            <a:r>
-              <a:rPr lang="en-US" smtClean="0">
+              <a:t>// </a:t>
+            </a:r>
+            <a:r>
+              <a:rPr lang="ru-RU" smtClean="0">
+                <a:latin typeface="Consolas" panose="020B0609020204030204" pitchFamily="49" charset="0"/>
+              </a:rPr>
+              <a:t>тут хочется выбросить исключение</a:t>
+            </a:r>
+            <a:br>
+              <a:rPr lang="ru-RU" smtClean="0">
+                <a:latin typeface="Consolas" panose="020B0609020204030204" pitchFamily="49" charset="0"/>
+              </a:rPr>
+            </a:br>
+            <a:r>
+              <a:rPr lang="ru-RU" smtClean="0">
                 <a:latin typeface="Consolas" panose="020B0609020204030204" pitchFamily="49" charset="0"/>
               </a:rPr>
               <a:t>  </a:t>
             </a:r>
             <a:r>
               <a:rPr lang="en-US" smtClean="0">
+                <a:latin typeface="Consolas" panose="020B0609020204030204" pitchFamily="49" charset="0"/>
+              </a:rPr>
+              <a:t>// </a:t>
+            </a:r>
+            <a:r>
+              <a:rPr lang="ru-RU" smtClean="0">
                 <a:solidFill>
-                  <a:srgbClr val="0000FF"/>
+                  <a:srgbClr val="FF0000"/>
                 </a:solidFill>
                 <a:latin typeface="Consolas" panose="020B0609020204030204" pitchFamily="49" charset="0"/>
               </a:rPr>
-              <a:t>std::throw_with_nested</a:t>
-            </a:r>
-            <a:r>
-              <a:rPr lang="en-US" smtClean="0">
-                <a:latin typeface="Consolas" panose="020B0609020204030204" pitchFamily="49" charset="0"/>
-              </a:rPr>
-              <a:t>(runtime_error</a:t>
-            </a:r>
-            <a:r>
-              <a:rPr lang="en-US">
-                <a:latin typeface="Consolas" panose="020B0609020204030204" pitchFamily="49" charset="0"/>
-              </a:rPr>
-              <a:t>("run() failed</a:t>
-            </a:r>
-            <a:r>
-              <a:rPr lang="en-US" smtClean="0">
-                <a:latin typeface="Consolas" panose="020B0609020204030204" pitchFamily="49" charset="0"/>
-              </a:rPr>
-              <a:t>"));</a:t>
-            </a:r>
-            <a:br>
-              <a:rPr lang="en-US" smtClean="0">
+              <a:t>но при этом не потерять прилетевшее</a:t>
+            </a:r>
+            <a:r>
+              <a:rPr lang="ru-RU">
+                <a:solidFill>
+                  <a:srgbClr val="FF0000"/>
+                </a:solidFill>
+                <a:latin typeface="Consolas" panose="020B0609020204030204" pitchFamily="49" charset="0"/>
+              </a:rPr>
+              <a:t/>
+            </a:r>
+            <a:br>
+              <a:rPr lang="ru-RU">
+                <a:solidFill>
+                  <a:srgbClr val="FF0000"/>
+                </a:solidFill>
                 <a:latin typeface="Consolas" panose="020B0609020204030204" pitchFamily="49" charset="0"/>
               </a:rPr>
             </a:br>
@@ -30677,169 +31092,23 @@
               </a:rPr>
               <a:t>}</a:t>
             </a:r>
-          </a:p>
-          <a:p>
-            <a:pPr marL="45720" indent="0">
-              <a:buNone/>
-            </a:pPr>
-            <a:r>
-              <a:rPr lang="en-US" smtClean="0">
-                <a:latin typeface="Consolas" panose="020B0609020204030204" pitchFamily="49" charset="0"/>
-              </a:rPr>
-              <a:t>// </a:t>
-            </a:r>
-            <a:r>
-              <a:rPr lang="ru-RU" smtClean="0">
-                <a:latin typeface="Consolas" panose="020B0609020204030204" pitchFamily="49" charset="0"/>
-              </a:rPr>
-              <a:t>где-то дальше:</a:t>
-            </a:r>
-            <a:endParaRPr lang="en-US">
+            <a:endParaRPr lang="ru-RU" smtClean="0">
               <a:latin typeface="Consolas" panose="020B0609020204030204" pitchFamily="49" charset="0"/>
             </a:endParaRPr>
           </a:p>
           <a:p>
-            <a:pPr marL="45720" indent="0">
-              <a:buNone/>
-            </a:pPr>
-            <a:r>
-              <a:rPr lang="en-US">
-                <a:latin typeface="Consolas" panose="020B0609020204030204" pitchFamily="49" charset="0"/>
-              </a:rPr>
-              <a:t>catch(runtime_error &amp;e</a:t>
-            </a:r>
-            <a:r>
-              <a:rPr lang="en-US" smtClean="0">
-                <a:latin typeface="Consolas" panose="020B0609020204030204" pitchFamily="49" charset="0"/>
-              </a:rPr>
-              <a:t>)</a:t>
-            </a:r>
-            <a:r>
-              <a:rPr lang="ru-RU" smtClean="0">
-                <a:latin typeface="Consolas" panose="020B0609020204030204" pitchFamily="49" charset="0"/>
-              </a:rPr>
-              <a:t> </a:t>
-            </a:r>
-            <a:r>
-              <a:rPr lang="en-US" smtClean="0">
-                <a:latin typeface="Consolas" panose="020B0609020204030204" pitchFamily="49" charset="0"/>
-              </a:rPr>
-              <a:t>{</a:t>
-            </a:r>
-            <a:r>
-              <a:rPr lang="ru-RU" smtClean="0">
-                <a:latin typeface="Consolas" panose="020B0609020204030204" pitchFamily="49" charset="0"/>
-              </a:rPr>
-              <a:t/>
-            </a:r>
-            <a:br>
-              <a:rPr lang="ru-RU" smtClean="0">
-                <a:latin typeface="Consolas" panose="020B0609020204030204" pitchFamily="49" charset="0"/>
-              </a:rPr>
-            </a:br>
-            <a:r>
-              <a:rPr lang="en-US" smtClean="0">
-                <a:latin typeface="Consolas" panose="020B0609020204030204" pitchFamily="49" charset="0"/>
-              </a:rPr>
-              <a:t>  cout &lt;&lt; e.what() &lt;&lt; endl;</a:t>
-            </a:r>
-            <a:br>
-              <a:rPr lang="en-US" smtClean="0">
-                <a:latin typeface="Consolas" panose="020B0609020204030204" pitchFamily="49" charset="0"/>
-              </a:rPr>
-            </a:br>
-            <a:r>
-              <a:rPr lang="ru-RU" smtClean="0">
-                <a:latin typeface="Consolas" panose="020B0609020204030204" pitchFamily="49" charset="0"/>
-              </a:rPr>
-              <a:t>  </a:t>
-            </a:r>
-            <a:r>
-              <a:rPr lang="en-US" smtClean="0">
-                <a:latin typeface="Consolas" panose="020B0609020204030204" pitchFamily="49" charset="0"/>
-              </a:rPr>
-              <a:t>if(e.</a:t>
-            </a:r>
-            <a:r>
-              <a:rPr lang="en-US" smtClean="0">
-                <a:solidFill>
-                  <a:srgbClr val="0000FF"/>
-                </a:solidFill>
-                <a:latin typeface="Consolas" panose="020B0609020204030204" pitchFamily="49" charset="0"/>
-              </a:rPr>
-              <a:t>has_nested</a:t>
-            </a:r>
-            <a:r>
-              <a:rPr lang="en-US" smtClean="0">
-                <a:latin typeface="Consolas" panose="020B0609020204030204" pitchFamily="49" charset="0"/>
-              </a:rPr>
-              <a:t>())</a:t>
-            </a:r>
-            <a:r>
-              <a:rPr lang="ru-RU" smtClean="0">
-                <a:latin typeface="Consolas" panose="020B0609020204030204" pitchFamily="49" charset="0"/>
-              </a:rPr>
-              <a:t/>
-            </a:r>
-            <a:br>
-              <a:rPr lang="ru-RU" smtClean="0">
-                <a:latin typeface="Consolas" panose="020B0609020204030204" pitchFamily="49" charset="0"/>
-              </a:rPr>
-            </a:br>
-            <a:r>
-              <a:rPr lang="ru-RU" smtClean="0">
-                <a:latin typeface="Consolas" panose="020B0609020204030204" pitchFamily="49" charset="0"/>
-              </a:rPr>
-              <a:t>    </a:t>
-            </a:r>
-            <a:r>
-              <a:rPr lang="en-US" smtClean="0">
-                <a:latin typeface="Consolas" panose="020B0609020204030204" pitchFamily="49" charset="0"/>
-              </a:rPr>
-              <a:t>e.</a:t>
-            </a:r>
-            <a:r>
-              <a:rPr lang="en-US" smtClean="0">
-                <a:solidFill>
-                  <a:srgbClr val="0000FF"/>
-                </a:solidFill>
-                <a:latin typeface="Consolas" panose="020B0609020204030204" pitchFamily="49" charset="0"/>
-              </a:rPr>
-              <a:t>rethrow_nested</a:t>
-            </a:r>
-            <a:r>
-              <a:rPr lang="en-US" smtClean="0">
-                <a:latin typeface="Consolas" panose="020B0609020204030204" pitchFamily="49" charset="0"/>
-              </a:rPr>
-              <a:t>();</a:t>
-            </a:r>
-            <a:r>
-              <a:rPr lang="ru-RU" smtClean="0">
-                <a:latin typeface="Consolas" panose="020B0609020204030204" pitchFamily="49" charset="0"/>
-              </a:rPr>
-              <a:t/>
-            </a:r>
-            <a:br>
-              <a:rPr lang="ru-RU" smtClean="0">
-                <a:latin typeface="Consolas" panose="020B0609020204030204" pitchFamily="49" charset="0"/>
-              </a:rPr>
-            </a:br>
-            <a:r>
-              <a:rPr lang="en-US" smtClean="0">
-                <a:latin typeface="Consolas" panose="020B0609020204030204" pitchFamily="49" charset="0"/>
-              </a:rPr>
-              <a:t>}</a:t>
-            </a:r>
-            <a:endParaRPr lang="en-US">
-              <a:latin typeface="Consolas" panose="020B0609020204030204" pitchFamily="49" charset="0"/>
-            </a:endParaRPr>
+            <a:r>
+              <a:rPr lang="ru-RU" smtClean="0"/>
+              <a:t>Конечно можно воспользоваться объектом исключения и написать свою обёртку вокруг него. Но у нас есть механизм языка.</a:t>
+            </a:r>
+            <a:endParaRPr lang="en-US"/>
           </a:p>
         </p:txBody>
       </p:sp>
     </p:spTree>
     <p:extLst>
       <p:ext uri="{BB962C8B-B14F-4D97-AF65-F5344CB8AC3E}">
-        <p14:creationId xmlns:p14="http://schemas.microsoft.com/office/powerpoint/2010/main" val="973858813"/>
+        <p14:creationId xmlns:p14="http://schemas.microsoft.com/office/powerpoint/2010/main" val="2555540644"/>
       </p:ext>
     </p:extLst>
   </p:cSld>
@@ -31105,19 +31374,54 @@
               </a:rPr>
             </a:br>
             <a:r>
-              <a:rPr lang="en-US" smtClean="0">
+              <a:rPr lang="ru-RU" smtClean="0">
                 <a:latin typeface="Consolas" panose="020B0609020204030204" pitchFamily="49" charset="0"/>
               </a:rPr>
               <a:t>  </a:t>
             </a:r>
             <a:r>
-              <a:rPr lang="en-US">
+              <a:rPr lang="en-US" smtClean="0">
+                <a:latin typeface="Consolas" panose="020B0609020204030204" pitchFamily="49" charset="0"/>
+              </a:rPr>
+              <a:t>if(e.</a:t>
+            </a:r>
+            <a:r>
+              <a:rPr lang="en-US" smtClean="0">
                 <a:solidFill>
                   <a:srgbClr val="0000FF"/>
                 </a:solidFill>
                 <a:latin typeface="Consolas" panose="020B0609020204030204" pitchFamily="49" charset="0"/>
               </a:rPr>
-              <a:t>std</a:t>
+              <a:t>has_nested</a:t>
+            </a:r>
+            <a:r>
+              <a:rPr lang="en-US" smtClean="0">
+                <a:latin typeface="Consolas" panose="020B0609020204030204" pitchFamily="49" charset="0"/>
+              </a:rPr>
+              <a:t>())</a:t>
+            </a:r>
+            <a:r>
+              <a:rPr lang="ru-RU" smtClean="0">
+                <a:latin typeface="Consolas" panose="020B0609020204030204" pitchFamily="49" charset="0"/>
+              </a:rPr>
+              <a:t/>
+            </a:r>
+            <a:br>
+              <a:rPr lang="ru-RU" smtClean="0">
+                <a:latin typeface="Consolas" panose="020B0609020204030204" pitchFamily="49" charset="0"/>
+              </a:rPr>
+            </a:br>
+            <a:r>
+              <a:rPr lang="ru-RU" smtClean="0">
+                <a:latin typeface="Consolas" panose="020B0609020204030204" pitchFamily="49" charset="0"/>
+              </a:rPr>
+              <a:t>    </a:t>
+            </a:r>
+            <a:r>
+              <a:rPr lang="en-US" smtClean="0">
+                <a:latin typeface="Consolas" panose="020B0609020204030204" pitchFamily="49" charset="0"/>
+              </a:rPr>
+              <a:t>e.</a:t>
             </a:r>
             <a:r>
               <a:rPr lang="en-US" smtClean="0">
@@ -31126,13 +31430,13 @@
                 </a:solidFill>
                 <a:latin typeface="Consolas" panose="020B0609020204030204" pitchFamily="49" charset="0"/>
               </a:rPr>
-              <a:t>::rethrow_if_nested</a:t>
-            </a:r>
-            <a:r>
-              <a:rPr lang="en-US" smtClean="0">
-                <a:latin typeface="Consolas" panose="020B0609020204030204" pitchFamily="49" charset="0"/>
-              </a:rPr>
-              <a:t>(e);</a:t>
+              <a:t>rethrow_nested</a:t>
+            </a:r>
+            <a:r>
+              <a:rPr lang="en-US" smtClean="0">
+                <a:latin typeface="Consolas" panose="020B0609020204030204" pitchFamily="49" charset="0"/>
+              </a:rPr>
+              <a:t>();</a:t>
             </a:r>
             <a:r>
               <a:rPr lang="ru-RU" smtClean="0">
@@ -31160,7 +31464,7 @@
     </p:spTree>
     <p:extLst>
       <p:ext uri="{BB962C8B-B14F-4D97-AF65-F5344CB8AC3E}">
-        <p14:creationId xmlns:p14="http://schemas.microsoft.com/office/powerpoint/2010/main" val="2684082227"/>
+        <p14:creationId xmlns:p14="http://schemas.microsoft.com/office/powerpoint/2010/main" val="973858813"/>
       </p:ext>
     </p:extLst>
   </p:cSld>

</xml_diff>

<commit_message>
More seminar 3 slides
git-svn-id: https://svn.code.sf.net/p/cpp-lects-rus/code/trunk@287 39143b06-f351-456c-9f92-4cd32fad6823
</commit_message>
<xml_diff>
--- a/slides/sep2017/10-exceptions.pptx
+++ b/slides/sep2017/10-exceptions.pptx
@@ -300,7 +300,7 @@
           <a:p>
             <a:fld id="{A45B99D1-CF44-4E2B-8A75-7AD1B4B1157F}" type="datetimeFigureOut">
               <a:rPr lang="en-US" smtClean="0"/>
-              <a:t>2/17/2018</a:t>
+              <a:t>9/30/2018</a:t>
             </a:fld>
             <a:endParaRPr lang="en-US"/>
           </a:p>
@@ -933,7 +933,7 @@
             <a:fld id="{96DFF08F-DC6B-4601-B491-B0F83F6DD2DA}" type="datetimeFigureOut">
               <a:rPr lang="en-US" dirty="0"/>
               <a:pPr/>
-              <a:t>2/17/2018</a:t>
+              <a:t>9/30/2018</a:t>
             </a:fld>
             <a:endParaRPr lang="en-US" dirty="0"/>
           </a:p>
@@ -1150,7 +1150,7 @@
           <a:p>
             <a:fld id="{96DFF08F-DC6B-4601-B491-B0F83F6DD2DA}" type="datetimeFigureOut">
               <a:rPr lang="en-US" dirty="0"/>
-              <a:t>2/17/2018</a:t>
+              <a:t>9/30/2018</a:t>
             </a:fld>
             <a:endParaRPr lang="en-US" dirty="0"/>
           </a:p>
@@ -1325,7 +1325,7 @@
           <a:p>
             <a:fld id="{96DFF08F-DC6B-4601-B491-B0F83F6DD2DA}" type="datetimeFigureOut">
               <a:rPr lang="en-US" dirty="0"/>
-              <a:t>2/17/2018</a:t>
+              <a:t>9/30/2018</a:t>
             </a:fld>
             <a:endParaRPr lang="en-US" dirty="0"/>
           </a:p>
@@ -1490,7 +1490,7 @@
           <a:p>
             <a:fld id="{96DFF08F-DC6B-4601-B491-B0F83F6DD2DA}" type="datetimeFigureOut">
               <a:rPr lang="en-US" dirty="0"/>
-              <a:t>2/17/2018</a:t>
+              <a:t>9/30/2018</a:t>
             </a:fld>
             <a:endParaRPr lang="en-US" dirty="0"/>
           </a:p>
@@ -1736,7 +1736,7 @@
           <a:p>
             <a:fld id="{96DFF08F-DC6B-4601-B491-B0F83F6DD2DA}" type="datetimeFigureOut">
               <a:rPr lang="en-US" dirty="0"/>
-              <a:t>2/17/2018</a:t>
+              <a:t>9/30/2018</a:t>
             </a:fld>
             <a:endParaRPr lang="en-US" dirty="0"/>
           </a:p>
@@ -2054,7 +2054,7 @@
           <a:p>
             <a:fld id="{96DFF08F-DC6B-4601-B491-B0F83F6DD2DA}" type="datetimeFigureOut">
               <a:rPr lang="en-US" dirty="0"/>
-              <a:t>2/17/2018</a:t>
+              <a:t>9/30/2018</a:t>
             </a:fld>
             <a:endParaRPr lang="en-US" dirty="0"/>
           </a:p>
@@ -2473,7 +2473,7 @@
           <a:p>
             <a:fld id="{96DFF08F-DC6B-4601-B491-B0F83F6DD2DA}" type="datetimeFigureOut">
               <a:rPr lang="en-US" dirty="0"/>
-              <a:t>2/17/2018</a:t>
+              <a:t>9/30/2018</a:t>
             </a:fld>
             <a:endParaRPr lang="en-US" dirty="0"/>
           </a:p>
@@ -2586,7 +2586,7 @@
           <a:p>
             <a:fld id="{96DFF08F-DC6B-4601-B491-B0F83F6DD2DA}" type="datetimeFigureOut">
               <a:rPr lang="en-US" dirty="0"/>
-              <a:t>2/17/2018</a:t>
+              <a:t>9/30/2018</a:t>
             </a:fld>
             <a:endParaRPr lang="en-US" dirty="0"/>
           </a:p>
@@ -2676,7 +2676,7 @@
           <a:p>
             <a:fld id="{96DFF08F-DC6B-4601-B491-B0F83F6DD2DA}" type="datetimeFigureOut">
               <a:rPr lang="en-US" dirty="0"/>
-              <a:t>2/17/2018</a:t>
+              <a:t>9/30/2018</a:t>
             </a:fld>
             <a:endParaRPr lang="en-US" dirty="0"/>
           </a:p>
@@ -2961,7 +2961,7 @@
           <a:p>
             <a:fld id="{96DFF08F-DC6B-4601-B491-B0F83F6DD2DA}" type="datetimeFigureOut">
               <a:rPr lang="en-US" dirty="0"/>
-              <a:t>2/17/2018</a:t>
+              <a:t>9/30/2018</a:t>
             </a:fld>
             <a:endParaRPr lang="en-US" dirty="0"/>
           </a:p>
@@ -3228,7 +3228,7 @@
           <a:p>
             <a:fld id="{96DFF08F-DC6B-4601-B491-B0F83F6DD2DA}" type="datetimeFigureOut">
               <a:rPr lang="en-US" dirty="0"/>
-              <a:t>2/17/2018</a:t>
+              <a:t>9/30/2018</a:t>
             </a:fld>
             <a:endParaRPr lang="en-US" dirty="0"/>
           </a:p>
@@ -3477,7 +3477,7 @@
             <a:fld id="{96DFF08F-DC6B-4601-B491-B0F83F6DD2DA}" type="datetimeFigureOut">
               <a:rPr lang="en-US" dirty="0"/>
               <a:pPr/>
-              <a:t>2/17/2018</a:t>
+              <a:t>9/30/2018</a:t>
             </a:fld>
             <a:endParaRPr lang="en-US" dirty="0"/>
           </a:p>
@@ -13053,7 +13053,6 @@
               <a:rPr lang="ru-RU" smtClean="0"/>
               <a:t>Наследование от стандартного класса вводит расширение в иерархию</a:t>
             </a:r>
-            <a:endParaRPr lang="ru-RU" smtClean="0"/>
           </a:p>
           <a:p>
             <a:pPr marL="0" indent="0">
@@ -23472,11 +23471,7 @@
           <a:p>
             <a:r>
               <a:rPr lang="ru-RU" smtClean="0"/>
-              <a:t>При </a:t>
-            </a:r>
-            <a:r>
-              <a:rPr lang="ru-RU" smtClean="0"/>
-              <a:t>проектировании</a:t>
+              <a:t>При проектировании</a:t>
             </a:r>
             <a:r>
               <a:rPr lang="en-US" smtClean="0"/>

</xml_diff>